<commit_message>
Initial commit for kfserving abtesting
</commit_message>
<xml_diff>
--- a/mkdocs/docs/images/src/canary-progressive-kubectl.pptx
+++ b/mkdocs/docs/images/src/canary-progressive-kubectl.pptx
@@ -197,7 +197,7 @@
           <a:p>
             <a:fld id="{38B78CBE-37FA-D241-BB4C-CAC5D3B25F49}" type="datetimeFigureOut">
               <a:rPr lang="en-US" smtClean="0"/>
-              <a:t>4/26/21</a:t>
+              <a:t>4/28/21</a:t>
             </a:fld>
             <a:endParaRPr lang="en-US"/>
           </a:p>
@@ -611,7 +611,7 @@
           <a:p>
             <a:fld id="{708812C5-0212-FD42-A0D4-E2E8FF4E3AF5}" type="datetime1">
               <a:rPr lang="en-US" smtClean="0"/>
-              <a:t>4/26/21</a:t>
+              <a:t>4/28/21</a:t>
             </a:fld>
             <a:endParaRPr lang="en-US"/>
           </a:p>
@@ -812,7 +812,7 @@
           <a:p>
             <a:fld id="{D232AC6F-41C3-B34B-9BAA-03ED2F3BC0F6}" type="datetime1">
               <a:rPr lang="en-US" smtClean="0"/>
-              <a:t>4/26/21</a:t>
+              <a:t>4/28/21</a:t>
             </a:fld>
             <a:endParaRPr lang="en-US"/>
           </a:p>
@@ -1023,7 +1023,7 @@
           <a:p>
             <a:fld id="{BEE140C2-F440-9D49-95CB-5965D64CC4A2}" type="datetime1">
               <a:rPr lang="en-US" smtClean="0"/>
-              <a:t>4/26/21</a:t>
+              <a:t>4/28/21</a:t>
             </a:fld>
             <a:endParaRPr lang="en-US"/>
           </a:p>
@@ -1224,7 +1224,7 @@
           <a:p>
             <a:fld id="{CC99F980-FB29-FD47-8508-150F73F1E8B0}" type="datetime1">
               <a:rPr lang="en-US" smtClean="0"/>
-              <a:t>4/26/21</a:t>
+              <a:t>4/28/21</a:t>
             </a:fld>
             <a:endParaRPr lang="en-US"/>
           </a:p>
@@ -1502,7 +1502,7 @@
           <a:p>
             <a:fld id="{D4510983-EA22-9643-8AC0-B3C6499B643B}" type="datetime1">
               <a:rPr lang="en-US" smtClean="0"/>
-              <a:t>4/26/21</a:t>
+              <a:t>4/28/21</a:t>
             </a:fld>
             <a:endParaRPr lang="en-US"/>
           </a:p>
@@ -1770,7 +1770,7 @@
           <a:p>
             <a:fld id="{D5A39195-967D-5D4E-8C6A-C99866996458}" type="datetime1">
               <a:rPr lang="en-US" smtClean="0"/>
-              <a:t>4/26/21</a:t>
+              <a:t>4/28/21</a:t>
             </a:fld>
             <a:endParaRPr lang="en-US"/>
           </a:p>
@@ -2185,7 +2185,7 @@
           <a:p>
             <a:fld id="{5AD771E9-C79D-684D-A158-5EB6E92DE947}" type="datetime1">
               <a:rPr lang="en-US" smtClean="0"/>
-              <a:t>4/26/21</a:t>
+              <a:t>4/28/21</a:t>
             </a:fld>
             <a:endParaRPr lang="en-US"/>
           </a:p>
@@ -2329,7 +2329,7 @@
           <a:p>
             <a:fld id="{693CA161-7E4C-5C4B-B799-DB602A0B9806}" type="datetime1">
               <a:rPr lang="en-US" smtClean="0"/>
-              <a:t>4/26/21</a:t>
+              <a:t>4/28/21</a:t>
             </a:fld>
             <a:endParaRPr lang="en-US"/>
           </a:p>
@@ -2445,7 +2445,7 @@
           <a:p>
             <a:fld id="{6D55FDF3-8BB2-6349-A5FA-057F3D78953D}" type="datetime1">
               <a:rPr lang="en-US" smtClean="0"/>
-              <a:t>4/26/21</a:t>
+              <a:t>4/28/21</a:t>
             </a:fld>
             <a:endParaRPr lang="en-US"/>
           </a:p>
@@ -2759,7 +2759,7 @@
           <a:p>
             <a:fld id="{EEDFACC0-3228-BA4B-942E-CEF38B0101FD}" type="datetime1">
               <a:rPr lang="en-US" smtClean="0"/>
-              <a:t>4/26/21</a:t>
+              <a:t>4/28/21</a:t>
             </a:fld>
             <a:endParaRPr lang="en-US"/>
           </a:p>
@@ -3050,7 +3050,7 @@
           <a:p>
             <a:fld id="{07EEEDBE-E24C-D140-B419-6D8D592D0F1C}" type="datetime1">
               <a:rPr lang="en-US" smtClean="0"/>
-              <a:t>4/26/21</a:t>
+              <a:t>4/28/21</a:t>
             </a:fld>
             <a:endParaRPr lang="en-US"/>
           </a:p>
@@ -3294,7 +3294,7 @@
           <a:p>
             <a:fld id="{E05781A2-A5EF-C54C-A3EF-F62483D37EDC}" type="datetime1">
               <a:rPr lang="en-US" smtClean="0"/>
-              <a:t>4/26/21</a:t>
+              <a:t>4/28/21</a:t>
             </a:fld>
             <a:endParaRPr lang="en-US"/>
           </a:p>
@@ -3729,8 +3729,8 @@
         </p:nvSpPr>
         <p:spPr>
           <a:xfrm>
-            <a:off x="0" y="1086522"/>
-            <a:ext cx="12191999" cy="5077610"/>
+            <a:off x="149603" y="1466858"/>
+            <a:ext cx="11879708" cy="4441415"/>
           </a:xfrm>
           <a:prstGeom prst="rect">
             <a:avLst/>
@@ -3771,38 +3771,6 @@
       </p:sp>
       <p:sp>
         <p:nvSpPr>
-          <p:cNvPr id="10" name="TextBox 9">
-            <a:extLst>
-              <a:ext uri="{FF2B5EF4-FFF2-40B4-BE49-F238E27FC236}">
-                <a16:creationId xmlns:a16="http://schemas.microsoft.com/office/drawing/2014/main" id="{AA0E52A5-8109-5744-8F63-4D4AE2E6294B}"/>
-              </a:ext>
-            </a:extLst>
-          </p:cNvPr>
-          <p:cNvSpPr txBox="1"/>
-          <p:nvPr/>
-        </p:nvSpPr>
-        <p:spPr>
-          <a:xfrm>
-            <a:off x="775252" y="89452"/>
-            <a:ext cx="184731" cy="369332"/>
-          </a:xfrm>
-          <a:prstGeom prst="rect">
-            <a:avLst/>
-          </a:prstGeom>
-          <a:noFill/>
-        </p:spPr>
-        <p:txBody>
-          <a:bodyPr wrap="none" rtlCol="0">
-            <a:spAutoFit/>
-          </a:bodyPr>
-          <a:lstStyle/>
-          <a:p>
-            <a:endParaRPr lang="en-US" dirty="0"/>
-          </a:p>
-        </p:txBody>
-      </p:sp>
-      <p:sp>
-        <p:nvSpPr>
           <p:cNvPr id="100" name="Rounded Rectangle 99">
             <a:extLst>
               <a:ext uri="{FF2B5EF4-FFF2-40B4-BE49-F238E27FC236}">
@@ -4127,41 +4095,6 @@
       </p:sp>
       <p:sp>
         <p:nvSpPr>
-          <p:cNvPr id="5" name="TextBox 4">
-            <a:extLst>
-              <a:ext uri="{FF2B5EF4-FFF2-40B4-BE49-F238E27FC236}">
-                <a16:creationId xmlns:a16="http://schemas.microsoft.com/office/drawing/2014/main" id="{2129025F-2A6A-8748-B81D-BDF446C06291}"/>
-              </a:ext>
-            </a:extLst>
-          </p:cNvPr>
-          <p:cNvSpPr txBox="1"/>
-          <p:nvPr/>
-        </p:nvSpPr>
-        <p:spPr>
-          <a:xfrm>
-            <a:off x="1825570" y="3761433"/>
-            <a:ext cx="1605504" cy="369332"/>
-          </a:xfrm>
-          <a:prstGeom prst="rect">
-            <a:avLst/>
-          </a:prstGeom>
-          <a:noFill/>
-        </p:spPr>
-        <p:txBody>
-          <a:bodyPr wrap="none" rtlCol="0">
-            <a:spAutoFit/>
-          </a:bodyPr>
-          <a:lstStyle/>
-          <a:p>
-            <a:r>
-              <a:rPr lang="en-US" dirty="0"/>
-              <a:t>Knative Service</a:t>
-            </a:r>
-          </a:p>
-        </p:txBody>
-      </p:sp>
-      <p:sp>
-        <p:nvSpPr>
           <p:cNvPr id="6" name="Rounded Rectangle 5">
             <a:extLst>
               <a:ext uri="{FF2B5EF4-FFF2-40B4-BE49-F238E27FC236}">
@@ -4970,76 +4903,6 @@
       </p:pic>
       <p:sp>
         <p:nvSpPr>
-          <p:cNvPr id="45" name="TextBox 44">
-            <a:extLst>
-              <a:ext uri="{FF2B5EF4-FFF2-40B4-BE49-F238E27FC236}">
-                <a16:creationId xmlns:a16="http://schemas.microsoft.com/office/drawing/2014/main" id="{1D400ADD-3BC0-4445-B1C6-E95A6E4EF991}"/>
-              </a:ext>
-            </a:extLst>
-          </p:cNvPr>
-          <p:cNvSpPr txBox="1"/>
-          <p:nvPr/>
-        </p:nvSpPr>
-        <p:spPr>
-          <a:xfrm>
-            <a:off x="3670821" y="2718076"/>
-            <a:ext cx="583814" cy="369332"/>
-          </a:xfrm>
-          <a:prstGeom prst="rect">
-            <a:avLst/>
-          </a:prstGeom>
-          <a:noFill/>
-        </p:spPr>
-        <p:txBody>
-          <a:bodyPr wrap="none" rtlCol="0">
-            <a:spAutoFit/>
-          </a:bodyPr>
-          <a:lstStyle/>
-          <a:p>
-            <a:r>
-              <a:rPr lang="en-US" dirty="0"/>
-              <a:t>95%</a:t>
-            </a:r>
-          </a:p>
-        </p:txBody>
-      </p:sp>
-      <p:sp>
-        <p:nvSpPr>
-          <p:cNvPr id="46" name="TextBox 45">
-            <a:extLst>
-              <a:ext uri="{FF2B5EF4-FFF2-40B4-BE49-F238E27FC236}">
-                <a16:creationId xmlns:a16="http://schemas.microsoft.com/office/drawing/2014/main" id="{E4554A69-8A88-AC48-93B6-EB6CAA239FE0}"/>
-              </a:ext>
-            </a:extLst>
-          </p:cNvPr>
-          <p:cNvSpPr txBox="1"/>
-          <p:nvPr/>
-        </p:nvSpPr>
-        <p:spPr>
-          <a:xfrm>
-            <a:off x="3729331" y="3636825"/>
-            <a:ext cx="466794" cy="369332"/>
-          </a:xfrm>
-          <a:prstGeom prst="rect">
-            <a:avLst/>
-          </a:prstGeom>
-          <a:noFill/>
-        </p:spPr>
-        <p:txBody>
-          <a:bodyPr wrap="none" rtlCol="0">
-            <a:spAutoFit/>
-          </a:bodyPr>
-          <a:lstStyle/>
-          <a:p>
-            <a:r>
-              <a:rPr lang="en-US" dirty="0"/>
-              <a:t>5%</a:t>
-            </a:r>
-          </a:p>
-        </p:txBody>
-      </p:sp>
-      <p:sp>
-        <p:nvSpPr>
           <p:cNvPr id="52" name="Rounded Rectangle 51">
             <a:extLst>
               <a:ext uri="{FF2B5EF4-FFF2-40B4-BE49-F238E27FC236}">
@@ -5287,76 +5150,6 @@
       </p:sp>
       <p:sp>
         <p:nvSpPr>
-          <p:cNvPr id="58" name="TextBox 57">
-            <a:extLst>
-              <a:ext uri="{FF2B5EF4-FFF2-40B4-BE49-F238E27FC236}">
-                <a16:creationId xmlns:a16="http://schemas.microsoft.com/office/drawing/2014/main" id="{0E823160-F618-A645-BF05-BFAACBA9E781}"/>
-              </a:ext>
-            </a:extLst>
-          </p:cNvPr>
-          <p:cNvSpPr txBox="1"/>
-          <p:nvPr/>
-        </p:nvSpPr>
-        <p:spPr>
-          <a:xfrm>
-            <a:off x="6164197" y="2718076"/>
-            <a:ext cx="583814" cy="369332"/>
-          </a:xfrm>
-          <a:prstGeom prst="rect">
-            <a:avLst/>
-          </a:prstGeom>
-          <a:noFill/>
-        </p:spPr>
-        <p:txBody>
-          <a:bodyPr wrap="none" rtlCol="0">
-            <a:spAutoFit/>
-          </a:bodyPr>
-          <a:lstStyle/>
-          <a:p>
-            <a:r>
-              <a:rPr lang="en-US" dirty="0"/>
-              <a:t>50%</a:t>
-            </a:r>
-          </a:p>
-        </p:txBody>
-      </p:sp>
-      <p:sp>
-        <p:nvSpPr>
-          <p:cNvPr id="59" name="TextBox 58">
-            <a:extLst>
-              <a:ext uri="{FF2B5EF4-FFF2-40B4-BE49-F238E27FC236}">
-                <a16:creationId xmlns:a16="http://schemas.microsoft.com/office/drawing/2014/main" id="{F6480A71-F901-A844-AF92-41E3F121C0E8}"/>
-              </a:ext>
-            </a:extLst>
-          </p:cNvPr>
-          <p:cNvSpPr txBox="1"/>
-          <p:nvPr/>
-        </p:nvSpPr>
-        <p:spPr>
-          <a:xfrm>
-            <a:off x="6164197" y="3636825"/>
-            <a:ext cx="583814" cy="369332"/>
-          </a:xfrm>
-          <a:prstGeom prst="rect">
-            <a:avLst/>
-          </a:prstGeom>
-          <a:noFill/>
-        </p:spPr>
-        <p:txBody>
-          <a:bodyPr wrap="none" rtlCol="0">
-            <a:spAutoFit/>
-          </a:bodyPr>
-          <a:lstStyle/>
-          <a:p>
-            <a:r>
-              <a:rPr lang="en-US" dirty="0"/>
-              <a:t>50%</a:t>
-            </a:r>
-          </a:p>
-        </p:txBody>
-      </p:sp>
-      <p:sp>
-        <p:nvSpPr>
           <p:cNvPr id="73" name="Rounded Rectangle 72">
             <a:extLst>
               <a:ext uri="{FF2B5EF4-FFF2-40B4-BE49-F238E27FC236}">
@@ -5808,76 +5601,6 @@
       </p:sp>
       <p:sp>
         <p:nvSpPr>
-          <p:cNvPr id="79" name="TextBox 78">
-            <a:extLst>
-              <a:ext uri="{FF2B5EF4-FFF2-40B4-BE49-F238E27FC236}">
-                <a16:creationId xmlns:a16="http://schemas.microsoft.com/office/drawing/2014/main" id="{366040A5-57BA-4B4F-B936-D45AAEB02C90}"/>
-              </a:ext>
-            </a:extLst>
-          </p:cNvPr>
-          <p:cNvSpPr txBox="1"/>
-          <p:nvPr/>
-        </p:nvSpPr>
-        <p:spPr>
-          <a:xfrm>
-            <a:off x="8607136" y="2718076"/>
-            <a:ext cx="466794" cy="369332"/>
-          </a:xfrm>
-          <a:prstGeom prst="rect">
-            <a:avLst/>
-          </a:prstGeom>
-          <a:noFill/>
-        </p:spPr>
-        <p:txBody>
-          <a:bodyPr wrap="none" rtlCol="0">
-            <a:spAutoFit/>
-          </a:bodyPr>
-          <a:lstStyle/>
-          <a:p>
-            <a:r>
-              <a:rPr lang="en-US" dirty="0"/>
-              <a:t>5%</a:t>
-            </a:r>
-          </a:p>
-        </p:txBody>
-      </p:sp>
-      <p:sp>
-        <p:nvSpPr>
-          <p:cNvPr id="80" name="TextBox 79">
-            <a:extLst>
-              <a:ext uri="{FF2B5EF4-FFF2-40B4-BE49-F238E27FC236}">
-                <a16:creationId xmlns:a16="http://schemas.microsoft.com/office/drawing/2014/main" id="{EB9DB672-B65D-614C-B586-65BF8B27B273}"/>
-              </a:ext>
-            </a:extLst>
-          </p:cNvPr>
-          <p:cNvSpPr txBox="1"/>
-          <p:nvPr/>
-        </p:nvSpPr>
-        <p:spPr>
-          <a:xfrm>
-            <a:off x="8548626" y="3636825"/>
-            <a:ext cx="583814" cy="369332"/>
-          </a:xfrm>
-          <a:prstGeom prst="rect">
-            <a:avLst/>
-          </a:prstGeom>
-          <a:noFill/>
-        </p:spPr>
-        <p:txBody>
-          <a:bodyPr wrap="none" rtlCol="0">
-            <a:spAutoFit/>
-          </a:bodyPr>
-          <a:lstStyle/>
-          <a:p>
-            <a:r>
-              <a:rPr lang="en-US" dirty="0"/>
-              <a:t>95%</a:t>
-            </a:r>
-          </a:p>
-        </p:txBody>
-      </p:sp>
-      <p:sp>
-        <p:nvSpPr>
           <p:cNvPr id="83" name="Rounded Rectangle 82">
             <a:extLst>
               <a:ext uri="{FF2B5EF4-FFF2-40B4-BE49-F238E27FC236}">
@@ -6315,41 +6038,6 @@
       </p:pic>
       <p:sp>
         <p:nvSpPr>
-          <p:cNvPr id="93" name="TextBox 92">
-            <a:extLst>
-              <a:ext uri="{FF2B5EF4-FFF2-40B4-BE49-F238E27FC236}">
-                <a16:creationId xmlns:a16="http://schemas.microsoft.com/office/drawing/2014/main" id="{CCC3F356-F758-8A46-855C-1C55E96C8528}"/>
-              </a:ext>
-            </a:extLst>
-          </p:cNvPr>
-          <p:cNvSpPr txBox="1"/>
-          <p:nvPr/>
-        </p:nvSpPr>
-        <p:spPr>
-          <a:xfrm>
-            <a:off x="10844159" y="3636825"/>
-            <a:ext cx="700833" cy="369332"/>
-          </a:xfrm>
-          <a:prstGeom prst="rect">
-            <a:avLst/>
-          </a:prstGeom>
-          <a:noFill/>
-        </p:spPr>
-        <p:txBody>
-          <a:bodyPr wrap="none" rtlCol="0">
-            <a:spAutoFit/>
-          </a:bodyPr>
-          <a:lstStyle/>
-          <a:p>
-            <a:r>
-              <a:rPr lang="en-US" dirty="0"/>
-              <a:t>100%</a:t>
-            </a:r>
-          </a:p>
-        </p:txBody>
-      </p:sp>
-      <p:sp>
-        <p:nvSpPr>
           <p:cNvPr id="2" name="TextBox 1">
             <a:extLst>
               <a:ext uri="{FF2B5EF4-FFF2-40B4-BE49-F238E27FC236}">
@@ -6704,77 +6392,6 @@
           <a:xfrm>
             <a:off x="9887531" y="4324650"/>
             <a:ext cx="570967" cy="570967"/>
-          </a:xfrm>
-          <a:prstGeom prst="rect">
-            <a:avLst/>
-          </a:prstGeom>
-        </p:spPr>
-      </p:pic>
-      <p:sp>
-        <p:nvSpPr>
-          <p:cNvPr id="78" name="TextBox 77">
-            <a:extLst>
-              <a:ext uri="{FF2B5EF4-FFF2-40B4-BE49-F238E27FC236}">
-                <a16:creationId xmlns:a16="http://schemas.microsoft.com/office/drawing/2014/main" id="{1E9698AE-BF42-2840-A538-EB7E852E91D1}"/>
-              </a:ext>
-            </a:extLst>
-          </p:cNvPr>
-          <p:cNvSpPr txBox="1"/>
-          <p:nvPr/>
-        </p:nvSpPr>
-        <p:spPr>
-          <a:xfrm>
-            <a:off x="10416177" y="2300125"/>
-            <a:ext cx="1163460" cy="369332"/>
-          </a:xfrm>
-          <a:prstGeom prst="rect">
-            <a:avLst/>
-          </a:prstGeom>
-          <a:noFill/>
-        </p:spPr>
-        <p:txBody>
-          <a:bodyPr wrap="none" rtlCol="0">
-            <a:spAutoFit/>
-          </a:bodyPr>
-          <a:lstStyle/>
-          <a:p>
-            <a:r>
-              <a:rPr lang="en-US" dirty="0"/>
-              <a:t>Objectives</a:t>
-            </a:r>
-          </a:p>
-        </p:txBody>
-      </p:sp>
-      <p:pic>
-        <p:nvPicPr>
-          <p:cNvPr id="82" name="Graphic 81" descr="Checkbox Checked">
-            <a:extLst>
-              <a:ext uri="{FF2B5EF4-FFF2-40B4-BE49-F238E27FC236}">
-                <a16:creationId xmlns:a16="http://schemas.microsoft.com/office/drawing/2014/main" id="{50D779AB-8353-EF44-A07A-8533C36BA3FC}"/>
-              </a:ext>
-            </a:extLst>
-          </p:cNvPr>
-          <p:cNvPicPr>
-            <a:picLocks noChangeAspect="1"/>
-          </p:cNvPicPr>
-          <p:nvPr/>
-        </p:nvPicPr>
-        <p:blipFill>
-          <a:blip r:embed="rId26">
-            <a:extLst>
-              <a:ext uri="{96DAC541-7B7A-43D3-8B79-37D633B846F1}">
-                <asvg:svgBlip xmlns:asvg="http://schemas.microsoft.com/office/drawing/2016/SVG/main" r:embed="rId27"/>
-              </a:ext>
-            </a:extLst>
-          </a:blip>
-          <a:stretch>
-            <a:fillRect/>
-          </a:stretch>
-        </p:blipFill>
-        <p:spPr>
-          <a:xfrm>
-            <a:off x="9906110" y="2217887"/>
-            <a:ext cx="533808" cy="533808"/>
           </a:xfrm>
           <a:prstGeom prst="rect">
             <a:avLst/>
@@ -6938,58 +6555,211 @@
       </p:sp>
       <p:sp>
         <p:nvSpPr>
-          <p:cNvPr id="3" name="Footer Placeholder 2">
-            <a:extLst>
-              <a:ext uri="{FF2B5EF4-FFF2-40B4-BE49-F238E27FC236}">
-                <a16:creationId xmlns:a16="http://schemas.microsoft.com/office/drawing/2014/main" id="{6CD5B0F5-4F5C-B942-B1FB-2E8F160CBE0B}"/>
-              </a:ext>
-            </a:extLst>
-          </p:cNvPr>
-          <p:cNvSpPr>
-            <a:spLocks noGrp="1"/>
-          </p:cNvSpPr>
-          <p:nvPr>
-            <p:ph type="ftr" sz="quarter" idx="11"/>
-          </p:nvPr>
-        </p:nvSpPr>
-        <p:spPr/>
-        <p:txBody>
-          <a:bodyPr/>
-          <a:lstStyle/>
-          <a:p>
-            <a:r>
-              <a:rPr lang="en-US"/>
-              <a:t>https://iter8.tools</a:t>
-            </a:r>
-          </a:p>
-        </p:txBody>
-      </p:sp>
-      <p:sp>
-        <p:nvSpPr>
-          <p:cNvPr id="12" name="Slide Number Placeholder 11">
-            <a:extLst>
-              <a:ext uri="{FF2B5EF4-FFF2-40B4-BE49-F238E27FC236}">
-                <a16:creationId xmlns:a16="http://schemas.microsoft.com/office/drawing/2014/main" id="{1E1F42DF-B1E4-9B4E-8702-367ED3F6DD77}"/>
-              </a:ext>
-            </a:extLst>
-          </p:cNvPr>
-          <p:cNvSpPr>
-            <a:spLocks noGrp="1"/>
-          </p:cNvSpPr>
-          <p:nvPr>
-            <p:ph type="sldNum" sz="quarter" idx="12"/>
-          </p:nvPr>
-        </p:nvSpPr>
-        <p:spPr/>
-        <p:txBody>
-          <a:bodyPr/>
-          <a:lstStyle/>
-          <a:p>
-            <a:fld id="{B78E2DF1-CA0F-8745-8AE1-A3A61670CB1B}" type="slidenum">
-              <a:rPr lang="en-US" smtClean="0"/>
-              <a:t>1</a:t>
-            </a:fld>
-            <a:endParaRPr lang="en-US"/>
+          <p:cNvPr id="3" name="TextBox 2">
+            <a:extLst>
+              <a:ext uri="{FF2B5EF4-FFF2-40B4-BE49-F238E27FC236}">
+                <a16:creationId xmlns:a16="http://schemas.microsoft.com/office/drawing/2014/main" id="{DCF174EC-17A8-8D48-A6DF-D51D51B90F7E}"/>
+              </a:ext>
+            </a:extLst>
+          </p:cNvPr>
+          <p:cNvSpPr txBox="1"/>
+          <p:nvPr/>
+        </p:nvSpPr>
+        <p:spPr>
+          <a:xfrm>
+            <a:off x="3742842" y="3624615"/>
+            <a:ext cx="466794" cy="369332"/>
+          </a:xfrm>
+          <a:prstGeom prst="rect">
+            <a:avLst/>
+          </a:prstGeom>
+          <a:noFill/>
+        </p:spPr>
+        <p:txBody>
+          <a:bodyPr wrap="none" rtlCol="0">
+            <a:spAutoFit/>
+          </a:bodyPr>
+          <a:lstStyle/>
+          <a:p>
+            <a:r>
+              <a:rPr lang="en-US" dirty="0"/>
+              <a:t>5%</a:t>
+            </a:r>
+          </a:p>
+        </p:txBody>
+      </p:sp>
+      <p:sp>
+        <p:nvSpPr>
+          <p:cNvPr id="61" name="TextBox 60">
+            <a:extLst>
+              <a:ext uri="{FF2B5EF4-FFF2-40B4-BE49-F238E27FC236}">
+                <a16:creationId xmlns:a16="http://schemas.microsoft.com/office/drawing/2014/main" id="{BD77C3CC-3C91-2F41-B6A7-A7E048391755}"/>
+              </a:ext>
+            </a:extLst>
+          </p:cNvPr>
+          <p:cNvSpPr txBox="1"/>
+          <p:nvPr/>
+        </p:nvSpPr>
+        <p:spPr>
+          <a:xfrm>
+            <a:off x="3684332" y="2710259"/>
+            <a:ext cx="583814" cy="369332"/>
+          </a:xfrm>
+          <a:prstGeom prst="rect">
+            <a:avLst/>
+          </a:prstGeom>
+          <a:noFill/>
+        </p:spPr>
+        <p:txBody>
+          <a:bodyPr wrap="none" rtlCol="0">
+            <a:spAutoFit/>
+          </a:bodyPr>
+          <a:lstStyle/>
+          <a:p>
+            <a:r>
+              <a:rPr lang="en-US" dirty="0"/>
+              <a:t>95%</a:t>
+            </a:r>
+          </a:p>
+        </p:txBody>
+      </p:sp>
+      <p:sp>
+        <p:nvSpPr>
+          <p:cNvPr id="62" name="TextBox 61">
+            <a:extLst>
+              <a:ext uri="{FF2B5EF4-FFF2-40B4-BE49-F238E27FC236}">
+                <a16:creationId xmlns:a16="http://schemas.microsoft.com/office/drawing/2014/main" id="{06D0B839-4629-C644-82A8-6D4BCE9BCCC8}"/>
+              </a:ext>
+            </a:extLst>
+          </p:cNvPr>
+          <p:cNvSpPr txBox="1"/>
+          <p:nvPr/>
+        </p:nvSpPr>
+        <p:spPr>
+          <a:xfrm>
+            <a:off x="6239765" y="3624615"/>
+            <a:ext cx="583814" cy="369332"/>
+          </a:xfrm>
+          <a:prstGeom prst="rect">
+            <a:avLst/>
+          </a:prstGeom>
+          <a:noFill/>
+        </p:spPr>
+        <p:txBody>
+          <a:bodyPr wrap="none" rtlCol="0">
+            <a:spAutoFit/>
+          </a:bodyPr>
+          <a:lstStyle/>
+          <a:p>
+            <a:r>
+              <a:rPr lang="en-US" dirty="0"/>
+              <a:t>25%</a:t>
+            </a:r>
+          </a:p>
+        </p:txBody>
+      </p:sp>
+      <p:sp>
+        <p:nvSpPr>
+          <p:cNvPr id="63" name="TextBox 62">
+            <a:extLst>
+              <a:ext uri="{FF2B5EF4-FFF2-40B4-BE49-F238E27FC236}">
+                <a16:creationId xmlns:a16="http://schemas.microsoft.com/office/drawing/2014/main" id="{44741819-482F-554D-9FBD-5BA4D6D66950}"/>
+              </a:ext>
+            </a:extLst>
+          </p:cNvPr>
+          <p:cNvSpPr txBox="1"/>
+          <p:nvPr/>
+        </p:nvSpPr>
+        <p:spPr>
+          <a:xfrm>
+            <a:off x="6239765" y="2710259"/>
+            <a:ext cx="583814" cy="369332"/>
+          </a:xfrm>
+          <a:prstGeom prst="rect">
+            <a:avLst/>
+          </a:prstGeom>
+          <a:noFill/>
+        </p:spPr>
+        <p:txBody>
+          <a:bodyPr wrap="none" rtlCol="0">
+            <a:spAutoFit/>
+          </a:bodyPr>
+          <a:lstStyle/>
+          <a:p>
+            <a:r>
+              <a:rPr lang="en-US" dirty="0"/>
+              <a:t>75%</a:t>
+            </a:r>
+          </a:p>
+        </p:txBody>
+      </p:sp>
+      <p:sp>
+        <p:nvSpPr>
+          <p:cNvPr id="66" name="TextBox 65">
+            <a:extLst>
+              <a:ext uri="{FF2B5EF4-FFF2-40B4-BE49-F238E27FC236}">
+                <a16:creationId xmlns:a16="http://schemas.microsoft.com/office/drawing/2014/main" id="{E8FEDBE2-4DAE-AD4F-9B68-19173D62C6B0}"/>
+              </a:ext>
+            </a:extLst>
+          </p:cNvPr>
+          <p:cNvSpPr txBox="1"/>
+          <p:nvPr/>
+        </p:nvSpPr>
+        <p:spPr>
+          <a:xfrm>
+            <a:off x="8621950" y="3624615"/>
+            <a:ext cx="583814" cy="369332"/>
+          </a:xfrm>
+          <a:prstGeom prst="rect">
+            <a:avLst/>
+          </a:prstGeom>
+          <a:noFill/>
+        </p:spPr>
+        <p:txBody>
+          <a:bodyPr wrap="none" rtlCol="0">
+            <a:spAutoFit/>
+          </a:bodyPr>
+          <a:lstStyle/>
+          <a:p>
+            <a:r>
+              <a:rPr lang="en-US" dirty="0"/>
+              <a:t>45%</a:t>
+            </a:r>
+          </a:p>
+        </p:txBody>
+      </p:sp>
+      <p:sp>
+        <p:nvSpPr>
+          <p:cNvPr id="67" name="TextBox 66">
+            <a:extLst>
+              <a:ext uri="{FF2B5EF4-FFF2-40B4-BE49-F238E27FC236}">
+                <a16:creationId xmlns:a16="http://schemas.microsoft.com/office/drawing/2014/main" id="{67A78B6F-E6C3-CD4C-9BDA-1FC404DA4477}"/>
+              </a:ext>
+            </a:extLst>
+          </p:cNvPr>
+          <p:cNvSpPr txBox="1"/>
+          <p:nvPr/>
+        </p:nvSpPr>
+        <p:spPr>
+          <a:xfrm>
+            <a:off x="8621950" y="2710259"/>
+            <a:ext cx="583814" cy="369332"/>
+          </a:xfrm>
+          <a:prstGeom prst="rect">
+            <a:avLst/>
+          </a:prstGeom>
+          <a:noFill/>
+        </p:spPr>
+        <p:txBody>
+          <a:bodyPr wrap="none" rtlCol="0">
+            <a:spAutoFit/>
+          </a:bodyPr>
+          <a:lstStyle/>
+          <a:p>
+            <a:r>
+              <a:rPr lang="en-US" dirty="0"/>
+              <a:t>55%</a:t>
+            </a:r>
           </a:p>
         </p:txBody>
       </p:sp>

</xml_diff>

<commit_message>
Initial commit for kfserving abtesting (#639)
</commit_message>
<xml_diff>
--- a/mkdocs/docs/images/src/canary-progressive-kubectl.pptx
+++ b/mkdocs/docs/images/src/canary-progressive-kubectl.pptx
@@ -197,7 +197,7 @@
           <a:p>
             <a:fld id="{38B78CBE-37FA-D241-BB4C-CAC5D3B25F49}" type="datetimeFigureOut">
               <a:rPr lang="en-US" smtClean="0"/>
-              <a:t>4/26/21</a:t>
+              <a:t>4/28/21</a:t>
             </a:fld>
             <a:endParaRPr lang="en-US"/>
           </a:p>
@@ -611,7 +611,7 @@
           <a:p>
             <a:fld id="{708812C5-0212-FD42-A0D4-E2E8FF4E3AF5}" type="datetime1">
               <a:rPr lang="en-US" smtClean="0"/>
-              <a:t>4/26/21</a:t>
+              <a:t>4/28/21</a:t>
             </a:fld>
             <a:endParaRPr lang="en-US"/>
           </a:p>
@@ -812,7 +812,7 @@
           <a:p>
             <a:fld id="{D232AC6F-41C3-B34B-9BAA-03ED2F3BC0F6}" type="datetime1">
               <a:rPr lang="en-US" smtClean="0"/>
-              <a:t>4/26/21</a:t>
+              <a:t>4/28/21</a:t>
             </a:fld>
             <a:endParaRPr lang="en-US"/>
           </a:p>
@@ -1023,7 +1023,7 @@
           <a:p>
             <a:fld id="{BEE140C2-F440-9D49-95CB-5965D64CC4A2}" type="datetime1">
               <a:rPr lang="en-US" smtClean="0"/>
-              <a:t>4/26/21</a:t>
+              <a:t>4/28/21</a:t>
             </a:fld>
             <a:endParaRPr lang="en-US"/>
           </a:p>
@@ -1224,7 +1224,7 @@
           <a:p>
             <a:fld id="{CC99F980-FB29-FD47-8508-150F73F1E8B0}" type="datetime1">
               <a:rPr lang="en-US" smtClean="0"/>
-              <a:t>4/26/21</a:t>
+              <a:t>4/28/21</a:t>
             </a:fld>
             <a:endParaRPr lang="en-US"/>
           </a:p>
@@ -1502,7 +1502,7 @@
           <a:p>
             <a:fld id="{D4510983-EA22-9643-8AC0-B3C6499B643B}" type="datetime1">
               <a:rPr lang="en-US" smtClean="0"/>
-              <a:t>4/26/21</a:t>
+              <a:t>4/28/21</a:t>
             </a:fld>
             <a:endParaRPr lang="en-US"/>
           </a:p>
@@ -1770,7 +1770,7 @@
           <a:p>
             <a:fld id="{D5A39195-967D-5D4E-8C6A-C99866996458}" type="datetime1">
               <a:rPr lang="en-US" smtClean="0"/>
-              <a:t>4/26/21</a:t>
+              <a:t>4/28/21</a:t>
             </a:fld>
             <a:endParaRPr lang="en-US"/>
           </a:p>
@@ -2185,7 +2185,7 @@
           <a:p>
             <a:fld id="{5AD771E9-C79D-684D-A158-5EB6E92DE947}" type="datetime1">
               <a:rPr lang="en-US" smtClean="0"/>
-              <a:t>4/26/21</a:t>
+              <a:t>4/28/21</a:t>
             </a:fld>
             <a:endParaRPr lang="en-US"/>
           </a:p>
@@ -2329,7 +2329,7 @@
           <a:p>
             <a:fld id="{693CA161-7E4C-5C4B-B799-DB602A0B9806}" type="datetime1">
               <a:rPr lang="en-US" smtClean="0"/>
-              <a:t>4/26/21</a:t>
+              <a:t>4/28/21</a:t>
             </a:fld>
             <a:endParaRPr lang="en-US"/>
           </a:p>
@@ -2445,7 +2445,7 @@
           <a:p>
             <a:fld id="{6D55FDF3-8BB2-6349-A5FA-057F3D78953D}" type="datetime1">
               <a:rPr lang="en-US" smtClean="0"/>
-              <a:t>4/26/21</a:t>
+              <a:t>4/28/21</a:t>
             </a:fld>
             <a:endParaRPr lang="en-US"/>
           </a:p>
@@ -2759,7 +2759,7 @@
           <a:p>
             <a:fld id="{EEDFACC0-3228-BA4B-942E-CEF38B0101FD}" type="datetime1">
               <a:rPr lang="en-US" smtClean="0"/>
-              <a:t>4/26/21</a:t>
+              <a:t>4/28/21</a:t>
             </a:fld>
             <a:endParaRPr lang="en-US"/>
           </a:p>
@@ -3050,7 +3050,7 @@
           <a:p>
             <a:fld id="{07EEEDBE-E24C-D140-B419-6D8D592D0F1C}" type="datetime1">
               <a:rPr lang="en-US" smtClean="0"/>
-              <a:t>4/26/21</a:t>
+              <a:t>4/28/21</a:t>
             </a:fld>
             <a:endParaRPr lang="en-US"/>
           </a:p>
@@ -3294,7 +3294,7 @@
           <a:p>
             <a:fld id="{E05781A2-A5EF-C54C-A3EF-F62483D37EDC}" type="datetime1">
               <a:rPr lang="en-US" smtClean="0"/>
-              <a:t>4/26/21</a:t>
+              <a:t>4/28/21</a:t>
             </a:fld>
             <a:endParaRPr lang="en-US"/>
           </a:p>
@@ -3729,8 +3729,8 @@
         </p:nvSpPr>
         <p:spPr>
           <a:xfrm>
-            <a:off x="0" y="1086522"/>
-            <a:ext cx="12191999" cy="5077610"/>
+            <a:off x="149603" y="1466858"/>
+            <a:ext cx="11879708" cy="4441415"/>
           </a:xfrm>
           <a:prstGeom prst="rect">
             <a:avLst/>
@@ -3771,38 +3771,6 @@
       </p:sp>
       <p:sp>
         <p:nvSpPr>
-          <p:cNvPr id="10" name="TextBox 9">
-            <a:extLst>
-              <a:ext uri="{FF2B5EF4-FFF2-40B4-BE49-F238E27FC236}">
-                <a16:creationId xmlns:a16="http://schemas.microsoft.com/office/drawing/2014/main" id="{AA0E52A5-8109-5744-8F63-4D4AE2E6294B}"/>
-              </a:ext>
-            </a:extLst>
-          </p:cNvPr>
-          <p:cNvSpPr txBox="1"/>
-          <p:nvPr/>
-        </p:nvSpPr>
-        <p:spPr>
-          <a:xfrm>
-            <a:off x="775252" y="89452"/>
-            <a:ext cx="184731" cy="369332"/>
-          </a:xfrm>
-          <a:prstGeom prst="rect">
-            <a:avLst/>
-          </a:prstGeom>
-          <a:noFill/>
-        </p:spPr>
-        <p:txBody>
-          <a:bodyPr wrap="none" rtlCol="0">
-            <a:spAutoFit/>
-          </a:bodyPr>
-          <a:lstStyle/>
-          <a:p>
-            <a:endParaRPr lang="en-US" dirty="0"/>
-          </a:p>
-        </p:txBody>
-      </p:sp>
-      <p:sp>
-        <p:nvSpPr>
           <p:cNvPr id="100" name="Rounded Rectangle 99">
             <a:extLst>
               <a:ext uri="{FF2B5EF4-FFF2-40B4-BE49-F238E27FC236}">
@@ -4127,41 +4095,6 @@
       </p:sp>
       <p:sp>
         <p:nvSpPr>
-          <p:cNvPr id="5" name="TextBox 4">
-            <a:extLst>
-              <a:ext uri="{FF2B5EF4-FFF2-40B4-BE49-F238E27FC236}">
-                <a16:creationId xmlns:a16="http://schemas.microsoft.com/office/drawing/2014/main" id="{2129025F-2A6A-8748-B81D-BDF446C06291}"/>
-              </a:ext>
-            </a:extLst>
-          </p:cNvPr>
-          <p:cNvSpPr txBox="1"/>
-          <p:nvPr/>
-        </p:nvSpPr>
-        <p:spPr>
-          <a:xfrm>
-            <a:off x="1825570" y="3761433"/>
-            <a:ext cx="1605504" cy="369332"/>
-          </a:xfrm>
-          <a:prstGeom prst="rect">
-            <a:avLst/>
-          </a:prstGeom>
-          <a:noFill/>
-        </p:spPr>
-        <p:txBody>
-          <a:bodyPr wrap="none" rtlCol="0">
-            <a:spAutoFit/>
-          </a:bodyPr>
-          <a:lstStyle/>
-          <a:p>
-            <a:r>
-              <a:rPr lang="en-US" dirty="0"/>
-              <a:t>Knative Service</a:t>
-            </a:r>
-          </a:p>
-        </p:txBody>
-      </p:sp>
-      <p:sp>
-        <p:nvSpPr>
           <p:cNvPr id="6" name="Rounded Rectangle 5">
             <a:extLst>
               <a:ext uri="{FF2B5EF4-FFF2-40B4-BE49-F238E27FC236}">
@@ -4970,76 +4903,6 @@
       </p:pic>
       <p:sp>
         <p:nvSpPr>
-          <p:cNvPr id="45" name="TextBox 44">
-            <a:extLst>
-              <a:ext uri="{FF2B5EF4-FFF2-40B4-BE49-F238E27FC236}">
-                <a16:creationId xmlns:a16="http://schemas.microsoft.com/office/drawing/2014/main" id="{1D400ADD-3BC0-4445-B1C6-E95A6E4EF991}"/>
-              </a:ext>
-            </a:extLst>
-          </p:cNvPr>
-          <p:cNvSpPr txBox="1"/>
-          <p:nvPr/>
-        </p:nvSpPr>
-        <p:spPr>
-          <a:xfrm>
-            <a:off x="3670821" y="2718076"/>
-            <a:ext cx="583814" cy="369332"/>
-          </a:xfrm>
-          <a:prstGeom prst="rect">
-            <a:avLst/>
-          </a:prstGeom>
-          <a:noFill/>
-        </p:spPr>
-        <p:txBody>
-          <a:bodyPr wrap="none" rtlCol="0">
-            <a:spAutoFit/>
-          </a:bodyPr>
-          <a:lstStyle/>
-          <a:p>
-            <a:r>
-              <a:rPr lang="en-US" dirty="0"/>
-              <a:t>95%</a:t>
-            </a:r>
-          </a:p>
-        </p:txBody>
-      </p:sp>
-      <p:sp>
-        <p:nvSpPr>
-          <p:cNvPr id="46" name="TextBox 45">
-            <a:extLst>
-              <a:ext uri="{FF2B5EF4-FFF2-40B4-BE49-F238E27FC236}">
-                <a16:creationId xmlns:a16="http://schemas.microsoft.com/office/drawing/2014/main" id="{E4554A69-8A88-AC48-93B6-EB6CAA239FE0}"/>
-              </a:ext>
-            </a:extLst>
-          </p:cNvPr>
-          <p:cNvSpPr txBox="1"/>
-          <p:nvPr/>
-        </p:nvSpPr>
-        <p:spPr>
-          <a:xfrm>
-            <a:off x="3729331" y="3636825"/>
-            <a:ext cx="466794" cy="369332"/>
-          </a:xfrm>
-          <a:prstGeom prst="rect">
-            <a:avLst/>
-          </a:prstGeom>
-          <a:noFill/>
-        </p:spPr>
-        <p:txBody>
-          <a:bodyPr wrap="none" rtlCol="0">
-            <a:spAutoFit/>
-          </a:bodyPr>
-          <a:lstStyle/>
-          <a:p>
-            <a:r>
-              <a:rPr lang="en-US" dirty="0"/>
-              <a:t>5%</a:t>
-            </a:r>
-          </a:p>
-        </p:txBody>
-      </p:sp>
-      <p:sp>
-        <p:nvSpPr>
           <p:cNvPr id="52" name="Rounded Rectangle 51">
             <a:extLst>
               <a:ext uri="{FF2B5EF4-FFF2-40B4-BE49-F238E27FC236}">
@@ -5287,76 +5150,6 @@
       </p:sp>
       <p:sp>
         <p:nvSpPr>
-          <p:cNvPr id="58" name="TextBox 57">
-            <a:extLst>
-              <a:ext uri="{FF2B5EF4-FFF2-40B4-BE49-F238E27FC236}">
-                <a16:creationId xmlns:a16="http://schemas.microsoft.com/office/drawing/2014/main" id="{0E823160-F618-A645-BF05-BFAACBA9E781}"/>
-              </a:ext>
-            </a:extLst>
-          </p:cNvPr>
-          <p:cNvSpPr txBox="1"/>
-          <p:nvPr/>
-        </p:nvSpPr>
-        <p:spPr>
-          <a:xfrm>
-            <a:off x="6164197" y="2718076"/>
-            <a:ext cx="583814" cy="369332"/>
-          </a:xfrm>
-          <a:prstGeom prst="rect">
-            <a:avLst/>
-          </a:prstGeom>
-          <a:noFill/>
-        </p:spPr>
-        <p:txBody>
-          <a:bodyPr wrap="none" rtlCol="0">
-            <a:spAutoFit/>
-          </a:bodyPr>
-          <a:lstStyle/>
-          <a:p>
-            <a:r>
-              <a:rPr lang="en-US" dirty="0"/>
-              <a:t>50%</a:t>
-            </a:r>
-          </a:p>
-        </p:txBody>
-      </p:sp>
-      <p:sp>
-        <p:nvSpPr>
-          <p:cNvPr id="59" name="TextBox 58">
-            <a:extLst>
-              <a:ext uri="{FF2B5EF4-FFF2-40B4-BE49-F238E27FC236}">
-                <a16:creationId xmlns:a16="http://schemas.microsoft.com/office/drawing/2014/main" id="{F6480A71-F901-A844-AF92-41E3F121C0E8}"/>
-              </a:ext>
-            </a:extLst>
-          </p:cNvPr>
-          <p:cNvSpPr txBox="1"/>
-          <p:nvPr/>
-        </p:nvSpPr>
-        <p:spPr>
-          <a:xfrm>
-            <a:off x="6164197" y="3636825"/>
-            <a:ext cx="583814" cy="369332"/>
-          </a:xfrm>
-          <a:prstGeom prst="rect">
-            <a:avLst/>
-          </a:prstGeom>
-          <a:noFill/>
-        </p:spPr>
-        <p:txBody>
-          <a:bodyPr wrap="none" rtlCol="0">
-            <a:spAutoFit/>
-          </a:bodyPr>
-          <a:lstStyle/>
-          <a:p>
-            <a:r>
-              <a:rPr lang="en-US" dirty="0"/>
-              <a:t>50%</a:t>
-            </a:r>
-          </a:p>
-        </p:txBody>
-      </p:sp>
-      <p:sp>
-        <p:nvSpPr>
           <p:cNvPr id="73" name="Rounded Rectangle 72">
             <a:extLst>
               <a:ext uri="{FF2B5EF4-FFF2-40B4-BE49-F238E27FC236}">
@@ -5808,76 +5601,6 @@
       </p:sp>
       <p:sp>
         <p:nvSpPr>
-          <p:cNvPr id="79" name="TextBox 78">
-            <a:extLst>
-              <a:ext uri="{FF2B5EF4-FFF2-40B4-BE49-F238E27FC236}">
-                <a16:creationId xmlns:a16="http://schemas.microsoft.com/office/drawing/2014/main" id="{366040A5-57BA-4B4F-B936-D45AAEB02C90}"/>
-              </a:ext>
-            </a:extLst>
-          </p:cNvPr>
-          <p:cNvSpPr txBox="1"/>
-          <p:nvPr/>
-        </p:nvSpPr>
-        <p:spPr>
-          <a:xfrm>
-            <a:off x="8607136" y="2718076"/>
-            <a:ext cx="466794" cy="369332"/>
-          </a:xfrm>
-          <a:prstGeom prst="rect">
-            <a:avLst/>
-          </a:prstGeom>
-          <a:noFill/>
-        </p:spPr>
-        <p:txBody>
-          <a:bodyPr wrap="none" rtlCol="0">
-            <a:spAutoFit/>
-          </a:bodyPr>
-          <a:lstStyle/>
-          <a:p>
-            <a:r>
-              <a:rPr lang="en-US" dirty="0"/>
-              <a:t>5%</a:t>
-            </a:r>
-          </a:p>
-        </p:txBody>
-      </p:sp>
-      <p:sp>
-        <p:nvSpPr>
-          <p:cNvPr id="80" name="TextBox 79">
-            <a:extLst>
-              <a:ext uri="{FF2B5EF4-FFF2-40B4-BE49-F238E27FC236}">
-                <a16:creationId xmlns:a16="http://schemas.microsoft.com/office/drawing/2014/main" id="{EB9DB672-B65D-614C-B586-65BF8B27B273}"/>
-              </a:ext>
-            </a:extLst>
-          </p:cNvPr>
-          <p:cNvSpPr txBox="1"/>
-          <p:nvPr/>
-        </p:nvSpPr>
-        <p:spPr>
-          <a:xfrm>
-            <a:off x="8548626" y="3636825"/>
-            <a:ext cx="583814" cy="369332"/>
-          </a:xfrm>
-          <a:prstGeom prst="rect">
-            <a:avLst/>
-          </a:prstGeom>
-          <a:noFill/>
-        </p:spPr>
-        <p:txBody>
-          <a:bodyPr wrap="none" rtlCol="0">
-            <a:spAutoFit/>
-          </a:bodyPr>
-          <a:lstStyle/>
-          <a:p>
-            <a:r>
-              <a:rPr lang="en-US" dirty="0"/>
-              <a:t>95%</a:t>
-            </a:r>
-          </a:p>
-        </p:txBody>
-      </p:sp>
-      <p:sp>
-        <p:nvSpPr>
           <p:cNvPr id="83" name="Rounded Rectangle 82">
             <a:extLst>
               <a:ext uri="{FF2B5EF4-FFF2-40B4-BE49-F238E27FC236}">
@@ -6315,41 +6038,6 @@
       </p:pic>
       <p:sp>
         <p:nvSpPr>
-          <p:cNvPr id="93" name="TextBox 92">
-            <a:extLst>
-              <a:ext uri="{FF2B5EF4-FFF2-40B4-BE49-F238E27FC236}">
-                <a16:creationId xmlns:a16="http://schemas.microsoft.com/office/drawing/2014/main" id="{CCC3F356-F758-8A46-855C-1C55E96C8528}"/>
-              </a:ext>
-            </a:extLst>
-          </p:cNvPr>
-          <p:cNvSpPr txBox="1"/>
-          <p:nvPr/>
-        </p:nvSpPr>
-        <p:spPr>
-          <a:xfrm>
-            <a:off x="10844159" y="3636825"/>
-            <a:ext cx="700833" cy="369332"/>
-          </a:xfrm>
-          <a:prstGeom prst="rect">
-            <a:avLst/>
-          </a:prstGeom>
-          <a:noFill/>
-        </p:spPr>
-        <p:txBody>
-          <a:bodyPr wrap="none" rtlCol="0">
-            <a:spAutoFit/>
-          </a:bodyPr>
-          <a:lstStyle/>
-          <a:p>
-            <a:r>
-              <a:rPr lang="en-US" dirty="0"/>
-              <a:t>100%</a:t>
-            </a:r>
-          </a:p>
-        </p:txBody>
-      </p:sp>
-      <p:sp>
-        <p:nvSpPr>
           <p:cNvPr id="2" name="TextBox 1">
             <a:extLst>
               <a:ext uri="{FF2B5EF4-FFF2-40B4-BE49-F238E27FC236}">
@@ -6704,77 +6392,6 @@
           <a:xfrm>
             <a:off x="9887531" y="4324650"/>
             <a:ext cx="570967" cy="570967"/>
-          </a:xfrm>
-          <a:prstGeom prst="rect">
-            <a:avLst/>
-          </a:prstGeom>
-        </p:spPr>
-      </p:pic>
-      <p:sp>
-        <p:nvSpPr>
-          <p:cNvPr id="78" name="TextBox 77">
-            <a:extLst>
-              <a:ext uri="{FF2B5EF4-FFF2-40B4-BE49-F238E27FC236}">
-                <a16:creationId xmlns:a16="http://schemas.microsoft.com/office/drawing/2014/main" id="{1E9698AE-BF42-2840-A538-EB7E852E91D1}"/>
-              </a:ext>
-            </a:extLst>
-          </p:cNvPr>
-          <p:cNvSpPr txBox="1"/>
-          <p:nvPr/>
-        </p:nvSpPr>
-        <p:spPr>
-          <a:xfrm>
-            <a:off x="10416177" y="2300125"/>
-            <a:ext cx="1163460" cy="369332"/>
-          </a:xfrm>
-          <a:prstGeom prst="rect">
-            <a:avLst/>
-          </a:prstGeom>
-          <a:noFill/>
-        </p:spPr>
-        <p:txBody>
-          <a:bodyPr wrap="none" rtlCol="0">
-            <a:spAutoFit/>
-          </a:bodyPr>
-          <a:lstStyle/>
-          <a:p>
-            <a:r>
-              <a:rPr lang="en-US" dirty="0"/>
-              <a:t>Objectives</a:t>
-            </a:r>
-          </a:p>
-        </p:txBody>
-      </p:sp>
-      <p:pic>
-        <p:nvPicPr>
-          <p:cNvPr id="82" name="Graphic 81" descr="Checkbox Checked">
-            <a:extLst>
-              <a:ext uri="{FF2B5EF4-FFF2-40B4-BE49-F238E27FC236}">
-                <a16:creationId xmlns:a16="http://schemas.microsoft.com/office/drawing/2014/main" id="{50D779AB-8353-EF44-A07A-8533C36BA3FC}"/>
-              </a:ext>
-            </a:extLst>
-          </p:cNvPr>
-          <p:cNvPicPr>
-            <a:picLocks noChangeAspect="1"/>
-          </p:cNvPicPr>
-          <p:nvPr/>
-        </p:nvPicPr>
-        <p:blipFill>
-          <a:blip r:embed="rId26">
-            <a:extLst>
-              <a:ext uri="{96DAC541-7B7A-43D3-8B79-37D633B846F1}">
-                <asvg:svgBlip xmlns:asvg="http://schemas.microsoft.com/office/drawing/2016/SVG/main" r:embed="rId27"/>
-              </a:ext>
-            </a:extLst>
-          </a:blip>
-          <a:stretch>
-            <a:fillRect/>
-          </a:stretch>
-        </p:blipFill>
-        <p:spPr>
-          <a:xfrm>
-            <a:off x="9906110" y="2217887"/>
-            <a:ext cx="533808" cy="533808"/>
           </a:xfrm>
           <a:prstGeom prst="rect">
             <a:avLst/>
@@ -6938,58 +6555,211 @@
       </p:sp>
       <p:sp>
         <p:nvSpPr>
-          <p:cNvPr id="3" name="Footer Placeholder 2">
-            <a:extLst>
-              <a:ext uri="{FF2B5EF4-FFF2-40B4-BE49-F238E27FC236}">
-                <a16:creationId xmlns:a16="http://schemas.microsoft.com/office/drawing/2014/main" id="{6CD5B0F5-4F5C-B942-B1FB-2E8F160CBE0B}"/>
-              </a:ext>
-            </a:extLst>
-          </p:cNvPr>
-          <p:cNvSpPr>
-            <a:spLocks noGrp="1"/>
-          </p:cNvSpPr>
-          <p:nvPr>
-            <p:ph type="ftr" sz="quarter" idx="11"/>
-          </p:nvPr>
-        </p:nvSpPr>
-        <p:spPr/>
-        <p:txBody>
-          <a:bodyPr/>
-          <a:lstStyle/>
-          <a:p>
-            <a:r>
-              <a:rPr lang="en-US"/>
-              <a:t>https://iter8.tools</a:t>
-            </a:r>
-          </a:p>
-        </p:txBody>
-      </p:sp>
-      <p:sp>
-        <p:nvSpPr>
-          <p:cNvPr id="12" name="Slide Number Placeholder 11">
-            <a:extLst>
-              <a:ext uri="{FF2B5EF4-FFF2-40B4-BE49-F238E27FC236}">
-                <a16:creationId xmlns:a16="http://schemas.microsoft.com/office/drawing/2014/main" id="{1E1F42DF-B1E4-9B4E-8702-367ED3F6DD77}"/>
-              </a:ext>
-            </a:extLst>
-          </p:cNvPr>
-          <p:cNvSpPr>
-            <a:spLocks noGrp="1"/>
-          </p:cNvSpPr>
-          <p:nvPr>
-            <p:ph type="sldNum" sz="quarter" idx="12"/>
-          </p:nvPr>
-        </p:nvSpPr>
-        <p:spPr/>
-        <p:txBody>
-          <a:bodyPr/>
-          <a:lstStyle/>
-          <a:p>
-            <a:fld id="{B78E2DF1-CA0F-8745-8AE1-A3A61670CB1B}" type="slidenum">
-              <a:rPr lang="en-US" smtClean="0"/>
-              <a:t>1</a:t>
-            </a:fld>
-            <a:endParaRPr lang="en-US"/>
+          <p:cNvPr id="3" name="TextBox 2">
+            <a:extLst>
+              <a:ext uri="{FF2B5EF4-FFF2-40B4-BE49-F238E27FC236}">
+                <a16:creationId xmlns:a16="http://schemas.microsoft.com/office/drawing/2014/main" id="{DCF174EC-17A8-8D48-A6DF-D51D51B90F7E}"/>
+              </a:ext>
+            </a:extLst>
+          </p:cNvPr>
+          <p:cNvSpPr txBox="1"/>
+          <p:nvPr/>
+        </p:nvSpPr>
+        <p:spPr>
+          <a:xfrm>
+            <a:off x="3742842" y="3624615"/>
+            <a:ext cx="466794" cy="369332"/>
+          </a:xfrm>
+          <a:prstGeom prst="rect">
+            <a:avLst/>
+          </a:prstGeom>
+          <a:noFill/>
+        </p:spPr>
+        <p:txBody>
+          <a:bodyPr wrap="none" rtlCol="0">
+            <a:spAutoFit/>
+          </a:bodyPr>
+          <a:lstStyle/>
+          <a:p>
+            <a:r>
+              <a:rPr lang="en-US" dirty="0"/>
+              <a:t>5%</a:t>
+            </a:r>
+          </a:p>
+        </p:txBody>
+      </p:sp>
+      <p:sp>
+        <p:nvSpPr>
+          <p:cNvPr id="61" name="TextBox 60">
+            <a:extLst>
+              <a:ext uri="{FF2B5EF4-FFF2-40B4-BE49-F238E27FC236}">
+                <a16:creationId xmlns:a16="http://schemas.microsoft.com/office/drawing/2014/main" id="{BD77C3CC-3C91-2F41-B6A7-A7E048391755}"/>
+              </a:ext>
+            </a:extLst>
+          </p:cNvPr>
+          <p:cNvSpPr txBox="1"/>
+          <p:nvPr/>
+        </p:nvSpPr>
+        <p:spPr>
+          <a:xfrm>
+            <a:off x="3684332" y="2710259"/>
+            <a:ext cx="583814" cy="369332"/>
+          </a:xfrm>
+          <a:prstGeom prst="rect">
+            <a:avLst/>
+          </a:prstGeom>
+          <a:noFill/>
+        </p:spPr>
+        <p:txBody>
+          <a:bodyPr wrap="none" rtlCol="0">
+            <a:spAutoFit/>
+          </a:bodyPr>
+          <a:lstStyle/>
+          <a:p>
+            <a:r>
+              <a:rPr lang="en-US" dirty="0"/>
+              <a:t>95%</a:t>
+            </a:r>
+          </a:p>
+        </p:txBody>
+      </p:sp>
+      <p:sp>
+        <p:nvSpPr>
+          <p:cNvPr id="62" name="TextBox 61">
+            <a:extLst>
+              <a:ext uri="{FF2B5EF4-FFF2-40B4-BE49-F238E27FC236}">
+                <a16:creationId xmlns:a16="http://schemas.microsoft.com/office/drawing/2014/main" id="{06D0B839-4629-C644-82A8-6D4BCE9BCCC8}"/>
+              </a:ext>
+            </a:extLst>
+          </p:cNvPr>
+          <p:cNvSpPr txBox="1"/>
+          <p:nvPr/>
+        </p:nvSpPr>
+        <p:spPr>
+          <a:xfrm>
+            <a:off x="6239765" y="3624615"/>
+            <a:ext cx="583814" cy="369332"/>
+          </a:xfrm>
+          <a:prstGeom prst="rect">
+            <a:avLst/>
+          </a:prstGeom>
+          <a:noFill/>
+        </p:spPr>
+        <p:txBody>
+          <a:bodyPr wrap="none" rtlCol="0">
+            <a:spAutoFit/>
+          </a:bodyPr>
+          <a:lstStyle/>
+          <a:p>
+            <a:r>
+              <a:rPr lang="en-US" dirty="0"/>
+              <a:t>25%</a:t>
+            </a:r>
+          </a:p>
+        </p:txBody>
+      </p:sp>
+      <p:sp>
+        <p:nvSpPr>
+          <p:cNvPr id="63" name="TextBox 62">
+            <a:extLst>
+              <a:ext uri="{FF2B5EF4-FFF2-40B4-BE49-F238E27FC236}">
+                <a16:creationId xmlns:a16="http://schemas.microsoft.com/office/drawing/2014/main" id="{44741819-482F-554D-9FBD-5BA4D6D66950}"/>
+              </a:ext>
+            </a:extLst>
+          </p:cNvPr>
+          <p:cNvSpPr txBox="1"/>
+          <p:nvPr/>
+        </p:nvSpPr>
+        <p:spPr>
+          <a:xfrm>
+            <a:off x="6239765" y="2710259"/>
+            <a:ext cx="583814" cy="369332"/>
+          </a:xfrm>
+          <a:prstGeom prst="rect">
+            <a:avLst/>
+          </a:prstGeom>
+          <a:noFill/>
+        </p:spPr>
+        <p:txBody>
+          <a:bodyPr wrap="none" rtlCol="0">
+            <a:spAutoFit/>
+          </a:bodyPr>
+          <a:lstStyle/>
+          <a:p>
+            <a:r>
+              <a:rPr lang="en-US" dirty="0"/>
+              <a:t>75%</a:t>
+            </a:r>
+          </a:p>
+        </p:txBody>
+      </p:sp>
+      <p:sp>
+        <p:nvSpPr>
+          <p:cNvPr id="66" name="TextBox 65">
+            <a:extLst>
+              <a:ext uri="{FF2B5EF4-FFF2-40B4-BE49-F238E27FC236}">
+                <a16:creationId xmlns:a16="http://schemas.microsoft.com/office/drawing/2014/main" id="{E8FEDBE2-4DAE-AD4F-9B68-19173D62C6B0}"/>
+              </a:ext>
+            </a:extLst>
+          </p:cNvPr>
+          <p:cNvSpPr txBox="1"/>
+          <p:nvPr/>
+        </p:nvSpPr>
+        <p:spPr>
+          <a:xfrm>
+            <a:off x="8621950" y="3624615"/>
+            <a:ext cx="583814" cy="369332"/>
+          </a:xfrm>
+          <a:prstGeom prst="rect">
+            <a:avLst/>
+          </a:prstGeom>
+          <a:noFill/>
+        </p:spPr>
+        <p:txBody>
+          <a:bodyPr wrap="none" rtlCol="0">
+            <a:spAutoFit/>
+          </a:bodyPr>
+          <a:lstStyle/>
+          <a:p>
+            <a:r>
+              <a:rPr lang="en-US" dirty="0"/>
+              <a:t>45%</a:t>
+            </a:r>
+          </a:p>
+        </p:txBody>
+      </p:sp>
+      <p:sp>
+        <p:nvSpPr>
+          <p:cNvPr id="67" name="TextBox 66">
+            <a:extLst>
+              <a:ext uri="{FF2B5EF4-FFF2-40B4-BE49-F238E27FC236}">
+                <a16:creationId xmlns:a16="http://schemas.microsoft.com/office/drawing/2014/main" id="{67A78B6F-E6C3-CD4C-9BDA-1FC404DA4477}"/>
+              </a:ext>
+            </a:extLst>
+          </p:cNvPr>
+          <p:cNvSpPr txBox="1"/>
+          <p:nvPr/>
+        </p:nvSpPr>
+        <p:spPr>
+          <a:xfrm>
+            <a:off x="8621950" y="2710259"/>
+            <a:ext cx="583814" cy="369332"/>
+          </a:xfrm>
+          <a:prstGeom prst="rect">
+            <a:avLst/>
+          </a:prstGeom>
+          <a:noFill/>
+        </p:spPr>
+        <p:txBody>
+          <a:bodyPr wrap="none" rtlCol="0">
+            <a:spAutoFit/>
+          </a:bodyPr>
+          <a:lstStyle/>
+          <a:p>
+            <a:r>
+              <a:rPr lang="en-US" dirty="0"/>
+              <a:t>55%</a:t>
+            </a:r>
           </a:p>
         </p:txBody>
       </p:sp>

</xml_diff>

<commit_message>
Changes to canary tutorial
</commit_message>
<xml_diff>
--- a/mkdocs/docs/images/src/canary-progressive-kubectl.pptx
+++ b/mkdocs/docs/images/src/canary-progressive-kubectl.pptx
@@ -197,7 +197,7 @@
           <a:p>
             <a:fld id="{38B78CBE-37FA-D241-BB4C-CAC5D3B25F49}" type="datetimeFigureOut">
               <a:rPr lang="en-US" smtClean="0"/>
-              <a:t>4/28/21</a:t>
+              <a:t>5/5/21</a:t>
             </a:fld>
             <a:endParaRPr lang="en-US"/>
           </a:p>
@@ -611,7 +611,7 @@
           <a:p>
             <a:fld id="{708812C5-0212-FD42-A0D4-E2E8FF4E3AF5}" type="datetime1">
               <a:rPr lang="en-US" smtClean="0"/>
-              <a:t>4/28/21</a:t>
+              <a:t>5/5/21</a:t>
             </a:fld>
             <a:endParaRPr lang="en-US"/>
           </a:p>
@@ -812,7 +812,7 @@
           <a:p>
             <a:fld id="{D232AC6F-41C3-B34B-9BAA-03ED2F3BC0F6}" type="datetime1">
               <a:rPr lang="en-US" smtClean="0"/>
-              <a:t>4/28/21</a:t>
+              <a:t>5/5/21</a:t>
             </a:fld>
             <a:endParaRPr lang="en-US"/>
           </a:p>
@@ -1023,7 +1023,7 @@
           <a:p>
             <a:fld id="{BEE140C2-F440-9D49-95CB-5965D64CC4A2}" type="datetime1">
               <a:rPr lang="en-US" smtClean="0"/>
-              <a:t>4/28/21</a:t>
+              <a:t>5/5/21</a:t>
             </a:fld>
             <a:endParaRPr lang="en-US"/>
           </a:p>
@@ -1224,7 +1224,7 @@
           <a:p>
             <a:fld id="{CC99F980-FB29-FD47-8508-150F73F1E8B0}" type="datetime1">
               <a:rPr lang="en-US" smtClean="0"/>
-              <a:t>4/28/21</a:t>
+              <a:t>5/5/21</a:t>
             </a:fld>
             <a:endParaRPr lang="en-US"/>
           </a:p>
@@ -1502,7 +1502,7 @@
           <a:p>
             <a:fld id="{D4510983-EA22-9643-8AC0-B3C6499B643B}" type="datetime1">
               <a:rPr lang="en-US" smtClean="0"/>
-              <a:t>4/28/21</a:t>
+              <a:t>5/5/21</a:t>
             </a:fld>
             <a:endParaRPr lang="en-US"/>
           </a:p>
@@ -1770,7 +1770,7 @@
           <a:p>
             <a:fld id="{D5A39195-967D-5D4E-8C6A-C99866996458}" type="datetime1">
               <a:rPr lang="en-US" smtClean="0"/>
-              <a:t>4/28/21</a:t>
+              <a:t>5/5/21</a:t>
             </a:fld>
             <a:endParaRPr lang="en-US"/>
           </a:p>
@@ -2185,7 +2185,7 @@
           <a:p>
             <a:fld id="{5AD771E9-C79D-684D-A158-5EB6E92DE947}" type="datetime1">
               <a:rPr lang="en-US" smtClean="0"/>
-              <a:t>4/28/21</a:t>
+              <a:t>5/5/21</a:t>
             </a:fld>
             <a:endParaRPr lang="en-US"/>
           </a:p>
@@ -2329,7 +2329,7 @@
           <a:p>
             <a:fld id="{693CA161-7E4C-5C4B-B799-DB602A0B9806}" type="datetime1">
               <a:rPr lang="en-US" smtClean="0"/>
-              <a:t>4/28/21</a:t>
+              <a:t>5/5/21</a:t>
             </a:fld>
             <a:endParaRPr lang="en-US"/>
           </a:p>
@@ -2445,7 +2445,7 @@
           <a:p>
             <a:fld id="{6D55FDF3-8BB2-6349-A5FA-057F3D78953D}" type="datetime1">
               <a:rPr lang="en-US" smtClean="0"/>
-              <a:t>4/28/21</a:t>
+              <a:t>5/5/21</a:t>
             </a:fld>
             <a:endParaRPr lang="en-US"/>
           </a:p>
@@ -2759,7 +2759,7 @@
           <a:p>
             <a:fld id="{EEDFACC0-3228-BA4B-942E-CEF38B0101FD}" type="datetime1">
               <a:rPr lang="en-US" smtClean="0"/>
-              <a:t>4/28/21</a:t>
+              <a:t>5/5/21</a:t>
             </a:fld>
             <a:endParaRPr lang="en-US"/>
           </a:p>
@@ -3050,7 +3050,7 @@
           <a:p>
             <a:fld id="{07EEEDBE-E24C-D140-B419-6D8D592D0F1C}" type="datetime1">
               <a:rPr lang="en-US" smtClean="0"/>
-              <a:t>4/28/21</a:t>
+              <a:t>5/5/21</a:t>
             </a:fld>
             <a:endParaRPr lang="en-US"/>
           </a:p>
@@ -3294,7 +3294,7 @@
           <a:p>
             <a:fld id="{E05781A2-A5EF-C54C-A3EF-F62483D37EDC}" type="datetime1">
               <a:rPr lang="en-US" smtClean="0"/>
-              <a:t>4/28/21</a:t>
+              <a:t>5/5/21</a:t>
             </a:fld>
             <a:endParaRPr lang="en-US"/>
           </a:p>
@@ -3717,10 +3717,10 @@
       </p:grpSpPr>
       <p:sp>
         <p:nvSpPr>
-          <p:cNvPr id="11" name="Rectangle 10">
-            <a:extLst>
-              <a:ext uri="{FF2B5EF4-FFF2-40B4-BE49-F238E27FC236}">
-                <a16:creationId xmlns:a16="http://schemas.microsoft.com/office/drawing/2014/main" id="{65137B27-89CA-7447-8A02-1607A375D4DA}"/>
+          <p:cNvPr id="107" name="Rounded Rectangle 106">
+            <a:extLst>
+              <a:ext uri="{FF2B5EF4-FFF2-40B4-BE49-F238E27FC236}">
+                <a16:creationId xmlns:a16="http://schemas.microsoft.com/office/drawing/2014/main" id="{03C45863-0316-414B-96FB-107D9CA13B88}"/>
               </a:ext>
             </a:extLst>
           </p:cNvPr>
@@ -3729,10 +3729,10 @@
         </p:nvSpPr>
         <p:spPr>
           <a:xfrm>
-            <a:off x="149603" y="1466858"/>
-            <a:ext cx="11879708" cy="4441415"/>
-          </a:xfrm>
-          <a:prstGeom prst="rect">
+            <a:off x="9659296" y="3208270"/>
+            <a:ext cx="816445" cy="1041636"/>
+          </a:xfrm>
+          <a:prstGeom prst="roundRect">
             <a:avLst/>
           </a:prstGeom>
           <a:solidFill>
@@ -3764,17 +3764,46 @@
           <a:bodyPr rtlCol="0" anchor="ctr"/>
           <a:lstStyle/>
           <a:p>
-            <a:pPr algn="ctr"/>
-            <a:endParaRPr lang="en-US"/>
-          </a:p>
-        </p:txBody>
-      </p:sp>
-      <p:sp>
-        <p:nvSpPr>
-          <p:cNvPr id="100" name="Rounded Rectangle 99">
-            <a:extLst>
-              <a:ext uri="{FF2B5EF4-FFF2-40B4-BE49-F238E27FC236}">
-                <a16:creationId xmlns:a16="http://schemas.microsoft.com/office/drawing/2014/main" id="{B819D5F6-78E5-9845-9F41-90858B3A04DA}"/>
+            <a:pPr marL="0" marR="0" lvl="0" indent="0" algn="ctr" defTabSz="914400" rtl="0" eaLnBrk="1" fontAlgn="auto" latinLnBrk="0" hangingPunct="1">
+              <a:lnSpc>
+                <a:spcPct val="100000"/>
+              </a:lnSpc>
+              <a:spcBef>
+                <a:spcPts val="0"/>
+              </a:spcBef>
+              <a:spcAft>
+                <a:spcPts val="0"/>
+              </a:spcAft>
+              <a:buClrTx/>
+              <a:buSzTx/>
+              <a:buFontTx/>
+              <a:buNone/>
+              <a:tabLst/>
+              <a:defRPr/>
+            </a:pPr>
+            <a:endParaRPr kumimoji="0" lang="en-US" sz="1800" b="0" i="0" u="none" strike="noStrike" kern="1200" cap="none" spc="0" normalizeH="0" baseline="0" noProof="0">
+              <a:ln>
+                <a:noFill/>
+              </a:ln>
+              <a:solidFill>
+                <a:prstClr val="white"/>
+              </a:solidFill>
+              <a:effectLst/>
+              <a:uLnTx/>
+              <a:uFillTx/>
+              <a:latin typeface="Calibri" panose="020F0502020204030204"/>
+              <a:ea typeface="+mn-ea"/>
+              <a:cs typeface="+mn-cs"/>
+            </a:endParaRPr>
+          </a:p>
+        </p:txBody>
+      </p:sp>
+      <p:sp>
+        <p:nvSpPr>
+          <p:cNvPr id="11" name="Rectangle 10">
+            <a:extLst>
+              <a:ext uri="{FF2B5EF4-FFF2-40B4-BE49-F238E27FC236}">
+                <a16:creationId xmlns:a16="http://schemas.microsoft.com/office/drawing/2014/main" id="{65137B27-89CA-7447-8A02-1607A375D4DA}"/>
               </a:ext>
             </a:extLst>
           </p:cNvPr>
@@ -3783,23 +3812,18 @@
         </p:nvSpPr>
         <p:spPr>
           <a:xfrm>
-            <a:off x="8384562" y="4026533"/>
-            <a:ext cx="1170215" cy="674914"/>
-          </a:xfrm>
-          <a:prstGeom prst="roundRect">
+            <a:off x="118072" y="1466858"/>
+            <a:ext cx="11984217" cy="4441415"/>
+          </a:xfrm>
+          <a:prstGeom prst="rect">
             <a:avLst/>
           </a:prstGeom>
           <a:solidFill>
-            <a:schemeClr val="accent6">
-              <a:lumMod val="40000"/>
-              <a:lumOff val="60000"/>
-            </a:schemeClr>
+            <a:schemeClr val="bg1"/>
           </a:solidFill>
-          <a:ln w="19050">
+          <a:ln>
             <a:solidFill>
-              <a:schemeClr val="accent6">
-                <a:lumMod val="50000"/>
-              </a:schemeClr>
+              <a:schemeClr val="bg1"/>
             </a:solidFill>
           </a:ln>
         </p:spPr>
@@ -3824,20 +3848,16 @@
           <a:lstStyle/>
           <a:p>
             <a:pPr algn="ctr"/>
-            <a:endParaRPr lang="en-US" dirty="0">
-              <a:solidFill>
-                <a:schemeClr val="tx1"/>
-              </a:solidFill>
-            </a:endParaRPr>
-          </a:p>
-        </p:txBody>
-      </p:sp>
-      <p:sp>
-        <p:nvSpPr>
-          <p:cNvPr id="44" name="Rounded Rectangle 43">
-            <a:extLst>
-              <a:ext uri="{FF2B5EF4-FFF2-40B4-BE49-F238E27FC236}">
-                <a16:creationId xmlns:a16="http://schemas.microsoft.com/office/drawing/2014/main" id="{39941F14-A3FD-964D-BC7E-C6F3E4437826}"/>
+            <a:endParaRPr lang="en-US"/>
+          </a:p>
+        </p:txBody>
+      </p:sp>
+      <p:sp>
+        <p:nvSpPr>
+          <p:cNvPr id="100" name="Rounded Rectangle 99">
+            <a:extLst>
+              <a:ext uri="{FF2B5EF4-FFF2-40B4-BE49-F238E27FC236}">
+                <a16:creationId xmlns:a16="http://schemas.microsoft.com/office/drawing/2014/main" id="{B819D5F6-78E5-9845-9F41-90858B3A04DA}"/>
               </a:ext>
             </a:extLst>
           </p:cNvPr>
@@ -3846,7 +3866,7 @@
         </p:nvSpPr>
         <p:spPr>
           <a:xfrm>
-            <a:off x="5879085" y="4147864"/>
+            <a:off x="8384562" y="4026533"/>
             <a:ext cx="1170215" cy="674914"/>
           </a:xfrm>
           <a:prstGeom prst="roundRect">
@@ -3854,8 +3874,8 @@
           </a:prstGeom>
           <a:solidFill>
             <a:schemeClr val="accent6">
-              <a:lumMod val="60000"/>
-              <a:lumOff val="40000"/>
+              <a:lumMod val="40000"/>
+              <a:lumOff val="60000"/>
             </a:schemeClr>
           </a:solidFill>
           <a:ln w="19050">
@@ -3897,10 +3917,10 @@
       </p:sp>
       <p:sp>
         <p:nvSpPr>
-          <p:cNvPr id="49" name="Curved Up Arrow 48">
-            <a:extLst>
-              <a:ext uri="{FF2B5EF4-FFF2-40B4-BE49-F238E27FC236}">
-                <a16:creationId xmlns:a16="http://schemas.microsoft.com/office/drawing/2014/main" id="{9032B92A-EEF1-494C-8F0A-2105CC0E5CD2}"/>
+          <p:cNvPr id="44" name="Rounded Rectangle 43">
+            <a:extLst>
+              <a:ext uri="{FF2B5EF4-FFF2-40B4-BE49-F238E27FC236}">
+                <a16:creationId xmlns:a16="http://schemas.microsoft.com/office/drawing/2014/main" id="{39941F14-A3FD-964D-BC7E-C6F3E4437826}"/>
               </a:ext>
             </a:extLst>
           </p:cNvPr>
@@ -3909,24 +3929,21 @@
         </p:nvSpPr>
         <p:spPr>
           <a:xfrm>
-            <a:off x="4940251" y="2929053"/>
-            <a:ext cx="1271030" cy="397329"/>
-          </a:xfrm>
-          <a:prstGeom prst="curvedUpArrow">
-            <a:avLst>
-              <a:gd name="adj1" fmla="val 13236"/>
-              <a:gd name="adj2" fmla="val 50000"/>
-              <a:gd name="adj3" fmla="val 25000"/>
-            </a:avLst>
+            <a:off x="5879085" y="4147864"/>
+            <a:ext cx="1170215" cy="674914"/>
+          </a:xfrm>
+          <a:prstGeom prst="roundRect">
+            <a:avLst/>
           </a:prstGeom>
           <a:solidFill>
-            <a:schemeClr val="accent1">
-              <a:lumMod val="75000"/>
+            <a:schemeClr val="accent6">
+              <a:lumMod val="60000"/>
+              <a:lumOff val="40000"/>
             </a:schemeClr>
           </a:solidFill>
-          <a:ln>
+          <a:ln w="19050">
             <a:solidFill>
-              <a:schemeClr val="accent1">
+              <a:schemeClr val="accent6">
                 <a:lumMod val="50000"/>
               </a:schemeClr>
             </a:solidFill>
@@ -3953,7 +3970,7 @@
           <a:lstStyle/>
           <a:p>
             <a:pPr algn="ctr"/>
-            <a:endParaRPr lang="en-US">
+            <a:endParaRPr lang="en-US" dirty="0">
               <a:solidFill>
                 <a:schemeClr val="tx1"/>
               </a:solidFill>
@@ -3963,10 +3980,10 @@
       </p:sp>
       <p:sp>
         <p:nvSpPr>
-          <p:cNvPr id="55" name="Curved Up Arrow 54">
-            <a:extLst>
-              <a:ext uri="{FF2B5EF4-FFF2-40B4-BE49-F238E27FC236}">
-                <a16:creationId xmlns:a16="http://schemas.microsoft.com/office/drawing/2014/main" id="{3C8F811C-1964-7345-9519-4A6D3BF0486E}"/>
+          <p:cNvPr id="49" name="Curved Up Arrow 48">
+            <a:extLst>
+              <a:ext uri="{FF2B5EF4-FFF2-40B4-BE49-F238E27FC236}">
+                <a16:creationId xmlns:a16="http://schemas.microsoft.com/office/drawing/2014/main" id="{9032B92A-EEF1-494C-8F0A-2105CC0E5CD2}"/>
               </a:ext>
             </a:extLst>
           </p:cNvPr>
@@ -3974,9 +3991,9 @@
           <p:nvPr/>
         </p:nvSpPr>
         <p:spPr>
-          <a:xfrm flipV="1">
-            <a:off x="4998760" y="3426987"/>
-            <a:ext cx="1212521" cy="397329"/>
+          <a:xfrm>
+            <a:off x="4940251" y="2929053"/>
+            <a:ext cx="1271030" cy="397329"/>
           </a:xfrm>
           <a:prstGeom prst="curvedUpArrow">
             <a:avLst>
@@ -3986,13 +4003,13 @@
             </a:avLst>
           </a:prstGeom>
           <a:solidFill>
-            <a:schemeClr val="accent6">
+            <a:schemeClr val="accent1">
               <a:lumMod val="75000"/>
             </a:schemeClr>
           </a:solidFill>
           <a:ln>
             <a:solidFill>
-              <a:schemeClr val="accent6">
+              <a:schemeClr val="accent1">
                 <a:lumMod val="50000"/>
               </a:schemeClr>
             </a:solidFill>
@@ -4029,10 +4046,10 @@
       </p:sp>
       <p:sp>
         <p:nvSpPr>
-          <p:cNvPr id="25" name="Curved Up Arrow 24">
-            <a:extLst>
-              <a:ext uri="{FF2B5EF4-FFF2-40B4-BE49-F238E27FC236}">
-                <a16:creationId xmlns:a16="http://schemas.microsoft.com/office/drawing/2014/main" id="{1FF45074-0E5F-054D-85A5-7401CA561CAD}"/>
+          <p:cNvPr id="55" name="Curved Up Arrow 54">
+            <a:extLst>
+              <a:ext uri="{FF2B5EF4-FFF2-40B4-BE49-F238E27FC236}">
+                <a16:creationId xmlns:a16="http://schemas.microsoft.com/office/drawing/2014/main" id="{3C8F811C-1964-7345-9519-4A6D3BF0486E}"/>
               </a:ext>
             </a:extLst>
           </p:cNvPr>
@@ -4040,9 +4057,9 @@
           <p:nvPr/>
         </p:nvSpPr>
         <p:spPr>
-          <a:xfrm>
-            <a:off x="1553269" y="2929053"/>
-            <a:ext cx="2144485" cy="397329"/>
+          <a:xfrm flipV="1">
+            <a:off x="4998760" y="3426987"/>
+            <a:ext cx="1212521" cy="397329"/>
           </a:xfrm>
           <a:prstGeom prst="curvedUpArrow">
             <a:avLst>
@@ -4052,13 +4069,13 @@
             </a:avLst>
           </a:prstGeom>
           <a:solidFill>
-            <a:schemeClr val="accent1">
+            <a:schemeClr val="accent6">
               <a:lumMod val="75000"/>
             </a:schemeClr>
           </a:solidFill>
           <a:ln>
             <a:solidFill>
-              <a:schemeClr val="accent1">
+              <a:schemeClr val="accent6">
                 <a:lumMod val="50000"/>
               </a:schemeClr>
             </a:solidFill>
@@ -4095,10 +4112,10 @@
       </p:sp>
       <p:sp>
         <p:nvSpPr>
-          <p:cNvPr id="6" name="Rounded Rectangle 5">
-            <a:extLst>
-              <a:ext uri="{FF2B5EF4-FFF2-40B4-BE49-F238E27FC236}">
-                <a16:creationId xmlns:a16="http://schemas.microsoft.com/office/drawing/2014/main" id="{A6531ED6-9FBB-9A47-9045-884CC2A5A852}"/>
+          <p:cNvPr id="25" name="Curved Up Arrow 24">
+            <a:extLst>
+              <a:ext uri="{FF2B5EF4-FFF2-40B4-BE49-F238E27FC236}">
+                <a16:creationId xmlns:a16="http://schemas.microsoft.com/office/drawing/2014/main" id="{1FF45074-0E5F-054D-85A5-7401CA561CAD}"/>
               </a:ext>
             </a:extLst>
           </p:cNvPr>
@@ -4107,19 +4124,22 @@
         </p:nvSpPr>
         <p:spPr>
           <a:xfrm>
-            <a:off x="3533272" y="1811027"/>
-            <a:ext cx="1170215" cy="674914"/>
-          </a:xfrm>
-          <a:prstGeom prst="roundRect">
-            <a:avLst/>
+            <a:off x="1553269" y="2929053"/>
+            <a:ext cx="2144485" cy="397329"/>
+          </a:xfrm>
+          <a:prstGeom prst="curvedUpArrow">
+            <a:avLst>
+              <a:gd name="adj1" fmla="val 13236"/>
+              <a:gd name="adj2" fmla="val 50000"/>
+              <a:gd name="adj3" fmla="val 25000"/>
+            </a:avLst>
           </a:prstGeom>
           <a:solidFill>
             <a:schemeClr val="accent1">
-              <a:lumMod val="40000"/>
-              <a:lumOff val="60000"/>
+              <a:lumMod val="75000"/>
             </a:schemeClr>
           </a:solidFill>
-          <a:ln w="19050">
+          <a:ln>
             <a:solidFill>
               <a:schemeClr val="accent1">
                 <a:lumMod val="50000"/>
@@ -4148,7 +4168,7 @@
           <a:lstStyle/>
           <a:p>
             <a:pPr algn="ctr"/>
-            <a:endParaRPr lang="en-US" dirty="0">
+            <a:endParaRPr lang="en-US">
               <a:solidFill>
                 <a:schemeClr val="tx1"/>
               </a:solidFill>
@@ -4158,10 +4178,10 @@
       </p:sp>
       <p:sp>
         <p:nvSpPr>
-          <p:cNvPr id="7" name="Rounded Rectangle 6">
-            <a:extLst>
-              <a:ext uri="{FF2B5EF4-FFF2-40B4-BE49-F238E27FC236}">
-                <a16:creationId xmlns:a16="http://schemas.microsoft.com/office/drawing/2014/main" id="{E3B559FF-1D1E-EC49-B212-E5F962D13F43}"/>
+          <p:cNvPr id="6" name="Rounded Rectangle 5">
+            <a:extLst>
+              <a:ext uri="{FF2B5EF4-FFF2-40B4-BE49-F238E27FC236}">
+                <a16:creationId xmlns:a16="http://schemas.microsoft.com/office/drawing/2014/main" id="{A6531ED6-9FBB-9A47-9045-884CC2A5A852}"/>
               </a:ext>
             </a:extLst>
           </p:cNvPr>
@@ -4170,7 +4190,7 @@
         </p:nvSpPr>
         <p:spPr>
           <a:xfrm>
-            <a:off x="3391758" y="1925327"/>
+            <a:off x="3533272" y="1811027"/>
             <a:ext cx="1170215" cy="674914"/>
           </a:xfrm>
           <a:prstGeom prst="roundRect">
@@ -4178,8 +4198,8 @@
           </a:prstGeom>
           <a:solidFill>
             <a:schemeClr val="accent1">
-              <a:lumMod val="60000"/>
-              <a:lumOff val="40000"/>
+              <a:lumMod val="40000"/>
+              <a:lumOff val="60000"/>
             </a:schemeClr>
           </a:solidFill>
           <a:ln w="19050">
@@ -4221,10 +4241,10 @@
       </p:sp>
       <p:sp>
         <p:nvSpPr>
-          <p:cNvPr id="8" name="Rounded Rectangle 7">
-            <a:extLst>
-              <a:ext uri="{FF2B5EF4-FFF2-40B4-BE49-F238E27FC236}">
-                <a16:creationId xmlns:a16="http://schemas.microsoft.com/office/drawing/2014/main" id="{369AC178-BF9D-4745-90F0-6149144DD9BF}"/>
+          <p:cNvPr id="7" name="Rounded Rectangle 6">
+            <a:extLst>
+              <a:ext uri="{FF2B5EF4-FFF2-40B4-BE49-F238E27FC236}">
+                <a16:creationId xmlns:a16="http://schemas.microsoft.com/office/drawing/2014/main" id="{E3B559FF-1D1E-EC49-B212-E5F962D13F43}"/>
               </a:ext>
             </a:extLst>
           </p:cNvPr>
@@ -4233,7 +4253,7 @@
         </p:nvSpPr>
         <p:spPr>
           <a:xfrm>
-            <a:off x="3255737" y="2061399"/>
+            <a:off x="3391758" y="1925327"/>
             <a:ext cx="1170215" cy="674914"/>
           </a:xfrm>
           <a:prstGeom prst="roundRect">
@@ -4241,7 +4261,8 @@
           </a:prstGeom>
           <a:solidFill>
             <a:schemeClr val="accent1">
-              <a:lumMod val="75000"/>
+              <a:lumMod val="60000"/>
+              <a:lumOff val="40000"/>
             </a:schemeClr>
           </a:solidFill>
           <a:ln w="19050">
@@ -4273,23 +4294,20 @@
           <a:lstStyle/>
           <a:p>
             <a:pPr algn="ctr"/>
-            <a:r>
-              <a:rPr lang="en-US" dirty="0">
-                <a:solidFill>
-                  <a:schemeClr val="bg1"/>
-                </a:solidFill>
-              </a:rPr>
-              <a:t>v1.0</a:t>
-            </a:r>
-          </a:p>
-        </p:txBody>
-      </p:sp>
-      <p:sp>
-        <p:nvSpPr>
-          <p:cNvPr id="18" name="Rounded Rectangle 17">
-            <a:extLst>
-              <a:ext uri="{FF2B5EF4-FFF2-40B4-BE49-F238E27FC236}">
-                <a16:creationId xmlns:a16="http://schemas.microsoft.com/office/drawing/2014/main" id="{44650791-EEEC-2549-BC4D-1C04E4010439}"/>
+            <a:endParaRPr lang="en-US" dirty="0">
+              <a:solidFill>
+                <a:schemeClr val="tx1"/>
+              </a:solidFill>
+            </a:endParaRPr>
+          </a:p>
+        </p:txBody>
+      </p:sp>
+      <p:sp>
+        <p:nvSpPr>
+          <p:cNvPr id="8" name="Rounded Rectangle 7">
+            <a:extLst>
+              <a:ext uri="{FF2B5EF4-FFF2-40B4-BE49-F238E27FC236}">
+                <a16:creationId xmlns:a16="http://schemas.microsoft.com/office/drawing/2014/main" id="{369AC178-BF9D-4745-90F0-6149144DD9BF}"/>
               </a:ext>
             </a:extLst>
           </p:cNvPr>
@@ -4298,20 +4316,20 @@
         </p:nvSpPr>
         <p:spPr>
           <a:xfrm>
-            <a:off x="3255737" y="4272676"/>
+            <a:off x="3255737" y="2061399"/>
             <a:ext cx="1170215" cy="674914"/>
           </a:xfrm>
           <a:prstGeom prst="roundRect">
             <a:avLst/>
           </a:prstGeom>
           <a:solidFill>
-            <a:schemeClr val="accent6">
+            <a:schemeClr val="accent1">
               <a:lumMod val="75000"/>
             </a:schemeClr>
           </a:solidFill>
           <a:ln w="19050">
             <a:solidFill>
-              <a:schemeClr val="accent6">
+              <a:schemeClr val="accent1">
                 <a:lumMod val="50000"/>
               </a:schemeClr>
             </a:solidFill>
@@ -4344,17 +4362,17 @@
                   <a:schemeClr val="bg1"/>
                 </a:solidFill>
               </a:rPr>
-              <a:t>v2.0</a:t>
-            </a:r>
-          </a:p>
-        </p:txBody>
-      </p:sp>
-      <p:sp>
-        <p:nvSpPr>
-          <p:cNvPr id="28" name="Curved Up Arrow 27">
-            <a:extLst>
-              <a:ext uri="{FF2B5EF4-FFF2-40B4-BE49-F238E27FC236}">
-                <a16:creationId xmlns:a16="http://schemas.microsoft.com/office/drawing/2014/main" id="{04AB6087-18E6-F547-AF2D-FEDBFF2E48AB}"/>
+              <a:t>v1.0</a:t>
+            </a:r>
+          </a:p>
+        </p:txBody>
+      </p:sp>
+      <p:sp>
+        <p:nvSpPr>
+          <p:cNvPr id="18" name="Rounded Rectangle 17">
+            <a:extLst>
+              <a:ext uri="{FF2B5EF4-FFF2-40B4-BE49-F238E27FC236}">
+                <a16:creationId xmlns:a16="http://schemas.microsoft.com/office/drawing/2014/main" id="{44650791-EEEC-2549-BC4D-1C04E4010439}"/>
               </a:ext>
             </a:extLst>
           </p:cNvPr>
@@ -4362,23 +4380,19 @@
           <p:nvPr/>
         </p:nvSpPr>
         <p:spPr>
-          <a:xfrm flipV="1">
-            <a:off x="1553269" y="3426988"/>
-            <a:ext cx="2144485" cy="397329"/>
-          </a:xfrm>
-          <a:prstGeom prst="curvedUpArrow">
-            <a:avLst>
-              <a:gd name="adj1" fmla="val 13236"/>
-              <a:gd name="adj2" fmla="val 50000"/>
-              <a:gd name="adj3" fmla="val 25000"/>
-            </a:avLst>
+          <a:xfrm>
+            <a:off x="3255737" y="4272676"/>
+            <a:ext cx="1170215" cy="674914"/>
+          </a:xfrm>
+          <a:prstGeom prst="roundRect">
+            <a:avLst/>
           </a:prstGeom>
           <a:solidFill>
             <a:schemeClr val="accent6">
               <a:lumMod val="75000"/>
             </a:schemeClr>
           </a:solidFill>
-          <a:ln>
+          <a:ln w="19050">
             <a:solidFill>
               <a:schemeClr val="accent6">
                 <a:lumMod val="50000"/>
@@ -4407,20 +4421,23 @@
           <a:lstStyle/>
           <a:p>
             <a:pPr algn="ctr"/>
-            <a:endParaRPr lang="en-US">
-              <a:solidFill>
-                <a:schemeClr val="tx1"/>
-              </a:solidFill>
-            </a:endParaRPr>
-          </a:p>
-        </p:txBody>
-      </p:sp>
-      <p:sp>
-        <p:nvSpPr>
-          <p:cNvPr id="29" name="Rounded Rectangle 28">
-            <a:extLst>
-              <a:ext uri="{FF2B5EF4-FFF2-40B4-BE49-F238E27FC236}">
-                <a16:creationId xmlns:a16="http://schemas.microsoft.com/office/drawing/2014/main" id="{268C8C7B-9178-D948-AD10-9E84F02C0139}"/>
+            <a:r>
+              <a:rPr lang="en-US" dirty="0">
+                <a:solidFill>
+                  <a:schemeClr val="bg1"/>
+                </a:solidFill>
+              </a:rPr>
+              <a:t>v2.0</a:t>
+            </a:r>
+          </a:p>
+        </p:txBody>
+      </p:sp>
+      <p:sp>
+        <p:nvSpPr>
+          <p:cNvPr id="28" name="Curved Up Arrow 27">
+            <a:extLst>
+              <a:ext uri="{FF2B5EF4-FFF2-40B4-BE49-F238E27FC236}">
+                <a16:creationId xmlns:a16="http://schemas.microsoft.com/office/drawing/2014/main" id="{04AB6087-18E6-F547-AF2D-FEDBFF2E48AB}"/>
               </a:ext>
             </a:extLst>
           </p:cNvPr>
@@ -4428,19 +4445,27 @@
           <p:nvPr/>
         </p:nvSpPr>
         <p:spPr>
-          <a:xfrm>
-            <a:off x="2272511" y="3091099"/>
-            <a:ext cx="689886" cy="618939"/>
-          </a:xfrm>
-          <a:prstGeom prst="roundRect">
-            <a:avLst/>
+          <a:xfrm flipV="1">
+            <a:off x="1553269" y="3426988"/>
+            <a:ext cx="2144485" cy="397329"/>
+          </a:xfrm>
+          <a:prstGeom prst="curvedUpArrow">
+            <a:avLst>
+              <a:gd name="adj1" fmla="val 13236"/>
+              <a:gd name="adj2" fmla="val 50000"/>
+              <a:gd name="adj3" fmla="val 25000"/>
+            </a:avLst>
           </a:prstGeom>
           <a:solidFill>
-            <a:schemeClr val="bg1"/>
+            <a:schemeClr val="accent6">
+              <a:lumMod val="75000"/>
+            </a:schemeClr>
           </a:solidFill>
           <a:ln>
             <a:solidFill>
-              <a:schemeClr val="bg1"/>
+              <a:schemeClr val="accent6">
+                <a:lumMod val="50000"/>
+              </a:schemeClr>
             </a:solidFill>
           </a:ln>
         </p:spPr>
@@ -4465,448 +4490,20 @@
           <a:lstStyle/>
           <a:p>
             <a:pPr algn="ctr"/>
-            <a:endParaRPr lang="en-US"/>
-          </a:p>
-        </p:txBody>
-      </p:sp>
-      <p:pic>
-        <p:nvPicPr>
-          <p:cNvPr id="31" name="Graphic 30" descr="School boy">
-            <a:extLst>
-              <a:ext uri="{FF2B5EF4-FFF2-40B4-BE49-F238E27FC236}">
-                <a16:creationId xmlns:a16="http://schemas.microsoft.com/office/drawing/2014/main" id="{23C14CCA-0229-0945-AD1D-3EA26AB7C249}"/>
-              </a:ext>
-            </a:extLst>
-          </p:cNvPr>
-          <p:cNvPicPr>
-            <a:picLocks noChangeAspect="1"/>
-          </p:cNvPicPr>
-          <p:nvPr/>
-        </p:nvPicPr>
-        <p:blipFill>
-          <a:blip r:embed="rId2">
-            <a:extLst>
-              <a:ext uri="{96DAC541-7B7A-43D3-8B79-37D633B846F1}">
-                <asvg:svgBlip xmlns:asvg="http://schemas.microsoft.com/office/drawing/2016/SVG/main" r:embed="rId3"/>
-              </a:ext>
-            </a:extLst>
-          </a:blip>
-          <a:stretch>
-            <a:fillRect/>
-          </a:stretch>
-        </p:blipFill>
-        <p:spPr>
-          <a:xfrm>
-            <a:off x="686244" y="1968817"/>
-            <a:ext cx="548640" cy="548640"/>
-          </a:xfrm>
-          <a:prstGeom prst="rect">
-            <a:avLst/>
-          </a:prstGeom>
-        </p:spPr>
-      </p:pic>
-      <p:pic>
-        <p:nvPicPr>
-          <p:cNvPr id="32" name="Graphic 31" descr="Female Profile">
-            <a:extLst>
-              <a:ext uri="{FF2B5EF4-FFF2-40B4-BE49-F238E27FC236}">
-                <a16:creationId xmlns:a16="http://schemas.microsoft.com/office/drawing/2014/main" id="{FB0AD0DD-5F7D-7542-96A5-78D8D8B5C0C9}"/>
-              </a:ext>
-            </a:extLst>
-          </p:cNvPr>
-          <p:cNvPicPr>
-            <a:picLocks noChangeAspect="1"/>
-          </p:cNvPicPr>
-          <p:nvPr/>
-        </p:nvPicPr>
-        <p:blipFill>
-          <a:blip r:embed="rId4">
-            <a:extLst>
-              <a:ext uri="{96DAC541-7B7A-43D3-8B79-37D633B846F1}">
-                <asvg:svgBlip xmlns:asvg="http://schemas.microsoft.com/office/drawing/2016/SVG/main" r:embed="rId5"/>
-              </a:ext>
-            </a:extLst>
-          </a:blip>
-          <a:stretch>
-            <a:fillRect/>
-          </a:stretch>
-        </p:blipFill>
-        <p:spPr>
-          <a:xfrm>
-            <a:off x="162689" y="2795857"/>
-            <a:ext cx="548640" cy="548640"/>
-          </a:xfrm>
-          <a:prstGeom prst="rect">
-            <a:avLst/>
-          </a:prstGeom>
-        </p:spPr>
-      </p:pic>
-      <p:pic>
-        <p:nvPicPr>
-          <p:cNvPr id="33" name="Graphic 32" descr="School boy">
-            <a:extLst>
-              <a:ext uri="{FF2B5EF4-FFF2-40B4-BE49-F238E27FC236}">
-                <a16:creationId xmlns:a16="http://schemas.microsoft.com/office/drawing/2014/main" id="{DB43DC05-529E-D441-A524-D0B30D5D4E06}"/>
-              </a:ext>
-            </a:extLst>
-          </p:cNvPr>
-          <p:cNvPicPr>
-            <a:picLocks noChangeAspect="1"/>
-          </p:cNvPicPr>
-          <p:nvPr/>
-        </p:nvPicPr>
-        <p:blipFill>
-          <a:blip r:embed="rId6">
-            <a:extLst>
-              <a:ext uri="{96DAC541-7B7A-43D3-8B79-37D633B846F1}">
-                <asvg:svgBlip xmlns:asvg="http://schemas.microsoft.com/office/drawing/2016/SVG/main" r:embed="rId7"/>
-              </a:ext>
-            </a:extLst>
-          </a:blip>
-          <a:stretch>
-            <a:fillRect/>
-          </a:stretch>
-        </p:blipFill>
-        <p:spPr>
-          <a:xfrm>
-            <a:off x="625309" y="2453742"/>
-            <a:ext cx="548640" cy="548640"/>
-          </a:xfrm>
-          <a:prstGeom prst="rect">
-            <a:avLst/>
-          </a:prstGeom>
-        </p:spPr>
-      </p:pic>
-      <p:pic>
-        <p:nvPicPr>
-          <p:cNvPr id="34" name="Graphic 33" descr="Female Profile">
-            <a:extLst>
-              <a:ext uri="{FF2B5EF4-FFF2-40B4-BE49-F238E27FC236}">
-                <a16:creationId xmlns:a16="http://schemas.microsoft.com/office/drawing/2014/main" id="{44118B0F-5F5C-104D-89F1-FF4F0677B581}"/>
-              </a:ext>
-            </a:extLst>
-          </p:cNvPr>
-          <p:cNvPicPr>
-            <a:picLocks noChangeAspect="1"/>
-          </p:cNvPicPr>
-          <p:nvPr/>
-        </p:nvPicPr>
-        <p:blipFill>
-          <a:blip r:embed="rId8">
-            <a:extLst>
-              <a:ext uri="{96DAC541-7B7A-43D3-8B79-37D633B846F1}">
-                <asvg:svgBlip xmlns:asvg="http://schemas.microsoft.com/office/drawing/2016/SVG/main" r:embed="rId9"/>
-              </a:ext>
-            </a:extLst>
-          </a:blip>
-          <a:stretch>
-            <a:fillRect/>
-          </a:stretch>
-        </p:blipFill>
-        <p:spPr>
-          <a:xfrm>
-            <a:off x="149603" y="3428773"/>
-            <a:ext cx="548640" cy="548640"/>
-          </a:xfrm>
-          <a:prstGeom prst="rect">
-            <a:avLst/>
-          </a:prstGeom>
-        </p:spPr>
-      </p:pic>
-      <p:pic>
-        <p:nvPicPr>
-          <p:cNvPr id="35" name="Graphic 34" descr="School girl">
-            <a:extLst>
-              <a:ext uri="{FF2B5EF4-FFF2-40B4-BE49-F238E27FC236}">
-                <a16:creationId xmlns:a16="http://schemas.microsoft.com/office/drawing/2014/main" id="{38748C23-E12A-E34D-8964-5C6C40FF9564}"/>
-              </a:ext>
-            </a:extLst>
-          </p:cNvPr>
-          <p:cNvPicPr>
-            <a:picLocks noChangeAspect="1"/>
-          </p:cNvPicPr>
-          <p:nvPr/>
-        </p:nvPicPr>
-        <p:blipFill>
-          <a:blip r:embed="rId10">
-            <a:extLst>
-              <a:ext uri="{96DAC541-7B7A-43D3-8B79-37D633B846F1}">
-                <asvg:svgBlip xmlns:asvg="http://schemas.microsoft.com/office/drawing/2016/SVG/main" r:embed="rId11"/>
-              </a:ext>
-            </a:extLst>
-          </a:blip>
-          <a:stretch>
-            <a:fillRect/>
-          </a:stretch>
-        </p:blipFill>
-        <p:spPr>
-          <a:xfrm>
-            <a:off x="284313" y="2282941"/>
-            <a:ext cx="548640" cy="548640"/>
-          </a:xfrm>
-          <a:prstGeom prst="rect">
-            <a:avLst/>
-          </a:prstGeom>
-        </p:spPr>
-      </p:pic>
-      <p:pic>
-        <p:nvPicPr>
-          <p:cNvPr id="36" name="Graphic 35" descr="School girl">
-            <a:extLst>
-              <a:ext uri="{FF2B5EF4-FFF2-40B4-BE49-F238E27FC236}">
-                <a16:creationId xmlns:a16="http://schemas.microsoft.com/office/drawing/2014/main" id="{C2C55299-2E10-C44A-BC63-4DFDA1A799E2}"/>
-              </a:ext>
-            </a:extLst>
-          </p:cNvPr>
-          <p:cNvPicPr>
-            <a:picLocks noChangeAspect="1"/>
-          </p:cNvPicPr>
-          <p:nvPr/>
-        </p:nvPicPr>
-        <p:blipFill>
-          <a:blip r:embed="rId12">
-            <a:extLst>
-              <a:ext uri="{96DAC541-7B7A-43D3-8B79-37D633B846F1}">
-                <asvg:svgBlip xmlns:asvg="http://schemas.microsoft.com/office/drawing/2016/SVG/main" r:embed="rId13"/>
-              </a:ext>
-            </a:extLst>
-          </a:blip>
-          <a:stretch>
-            <a:fillRect/>
-          </a:stretch>
-        </p:blipFill>
-        <p:spPr>
-          <a:xfrm>
-            <a:off x="625309" y="3026741"/>
-            <a:ext cx="548640" cy="548640"/>
-          </a:xfrm>
-          <a:prstGeom prst="rect">
-            <a:avLst/>
-          </a:prstGeom>
-        </p:spPr>
-      </p:pic>
-      <p:pic>
-        <p:nvPicPr>
-          <p:cNvPr id="37" name="Graphic 36" descr="User">
-            <a:extLst>
-              <a:ext uri="{FF2B5EF4-FFF2-40B4-BE49-F238E27FC236}">
-                <a16:creationId xmlns:a16="http://schemas.microsoft.com/office/drawing/2014/main" id="{6FA18981-96F5-2C4E-9FD2-0E3D37F43798}"/>
-              </a:ext>
-            </a:extLst>
-          </p:cNvPr>
-          <p:cNvPicPr>
-            <a:picLocks noChangeAspect="1"/>
-          </p:cNvPicPr>
-          <p:nvPr/>
-        </p:nvPicPr>
-        <p:blipFill>
-          <a:blip r:embed="rId14">
-            <a:extLst>
-              <a:ext uri="{96DAC541-7B7A-43D3-8B79-37D633B846F1}">
-                <asvg:svgBlip xmlns:asvg="http://schemas.microsoft.com/office/drawing/2016/SVG/main" r:embed="rId15"/>
-              </a:ext>
-            </a:extLst>
-          </a:blip>
-          <a:stretch>
-            <a:fillRect/>
-          </a:stretch>
-        </p:blipFill>
-        <p:spPr>
-          <a:xfrm>
-            <a:off x="997771" y="3852601"/>
-            <a:ext cx="548640" cy="548640"/>
-          </a:xfrm>
-          <a:prstGeom prst="rect">
-            <a:avLst/>
-          </a:prstGeom>
-        </p:spPr>
-      </p:pic>
-      <p:pic>
-        <p:nvPicPr>
-          <p:cNvPr id="39" name="Graphic 38" descr="Male profile">
-            <a:extLst>
-              <a:ext uri="{FF2B5EF4-FFF2-40B4-BE49-F238E27FC236}">
-                <a16:creationId xmlns:a16="http://schemas.microsoft.com/office/drawing/2014/main" id="{C31BA2FA-0346-AF4E-9947-474BCEEA1E1A}"/>
-              </a:ext>
-            </a:extLst>
-          </p:cNvPr>
-          <p:cNvPicPr>
-            <a:picLocks noChangeAspect="1"/>
-          </p:cNvPicPr>
-          <p:nvPr/>
-        </p:nvPicPr>
-        <p:blipFill>
-          <a:blip r:embed="rId16">
-            <a:extLst>
-              <a:ext uri="{96DAC541-7B7A-43D3-8B79-37D633B846F1}">
-                <asvg:svgBlip xmlns:asvg="http://schemas.microsoft.com/office/drawing/2016/SVG/main" r:embed="rId17"/>
-              </a:ext>
-            </a:extLst>
-          </a:blip>
-          <a:stretch>
-            <a:fillRect/>
-          </a:stretch>
-        </p:blipFill>
-        <p:spPr>
-          <a:xfrm>
-            <a:off x="260342" y="3984682"/>
-            <a:ext cx="548640" cy="548640"/>
-          </a:xfrm>
-          <a:prstGeom prst="rect">
-            <a:avLst/>
-          </a:prstGeom>
-        </p:spPr>
-      </p:pic>
-      <p:pic>
-        <p:nvPicPr>
-          <p:cNvPr id="40" name="Graphic 39" descr="Male profile">
-            <a:extLst>
-              <a:ext uri="{FF2B5EF4-FFF2-40B4-BE49-F238E27FC236}">
-                <a16:creationId xmlns:a16="http://schemas.microsoft.com/office/drawing/2014/main" id="{31F7B851-1FE9-0041-8F10-EFAE91321223}"/>
-              </a:ext>
-            </a:extLst>
-          </p:cNvPr>
-          <p:cNvPicPr>
-            <a:picLocks noChangeAspect="1"/>
-          </p:cNvPicPr>
-          <p:nvPr/>
-        </p:nvPicPr>
-        <p:blipFill>
-          <a:blip r:embed="rId18">
-            <a:extLst>
-              <a:ext uri="{96DAC541-7B7A-43D3-8B79-37D633B846F1}">
-                <asvg:svgBlip xmlns:asvg="http://schemas.microsoft.com/office/drawing/2016/SVG/main" r:embed="rId19"/>
-              </a:ext>
-            </a:extLst>
-          </a:blip>
-          <a:stretch>
-            <a:fillRect/>
-          </a:stretch>
-        </p:blipFill>
-        <p:spPr>
-          <a:xfrm>
-            <a:off x="1105342" y="2310241"/>
-            <a:ext cx="548640" cy="548640"/>
-          </a:xfrm>
-          <a:prstGeom prst="rect">
-            <a:avLst/>
-          </a:prstGeom>
-        </p:spPr>
-      </p:pic>
-      <p:pic>
-        <p:nvPicPr>
-          <p:cNvPr id="41" name="Graphic 40" descr="User">
-            <a:extLst>
-              <a:ext uri="{FF2B5EF4-FFF2-40B4-BE49-F238E27FC236}">
-                <a16:creationId xmlns:a16="http://schemas.microsoft.com/office/drawing/2014/main" id="{E040F2A3-AFAF-D148-A107-32FE22473B6E}"/>
-              </a:ext>
-            </a:extLst>
-          </p:cNvPr>
-          <p:cNvPicPr>
-            <a:picLocks noChangeAspect="1"/>
-          </p:cNvPicPr>
-          <p:nvPr/>
-        </p:nvPicPr>
-        <p:blipFill>
-          <a:blip r:embed="rId20">
-            <a:extLst>
-              <a:ext uri="{96DAC541-7B7A-43D3-8B79-37D633B846F1}">
-                <asvg:svgBlip xmlns:asvg="http://schemas.microsoft.com/office/drawing/2016/SVG/main" r:embed="rId21"/>
-              </a:ext>
-            </a:extLst>
-          </a:blip>
-          <a:stretch>
-            <a:fillRect/>
-          </a:stretch>
-        </p:blipFill>
-        <p:spPr>
-          <a:xfrm>
-            <a:off x="1096337" y="2834032"/>
-            <a:ext cx="548640" cy="548640"/>
-          </a:xfrm>
-          <a:prstGeom prst="rect">
-            <a:avLst/>
-          </a:prstGeom>
-        </p:spPr>
-      </p:pic>
-      <p:pic>
-        <p:nvPicPr>
-          <p:cNvPr id="42" name="Graphic 41" descr="School girl">
-            <a:extLst>
-              <a:ext uri="{FF2B5EF4-FFF2-40B4-BE49-F238E27FC236}">
-                <a16:creationId xmlns:a16="http://schemas.microsoft.com/office/drawing/2014/main" id="{3F63AF07-EE5F-CF47-A082-F91C131F360C}"/>
-              </a:ext>
-            </a:extLst>
-          </p:cNvPr>
-          <p:cNvPicPr>
-            <a:picLocks noChangeAspect="1"/>
-          </p:cNvPicPr>
-          <p:nvPr/>
-        </p:nvPicPr>
-        <p:blipFill>
-          <a:blip r:embed="rId10">
-            <a:extLst>
-              <a:ext uri="{96DAC541-7B7A-43D3-8B79-37D633B846F1}">
-                <asvg:svgBlip xmlns:asvg="http://schemas.microsoft.com/office/drawing/2016/SVG/main" r:embed="rId11"/>
-              </a:ext>
-            </a:extLst>
-          </a:blip>
-          <a:stretch>
-            <a:fillRect/>
-          </a:stretch>
-        </p:blipFill>
-        <p:spPr>
-          <a:xfrm>
-            <a:off x="1096337" y="3310225"/>
-            <a:ext cx="548640" cy="548640"/>
-          </a:xfrm>
-          <a:prstGeom prst="rect">
-            <a:avLst/>
-          </a:prstGeom>
-        </p:spPr>
-      </p:pic>
-      <p:pic>
-        <p:nvPicPr>
-          <p:cNvPr id="43" name="Graphic 42" descr="Female Profile">
-            <a:extLst>
-              <a:ext uri="{FF2B5EF4-FFF2-40B4-BE49-F238E27FC236}">
-                <a16:creationId xmlns:a16="http://schemas.microsoft.com/office/drawing/2014/main" id="{2627CD7E-A53B-F24A-B1B8-3F6E79640393}"/>
-              </a:ext>
-            </a:extLst>
-          </p:cNvPr>
-          <p:cNvPicPr>
-            <a:picLocks noChangeAspect="1"/>
-          </p:cNvPicPr>
-          <p:nvPr/>
-        </p:nvPicPr>
-        <p:blipFill>
-          <a:blip r:embed="rId4">
-            <a:extLst>
-              <a:ext uri="{96DAC541-7B7A-43D3-8B79-37D633B846F1}">
-                <asvg:svgBlip xmlns:asvg="http://schemas.microsoft.com/office/drawing/2016/SVG/main" r:embed="rId5"/>
-              </a:ext>
-            </a:extLst>
-          </a:blip>
-          <a:stretch>
-            <a:fillRect/>
-          </a:stretch>
-        </p:blipFill>
-        <p:spPr>
-          <a:xfrm>
-            <a:off x="573002" y="3569117"/>
-            <a:ext cx="548640" cy="548640"/>
-          </a:xfrm>
-          <a:prstGeom prst="rect">
-            <a:avLst/>
-          </a:prstGeom>
-        </p:spPr>
-      </p:pic>
-      <p:sp>
-        <p:nvSpPr>
-          <p:cNvPr id="52" name="Rounded Rectangle 51">
-            <a:extLst>
-              <a:ext uri="{FF2B5EF4-FFF2-40B4-BE49-F238E27FC236}">
-                <a16:creationId xmlns:a16="http://schemas.microsoft.com/office/drawing/2014/main" id="{679284B6-69AC-1545-BE16-018888117D47}"/>
+            <a:endParaRPr lang="en-US">
+              <a:solidFill>
+                <a:schemeClr val="tx1"/>
+              </a:solidFill>
+            </a:endParaRPr>
+          </a:p>
+        </p:txBody>
+      </p:sp>
+      <p:sp>
+        <p:nvSpPr>
+          <p:cNvPr id="29" name="Rounded Rectangle 28">
+            <a:extLst>
+              <a:ext uri="{FF2B5EF4-FFF2-40B4-BE49-F238E27FC236}">
+                <a16:creationId xmlns:a16="http://schemas.microsoft.com/office/drawing/2014/main" id="{268C8C7B-9178-D948-AD10-9E84F02C0139}"/>
               </a:ext>
             </a:extLst>
           </p:cNvPr>
@@ -4915,23 +4512,18 @@
         </p:nvSpPr>
         <p:spPr>
           <a:xfrm>
-            <a:off x="5905285" y="1925327"/>
-            <a:ext cx="1170215" cy="674914"/>
+            <a:off x="2272511" y="3091099"/>
+            <a:ext cx="689886" cy="618939"/>
           </a:xfrm>
           <a:prstGeom prst="roundRect">
             <a:avLst/>
           </a:prstGeom>
           <a:solidFill>
-            <a:schemeClr val="accent1">
-              <a:lumMod val="60000"/>
-              <a:lumOff val="40000"/>
-            </a:schemeClr>
+            <a:schemeClr val="bg1"/>
           </a:solidFill>
-          <a:ln w="19050">
+          <a:ln>
             <a:solidFill>
-              <a:schemeClr val="accent1">
-                <a:lumMod val="50000"/>
-              </a:schemeClr>
+              <a:schemeClr val="bg1"/>
             </a:solidFill>
           </a:ln>
         </p:spPr>
@@ -4956,20 +4548,448 @@
           <a:lstStyle/>
           <a:p>
             <a:pPr algn="ctr"/>
-            <a:endParaRPr lang="en-US" dirty="0">
-              <a:solidFill>
-                <a:schemeClr val="tx1"/>
-              </a:solidFill>
-            </a:endParaRPr>
-          </a:p>
-        </p:txBody>
-      </p:sp>
-      <p:sp>
-        <p:nvSpPr>
-          <p:cNvPr id="53" name="Rounded Rectangle 52">
-            <a:extLst>
-              <a:ext uri="{FF2B5EF4-FFF2-40B4-BE49-F238E27FC236}">
-                <a16:creationId xmlns:a16="http://schemas.microsoft.com/office/drawing/2014/main" id="{7BD1F8B5-1F8A-D543-8BDC-C30167A00E6A}"/>
+            <a:endParaRPr lang="en-US"/>
+          </a:p>
+        </p:txBody>
+      </p:sp>
+      <p:pic>
+        <p:nvPicPr>
+          <p:cNvPr id="31" name="Graphic 30" descr="School boy">
+            <a:extLst>
+              <a:ext uri="{FF2B5EF4-FFF2-40B4-BE49-F238E27FC236}">
+                <a16:creationId xmlns:a16="http://schemas.microsoft.com/office/drawing/2014/main" id="{23C14CCA-0229-0945-AD1D-3EA26AB7C249}"/>
+              </a:ext>
+            </a:extLst>
+          </p:cNvPr>
+          <p:cNvPicPr>
+            <a:picLocks noChangeAspect="1"/>
+          </p:cNvPicPr>
+          <p:nvPr/>
+        </p:nvPicPr>
+        <p:blipFill>
+          <a:blip r:embed="rId2">
+            <a:extLst>
+              <a:ext uri="{96DAC541-7B7A-43D3-8B79-37D633B846F1}">
+                <asvg:svgBlip xmlns:asvg="http://schemas.microsoft.com/office/drawing/2016/SVG/main" r:embed="rId3"/>
+              </a:ext>
+            </a:extLst>
+          </a:blip>
+          <a:stretch>
+            <a:fillRect/>
+          </a:stretch>
+        </p:blipFill>
+        <p:spPr>
+          <a:xfrm>
+            <a:off x="686244" y="1968817"/>
+            <a:ext cx="548640" cy="548640"/>
+          </a:xfrm>
+          <a:prstGeom prst="rect">
+            <a:avLst/>
+          </a:prstGeom>
+        </p:spPr>
+      </p:pic>
+      <p:pic>
+        <p:nvPicPr>
+          <p:cNvPr id="32" name="Graphic 31" descr="Female Profile">
+            <a:extLst>
+              <a:ext uri="{FF2B5EF4-FFF2-40B4-BE49-F238E27FC236}">
+                <a16:creationId xmlns:a16="http://schemas.microsoft.com/office/drawing/2014/main" id="{FB0AD0DD-5F7D-7542-96A5-78D8D8B5C0C9}"/>
+              </a:ext>
+            </a:extLst>
+          </p:cNvPr>
+          <p:cNvPicPr>
+            <a:picLocks noChangeAspect="1"/>
+          </p:cNvPicPr>
+          <p:nvPr/>
+        </p:nvPicPr>
+        <p:blipFill>
+          <a:blip r:embed="rId4">
+            <a:extLst>
+              <a:ext uri="{96DAC541-7B7A-43D3-8B79-37D633B846F1}">
+                <asvg:svgBlip xmlns:asvg="http://schemas.microsoft.com/office/drawing/2016/SVG/main" r:embed="rId5"/>
+              </a:ext>
+            </a:extLst>
+          </a:blip>
+          <a:stretch>
+            <a:fillRect/>
+          </a:stretch>
+        </p:blipFill>
+        <p:spPr>
+          <a:xfrm>
+            <a:off x="162689" y="2795857"/>
+            <a:ext cx="548640" cy="548640"/>
+          </a:xfrm>
+          <a:prstGeom prst="rect">
+            <a:avLst/>
+          </a:prstGeom>
+        </p:spPr>
+      </p:pic>
+      <p:pic>
+        <p:nvPicPr>
+          <p:cNvPr id="33" name="Graphic 32" descr="School boy">
+            <a:extLst>
+              <a:ext uri="{FF2B5EF4-FFF2-40B4-BE49-F238E27FC236}">
+                <a16:creationId xmlns:a16="http://schemas.microsoft.com/office/drawing/2014/main" id="{DB43DC05-529E-D441-A524-D0B30D5D4E06}"/>
+              </a:ext>
+            </a:extLst>
+          </p:cNvPr>
+          <p:cNvPicPr>
+            <a:picLocks noChangeAspect="1"/>
+          </p:cNvPicPr>
+          <p:nvPr/>
+        </p:nvPicPr>
+        <p:blipFill>
+          <a:blip r:embed="rId6">
+            <a:extLst>
+              <a:ext uri="{96DAC541-7B7A-43D3-8B79-37D633B846F1}">
+                <asvg:svgBlip xmlns:asvg="http://schemas.microsoft.com/office/drawing/2016/SVG/main" r:embed="rId7"/>
+              </a:ext>
+            </a:extLst>
+          </a:blip>
+          <a:stretch>
+            <a:fillRect/>
+          </a:stretch>
+        </p:blipFill>
+        <p:spPr>
+          <a:xfrm>
+            <a:off x="625309" y="2453742"/>
+            <a:ext cx="548640" cy="548640"/>
+          </a:xfrm>
+          <a:prstGeom prst="rect">
+            <a:avLst/>
+          </a:prstGeom>
+        </p:spPr>
+      </p:pic>
+      <p:pic>
+        <p:nvPicPr>
+          <p:cNvPr id="34" name="Graphic 33" descr="Female Profile">
+            <a:extLst>
+              <a:ext uri="{FF2B5EF4-FFF2-40B4-BE49-F238E27FC236}">
+                <a16:creationId xmlns:a16="http://schemas.microsoft.com/office/drawing/2014/main" id="{44118B0F-5F5C-104D-89F1-FF4F0677B581}"/>
+              </a:ext>
+            </a:extLst>
+          </p:cNvPr>
+          <p:cNvPicPr>
+            <a:picLocks noChangeAspect="1"/>
+          </p:cNvPicPr>
+          <p:nvPr/>
+        </p:nvPicPr>
+        <p:blipFill>
+          <a:blip r:embed="rId8">
+            <a:extLst>
+              <a:ext uri="{96DAC541-7B7A-43D3-8B79-37D633B846F1}">
+                <asvg:svgBlip xmlns:asvg="http://schemas.microsoft.com/office/drawing/2016/SVG/main" r:embed="rId9"/>
+              </a:ext>
+            </a:extLst>
+          </a:blip>
+          <a:stretch>
+            <a:fillRect/>
+          </a:stretch>
+        </p:blipFill>
+        <p:spPr>
+          <a:xfrm>
+            <a:off x="149603" y="3428773"/>
+            <a:ext cx="548640" cy="548640"/>
+          </a:xfrm>
+          <a:prstGeom prst="rect">
+            <a:avLst/>
+          </a:prstGeom>
+        </p:spPr>
+      </p:pic>
+      <p:pic>
+        <p:nvPicPr>
+          <p:cNvPr id="35" name="Graphic 34" descr="School girl">
+            <a:extLst>
+              <a:ext uri="{FF2B5EF4-FFF2-40B4-BE49-F238E27FC236}">
+                <a16:creationId xmlns:a16="http://schemas.microsoft.com/office/drawing/2014/main" id="{38748C23-E12A-E34D-8964-5C6C40FF9564}"/>
+              </a:ext>
+            </a:extLst>
+          </p:cNvPr>
+          <p:cNvPicPr>
+            <a:picLocks noChangeAspect="1"/>
+          </p:cNvPicPr>
+          <p:nvPr/>
+        </p:nvPicPr>
+        <p:blipFill>
+          <a:blip r:embed="rId10">
+            <a:extLst>
+              <a:ext uri="{96DAC541-7B7A-43D3-8B79-37D633B846F1}">
+                <asvg:svgBlip xmlns:asvg="http://schemas.microsoft.com/office/drawing/2016/SVG/main" r:embed="rId11"/>
+              </a:ext>
+            </a:extLst>
+          </a:blip>
+          <a:stretch>
+            <a:fillRect/>
+          </a:stretch>
+        </p:blipFill>
+        <p:spPr>
+          <a:xfrm>
+            <a:off x="284313" y="2282941"/>
+            <a:ext cx="548640" cy="548640"/>
+          </a:xfrm>
+          <a:prstGeom prst="rect">
+            <a:avLst/>
+          </a:prstGeom>
+        </p:spPr>
+      </p:pic>
+      <p:pic>
+        <p:nvPicPr>
+          <p:cNvPr id="36" name="Graphic 35" descr="School girl">
+            <a:extLst>
+              <a:ext uri="{FF2B5EF4-FFF2-40B4-BE49-F238E27FC236}">
+                <a16:creationId xmlns:a16="http://schemas.microsoft.com/office/drawing/2014/main" id="{C2C55299-2E10-C44A-BC63-4DFDA1A799E2}"/>
+              </a:ext>
+            </a:extLst>
+          </p:cNvPr>
+          <p:cNvPicPr>
+            <a:picLocks noChangeAspect="1"/>
+          </p:cNvPicPr>
+          <p:nvPr/>
+        </p:nvPicPr>
+        <p:blipFill>
+          <a:blip r:embed="rId12">
+            <a:extLst>
+              <a:ext uri="{96DAC541-7B7A-43D3-8B79-37D633B846F1}">
+                <asvg:svgBlip xmlns:asvg="http://schemas.microsoft.com/office/drawing/2016/SVG/main" r:embed="rId13"/>
+              </a:ext>
+            </a:extLst>
+          </a:blip>
+          <a:stretch>
+            <a:fillRect/>
+          </a:stretch>
+        </p:blipFill>
+        <p:spPr>
+          <a:xfrm>
+            <a:off x="625309" y="3026741"/>
+            <a:ext cx="548640" cy="548640"/>
+          </a:xfrm>
+          <a:prstGeom prst="rect">
+            <a:avLst/>
+          </a:prstGeom>
+        </p:spPr>
+      </p:pic>
+      <p:pic>
+        <p:nvPicPr>
+          <p:cNvPr id="37" name="Graphic 36" descr="User">
+            <a:extLst>
+              <a:ext uri="{FF2B5EF4-FFF2-40B4-BE49-F238E27FC236}">
+                <a16:creationId xmlns:a16="http://schemas.microsoft.com/office/drawing/2014/main" id="{6FA18981-96F5-2C4E-9FD2-0E3D37F43798}"/>
+              </a:ext>
+            </a:extLst>
+          </p:cNvPr>
+          <p:cNvPicPr>
+            <a:picLocks noChangeAspect="1"/>
+          </p:cNvPicPr>
+          <p:nvPr/>
+        </p:nvPicPr>
+        <p:blipFill>
+          <a:blip r:embed="rId14">
+            <a:extLst>
+              <a:ext uri="{96DAC541-7B7A-43D3-8B79-37D633B846F1}">
+                <asvg:svgBlip xmlns:asvg="http://schemas.microsoft.com/office/drawing/2016/SVG/main" r:embed="rId15"/>
+              </a:ext>
+            </a:extLst>
+          </a:blip>
+          <a:stretch>
+            <a:fillRect/>
+          </a:stretch>
+        </p:blipFill>
+        <p:spPr>
+          <a:xfrm>
+            <a:off x="997771" y="3852601"/>
+            <a:ext cx="548640" cy="548640"/>
+          </a:xfrm>
+          <a:prstGeom prst="rect">
+            <a:avLst/>
+          </a:prstGeom>
+        </p:spPr>
+      </p:pic>
+      <p:pic>
+        <p:nvPicPr>
+          <p:cNvPr id="39" name="Graphic 38" descr="Male profile">
+            <a:extLst>
+              <a:ext uri="{FF2B5EF4-FFF2-40B4-BE49-F238E27FC236}">
+                <a16:creationId xmlns:a16="http://schemas.microsoft.com/office/drawing/2014/main" id="{C31BA2FA-0346-AF4E-9947-474BCEEA1E1A}"/>
+              </a:ext>
+            </a:extLst>
+          </p:cNvPr>
+          <p:cNvPicPr>
+            <a:picLocks noChangeAspect="1"/>
+          </p:cNvPicPr>
+          <p:nvPr/>
+        </p:nvPicPr>
+        <p:blipFill>
+          <a:blip r:embed="rId16">
+            <a:extLst>
+              <a:ext uri="{96DAC541-7B7A-43D3-8B79-37D633B846F1}">
+                <asvg:svgBlip xmlns:asvg="http://schemas.microsoft.com/office/drawing/2016/SVG/main" r:embed="rId17"/>
+              </a:ext>
+            </a:extLst>
+          </a:blip>
+          <a:stretch>
+            <a:fillRect/>
+          </a:stretch>
+        </p:blipFill>
+        <p:spPr>
+          <a:xfrm>
+            <a:off x="260342" y="3984682"/>
+            <a:ext cx="548640" cy="548640"/>
+          </a:xfrm>
+          <a:prstGeom prst="rect">
+            <a:avLst/>
+          </a:prstGeom>
+        </p:spPr>
+      </p:pic>
+      <p:pic>
+        <p:nvPicPr>
+          <p:cNvPr id="40" name="Graphic 39" descr="Male profile">
+            <a:extLst>
+              <a:ext uri="{FF2B5EF4-FFF2-40B4-BE49-F238E27FC236}">
+                <a16:creationId xmlns:a16="http://schemas.microsoft.com/office/drawing/2014/main" id="{31F7B851-1FE9-0041-8F10-EFAE91321223}"/>
+              </a:ext>
+            </a:extLst>
+          </p:cNvPr>
+          <p:cNvPicPr>
+            <a:picLocks noChangeAspect="1"/>
+          </p:cNvPicPr>
+          <p:nvPr/>
+        </p:nvPicPr>
+        <p:blipFill>
+          <a:blip r:embed="rId18">
+            <a:extLst>
+              <a:ext uri="{96DAC541-7B7A-43D3-8B79-37D633B846F1}">
+                <asvg:svgBlip xmlns:asvg="http://schemas.microsoft.com/office/drawing/2016/SVG/main" r:embed="rId19"/>
+              </a:ext>
+            </a:extLst>
+          </a:blip>
+          <a:stretch>
+            <a:fillRect/>
+          </a:stretch>
+        </p:blipFill>
+        <p:spPr>
+          <a:xfrm>
+            <a:off x="1105342" y="2310241"/>
+            <a:ext cx="548640" cy="548640"/>
+          </a:xfrm>
+          <a:prstGeom prst="rect">
+            <a:avLst/>
+          </a:prstGeom>
+        </p:spPr>
+      </p:pic>
+      <p:pic>
+        <p:nvPicPr>
+          <p:cNvPr id="41" name="Graphic 40" descr="User">
+            <a:extLst>
+              <a:ext uri="{FF2B5EF4-FFF2-40B4-BE49-F238E27FC236}">
+                <a16:creationId xmlns:a16="http://schemas.microsoft.com/office/drawing/2014/main" id="{E040F2A3-AFAF-D148-A107-32FE22473B6E}"/>
+              </a:ext>
+            </a:extLst>
+          </p:cNvPr>
+          <p:cNvPicPr>
+            <a:picLocks noChangeAspect="1"/>
+          </p:cNvPicPr>
+          <p:nvPr/>
+        </p:nvPicPr>
+        <p:blipFill>
+          <a:blip r:embed="rId20">
+            <a:extLst>
+              <a:ext uri="{96DAC541-7B7A-43D3-8B79-37D633B846F1}">
+                <asvg:svgBlip xmlns:asvg="http://schemas.microsoft.com/office/drawing/2016/SVG/main" r:embed="rId21"/>
+              </a:ext>
+            </a:extLst>
+          </a:blip>
+          <a:stretch>
+            <a:fillRect/>
+          </a:stretch>
+        </p:blipFill>
+        <p:spPr>
+          <a:xfrm>
+            <a:off x="1096337" y="2834032"/>
+            <a:ext cx="548640" cy="548640"/>
+          </a:xfrm>
+          <a:prstGeom prst="rect">
+            <a:avLst/>
+          </a:prstGeom>
+        </p:spPr>
+      </p:pic>
+      <p:pic>
+        <p:nvPicPr>
+          <p:cNvPr id="42" name="Graphic 41" descr="School girl">
+            <a:extLst>
+              <a:ext uri="{FF2B5EF4-FFF2-40B4-BE49-F238E27FC236}">
+                <a16:creationId xmlns:a16="http://schemas.microsoft.com/office/drawing/2014/main" id="{3F63AF07-EE5F-CF47-A082-F91C131F360C}"/>
+              </a:ext>
+            </a:extLst>
+          </p:cNvPr>
+          <p:cNvPicPr>
+            <a:picLocks noChangeAspect="1"/>
+          </p:cNvPicPr>
+          <p:nvPr/>
+        </p:nvPicPr>
+        <p:blipFill>
+          <a:blip r:embed="rId10">
+            <a:extLst>
+              <a:ext uri="{96DAC541-7B7A-43D3-8B79-37D633B846F1}">
+                <asvg:svgBlip xmlns:asvg="http://schemas.microsoft.com/office/drawing/2016/SVG/main" r:embed="rId11"/>
+              </a:ext>
+            </a:extLst>
+          </a:blip>
+          <a:stretch>
+            <a:fillRect/>
+          </a:stretch>
+        </p:blipFill>
+        <p:spPr>
+          <a:xfrm>
+            <a:off x="1096337" y="3310225"/>
+            <a:ext cx="548640" cy="548640"/>
+          </a:xfrm>
+          <a:prstGeom prst="rect">
+            <a:avLst/>
+          </a:prstGeom>
+        </p:spPr>
+      </p:pic>
+      <p:pic>
+        <p:nvPicPr>
+          <p:cNvPr id="43" name="Graphic 42" descr="Female Profile">
+            <a:extLst>
+              <a:ext uri="{FF2B5EF4-FFF2-40B4-BE49-F238E27FC236}">
+                <a16:creationId xmlns:a16="http://schemas.microsoft.com/office/drawing/2014/main" id="{2627CD7E-A53B-F24A-B1B8-3F6E79640393}"/>
+              </a:ext>
+            </a:extLst>
+          </p:cNvPr>
+          <p:cNvPicPr>
+            <a:picLocks noChangeAspect="1"/>
+          </p:cNvPicPr>
+          <p:nvPr/>
+        </p:nvPicPr>
+        <p:blipFill>
+          <a:blip r:embed="rId4">
+            <a:extLst>
+              <a:ext uri="{96DAC541-7B7A-43D3-8B79-37D633B846F1}">
+                <asvg:svgBlip xmlns:asvg="http://schemas.microsoft.com/office/drawing/2016/SVG/main" r:embed="rId5"/>
+              </a:ext>
+            </a:extLst>
+          </a:blip>
+          <a:stretch>
+            <a:fillRect/>
+          </a:stretch>
+        </p:blipFill>
+        <p:spPr>
+          <a:xfrm>
+            <a:off x="573002" y="3569117"/>
+            <a:ext cx="548640" cy="548640"/>
+          </a:xfrm>
+          <a:prstGeom prst="rect">
+            <a:avLst/>
+          </a:prstGeom>
+        </p:spPr>
+      </p:pic>
+      <p:sp>
+        <p:nvSpPr>
+          <p:cNvPr id="52" name="Rounded Rectangle 51">
+            <a:extLst>
+              <a:ext uri="{FF2B5EF4-FFF2-40B4-BE49-F238E27FC236}">
+                <a16:creationId xmlns:a16="http://schemas.microsoft.com/office/drawing/2014/main" id="{679284B6-69AC-1545-BE16-018888117D47}"/>
               </a:ext>
             </a:extLst>
           </p:cNvPr>
@@ -4978,7 +4998,7 @@
         </p:nvSpPr>
         <p:spPr>
           <a:xfrm>
-            <a:off x="5774655" y="2061399"/>
+            <a:off x="5905285" y="1925327"/>
             <a:ext cx="1170215" cy="674914"/>
           </a:xfrm>
           <a:prstGeom prst="roundRect">
@@ -4986,7 +5006,8 @@
           </a:prstGeom>
           <a:solidFill>
             <a:schemeClr val="accent1">
-              <a:lumMod val="75000"/>
+              <a:lumMod val="60000"/>
+              <a:lumOff val="40000"/>
             </a:schemeClr>
           </a:solidFill>
           <a:ln w="19050">
@@ -5018,23 +5039,20 @@
           <a:lstStyle/>
           <a:p>
             <a:pPr algn="ctr"/>
-            <a:r>
-              <a:rPr lang="en-US" dirty="0">
-                <a:solidFill>
-                  <a:schemeClr val="bg1"/>
-                </a:solidFill>
-              </a:rPr>
-              <a:t>v1.0</a:t>
-            </a:r>
-          </a:p>
-        </p:txBody>
-      </p:sp>
-      <p:sp>
-        <p:nvSpPr>
-          <p:cNvPr id="54" name="Rounded Rectangle 53">
-            <a:extLst>
-              <a:ext uri="{FF2B5EF4-FFF2-40B4-BE49-F238E27FC236}">
-                <a16:creationId xmlns:a16="http://schemas.microsoft.com/office/drawing/2014/main" id="{C6EFCFA5-008A-E54A-9504-84FEF0E7F2F0}"/>
+            <a:endParaRPr lang="en-US" dirty="0">
+              <a:solidFill>
+                <a:schemeClr val="tx1"/>
+              </a:solidFill>
+            </a:endParaRPr>
+          </a:p>
+        </p:txBody>
+      </p:sp>
+      <p:sp>
+        <p:nvSpPr>
+          <p:cNvPr id="53" name="Rounded Rectangle 52">
+            <a:extLst>
+              <a:ext uri="{FF2B5EF4-FFF2-40B4-BE49-F238E27FC236}">
+                <a16:creationId xmlns:a16="http://schemas.microsoft.com/office/drawing/2014/main" id="{7BD1F8B5-1F8A-D543-8BDC-C30167A00E6A}"/>
               </a:ext>
             </a:extLst>
           </p:cNvPr>
@@ -5043,20 +5061,20 @@
         </p:nvSpPr>
         <p:spPr>
           <a:xfrm>
-            <a:off x="5774655" y="4272676"/>
+            <a:off x="5774655" y="2061399"/>
             <a:ext cx="1170215" cy="674914"/>
           </a:xfrm>
           <a:prstGeom prst="roundRect">
             <a:avLst/>
           </a:prstGeom>
           <a:solidFill>
-            <a:schemeClr val="accent6">
+            <a:schemeClr val="accent1">
               <a:lumMod val="75000"/>
             </a:schemeClr>
           </a:solidFill>
           <a:ln w="19050">
             <a:solidFill>
-              <a:schemeClr val="accent6">
+              <a:schemeClr val="accent1">
                 <a:lumMod val="50000"/>
               </a:schemeClr>
             </a:solidFill>
@@ -5089,17 +5107,17 @@
                   <a:schemeClr val="bg1"/>
                 </a:solidFill>
               </a:rPr>
-              <a:t>v2.0</a:t>
-            </a:r>
-          </a:p>
-        </p:txBody>
-      </p:sp>
-      <p:sp>
-        <p:nvSpPr>
-          <p:cNvPr id="56" name="Rounded Rectangle 55">
-            <a:extLst>
-              <a:ext uri="{FF2B5EF4-FFF2-40B4-BE49-F238E27FC236}">
-                <a16:creationId xmlns:a16="http://schemas.microsoft.com/office/drawing/2014/main" id="{055D8326-B9BB-8D40-AB91-9DBD2DB840A9}"/>
+              <a:t>v1.0</a:t>
+            </a:r>
+          </a:p>
+        </p:txBody>
+      </p:sp>
+      <p:sp>
+        <p:nvSpPr>
+          <p:cNvPr id="54" name="Rounded Rectangle 53">
+            <a:extLst>
+              <a:ext uri="{FF2B5EF4-FFF2-40B4-BE49-F238E27FC236}">
+                <a16:creationId xmlns:a16="http://schemas.microsoft.com/office/drawing/2014/main" id="{C6EFCFA5-008A-E54A-9504-84FEF0E7F2F0}"/>
               </a:ext>
             </a:extLst>
           </p:cNvPr>
@@ -5108,18 +5126,22 @@
         </p:nvSpPr>
         <p:spPr>
           <a:xfrm>
-            <a:off x="4781170" y="3116049"/>
-            <a:ext cx="689886" cy="618939"/>
+            <a:off x="5774655" y="4272676"/>
+            <a:ext cx="1170215" cy="674914"/>
           </a:xfrm>
           <a:prstGeom prst="roundRect">
             <a:avLst/>
           </a:prstGeom>
           <a:solidFill>
-            <a:schemeClr val="bg1"/>
+            <a:schemeClr val="accent6">
+              <a:lumMod val="75000"/>
+            </a:schemeClr>
           </a:solidFill>
-          <a:ln>
+          <a:ln w="19050">
             <a:solidFill>
-              <a:schemeClr val="bg1"/>
+              <a:schemeClr val="accent6">
+                <a:lumMod val="50000"/>
+              </a:schemeClr>
             </a:solidFill>
           </a:ln>
         </p:spPr>
@@ -5144,16 +5166,23 @@
           <a:lstStyle/>
           <a:p>
             <a:pPr algn="ctr"/>
-            <a:endParaRPr lang="en-US"/>
-          </a:p>
-        </p:txBody>
-      </p:sp>
-      <p:sp>
-        <p:nvSpPr>
-          <p:cNvPr id="73" name="Rounded Rectangle 72">
-            <a:extLst>
-              <a:ext uri="{FF2B5EF4-FFF2-40B4-BE49-F238E27FC236}">
-                <a16:creationId xmlns:a16="http://schemas.microsoft.com/office/drawing/2014/main" id="{E71FD733-5596-9147-92A5-95EF2ED71511}"/>
+            <a:r>
+              <a:rPr lang="en-US" dirty="0">
+                <a:solidFill>
+                  <a:schemeClr val="bg1"/>
+                </a:solidFill>
+              </a:rPr>
+              <a:t>v2.0</a:t>
+            </a:r>
+          </a:p>
+        </p:txBody>
+      </p:sp>
+      <p:sp>
+        <p:nvSpPr>
+          <p:cNvPr id="56" name="Rounded Rectangle 55">
+            <a:extLst>
+              <a:ext uri="{FF2B5EF4-FFF2-40B4-BE49-F238E27FC236}">
+                <a16:creationId xmlns:a16="http://schemas.microsoft.com/office/drawing/2014/main" id="{055D8326-B9BB-8D40-AB91-9DBD2DB840A9}"/>
               </a:ext>
             </a:extLst>
           </p:cNvPr>
@@ -5162,8 +5191,8 @@
         </p:nvSpPr>
         <p:spPr>
           <a:xfrm>
-            <a:off x="4676841" y="2858881"/>
-            <a:ext cx="816445" cy="1041636"/>
+            <a:off x="4781170" y="3116049"/>
+            <a:ext cx="689886" cy="618939"/>
           </a:xfrm>
           <a:prstGeom prst="roundRect">
             <a:avLst/>
@@ -5202,84 +5231,12 @@
           </a:p>
         </p:txBody>
       </p:sp>
-      <p:pic>
-        <p:nvPicPr>
-          <p:cNvPr id="72" name="Graphic 71" descr="Server">
-            <a:extLst>
-              <a:ext uri="{FF2B5EF4-FFF2-40B4-BE49-F238E27FC236}">
-                <a16:creationId xmlns:a16="http://schemas.microsoft.com/office/drawing/2014/main" id="{55EEA0B0-993C-C64E-9A52-07B2BC96EB02}"/>
-              </a:ext>
-            </a:extLst>
-          </p:cNvPr>
-          <p:cNvPicPr>
-            <a:picLocks noChangeAspect="1"/>
-          </p:cNvPicPr>
-          <p:nvPr/>
-        </p:nvPicPr>
-        <p:blipFill>
-          <a:blip r:embed="rId22">
-            <a:extLst>
-              <a:ext uri="{96DAC541-7B7A-43D3-8B79-37D633B846F1}">
-                <asvg:svgBlip xmlns:asvg="http://schemas.microsoft.com/office/drawing/2016/SVG/main" r:embed="rId23"/>
-              </a:ext>
-            </a:extLst>
-          </a:blip>
-          <a:stretch>
-            <a:fillRect/>
-          </a:stretch>
-        </p:blipFill>
-        <p:spPr>
-          <a:xfrm>
-            <a:off x="2168312" y="3005254"/>
-            <a:ext cx="914400" cy="914400"/>
-          </a:xfrm>
-          <a:prstGeom prst="rect">
-            <a:avLst/>
-          </a:prstGeom>
-        </p:spPr>
-      </p:pic>
-      <p:pic>
-        <p:nvPicPr>
-          <p:cNvPr id="57" name="Graphic 56" descr="Server">
-            <a:extLst>
-              <a:ext uri="{FF2B5EF4-FFF2-40B4-BE49-F238E27FC236}">
-                <a16:creationId xmlns:a16="http://schemas.microsoft.com/office/drawing/2014/main" id="{1377B7FF-9024-EE45-8EA2-E4370E391F91}"/>
-              </a:ext>
-            </a:extLst>
-          </p:cNvPr>
-          <p:cNvPicPr>
-            <a:picLocks noChangeAspect="1"/>
-          </p:cNvPicPr>
-          <p:nvPr/>
-        </p:nvPicPr>
-        <p:blipFill>
-          <a:blip r:embed="rId22">
-            <a:extLst>
-              <a:ext uri="{96DAC541-7B7A-43D3-8B79-37D633B846F1}">
-                <asvg:svgBlip xmlns:asvg="http://schemas.microsoft.com/office/drawing/2016/SVG/main" r:embed="rId23"/>
-              </a:ext>
-            </a:extLst>
-          </a:blip>
-          <a:stretch>
-            <a:fillRect/>
-          </a:stretch>
-        </p:blipFill>
-        <p:spPr>
-          <a:xfrm>
-            <a:off x="4681839" y="3005254"/>
-            <a:ext cx="914400" cy="914400"/>
-          </a:xfrm>
-          <a:prstGeom prst="rect">
-            <a:avLst/>
-          </a:prstGeom>
-        </p:spPr>
-      </p:pic>
-      <p:sp>
-        <p:nvSpPr>
-          <p:cNvPr id="70" name="Rounded Rectangle 69">
-            <a:extLst>
-              <a:ext uri="{FF2B5EF4-FFF2-40B4-BE49-F238E27FC236}">
-                <a16:creationId xmlns:a16="http://schemas.microsoft.com/office/drawing/2014/main" id="{A81DBC97-4326-7A42-BAFD-7AA34B39351F}"/>
+      <p:sp>
+        <p:nvSpPr>
+          <p:cNvPr id="73" name="Rounded Rectangle 72">
+            <a:extLst>
+              <a:ext uri="{FF2B5EF4-FFF2-40B4-BE49-F238E27FC236}">
+                <a16:creationId xmlns:a16="http://schemas.microsoft.com/office/drawing/2014/main" id="{E71FD733-5596-9147-92A5-95EF2ED71511}"/>
               </a:ext>
             </a:extLst>
           </p:cNvPr>
@@ -5288,23 +5245,18 @@
         </p:nvSpPr>
         <p:spPr>
           <a:xfrm>
-            <a:off x="8263722" y="4147864"/>
-            <a:ext cx="1170215" cy="674914"/>
+            <a:off x="4676841" y="2858881"/>
+            <a:ext cx="816445" cy="1041636"/>
           </a:xfrm>
           <a:prstGeom prst="roundRect">
             <a:avLst/>
           </a:prstGeom>
           <a:solidFill>
-            <a:schemeClr val="accent6">
-              <a:lumMod val="60000"/>
-              <a:lumOff val="40000"/>
-            </a:schemeClr>
+            <a:schemeClr val="bg1"/>
           </a:solidFill>
-          <a:ln w="19050">
+          <a:ln>
             <a:solidFill>
-              <a:schemeClr val="accent6">
-                <a:lumMod val="50000"/>
-              </a:schemeClr>
+              <a:schemeClr val="bg1"/>
             </a:solidFill>
           </a:ln>
         </p:spPr>
@@ -5329,20 +5281,88 @@
           <a:lstStyle/>
           <a:p>
             <a:pPr algn="ctr"/>
-            <a:endParaRPr lang="en-US" dirty="0">
-              <a:solidFill>
-                <a:schemeClr val="tx1"/>
-              </a:solidFill>
-            </a:endParaRPr>
-          </a:p>
-        </p:txBody>
-      </p:sp>
-      <p:sp>
-        <p:nvSpPr>
-          <p:cNvPr id="71" name="Curved Up Arrow 70">
-            <a:extLst>
-              <a:ext uri="{FF2B5EF4-FFF2-40B4-BE49-F238E27FC236}">
-                <a16:creationId xmlns:a16="http://schemas.microsoft.com/office/drawing/2014/main" id="{6A8FC5E4-D3C7-3046-B1AB-FAD880964032}"/>
+            <a:endParaRPr lang="en-US"/>
+          </a:p>
+        </p:txBody>
+      </p:sp>
+      <p:pic>
+        <p:nvPicPr>
+          <p:cNvPr id="72" name="Graphic 71" descr="Server">
+            <a:extLst>
+              <a:ext uri="{FF2B5EF4-FFF2-40B4-BE49-F238E27FC236}">
+                <a16:creationId xmlns:a16="http://schemas.microsoft.com/office/drawing/2014/main" id="{55EEA0B0-993C-C64E-9A52-07B2BC96EB02}"/>
+              </a:ext>
+            </a:extLst>
+          </p:cNvPr>
+          <p:cNvPicPr>
+            <a:picLocks noChangeAspect="1"/>
+          </p:cNvPicPr>
+          <p:nvPr/>
+        </p:nvPicPr>
+        <p:blipFill>
+          <a:blip r:embed="rId22">
+            <a:extLst>
+              <a:ext uri="{96DAC541-7B7A-43D3-8B79-37D633B846F1}">
+                <asvg:svgBlip xmlns:asvg="http://schemas.microsoft.com/office/drawing/2016/SVG/main" r:embed="rId23"/>
+              </a:ext>
+            </a:extLst>
+          </a:blip>
+          <a:stretch>
+            <a:fillRect/>
+          </a:stretch>
+        </p:blipFill>
+        <p:spPr>
+          <a:xfrm>
+            <a:off x="2168312" y="3005254"/>
+            <a:ext cx="914400" cy="914400"/>
+          </a:xfrm>
+          <a:prstGeom prst="rect">
+            <a:avLst/>
+          </a:prstGeom>
+        </p:spPr>
+      </p:pic>
+      <p:pic>
+        <p:nvPicPr>
+          <p:cNvPr id="57" name="Graphic 56" descr="Server">
+            <a:extLst>
+              <a:ext uri="{FF2B5EF4-FFF2-40B4-BE49-F238E27FC236}">
+                <a16:creationId xmlns:a16="http://schemas.microsoft.com/office/drawing/2014/main" id="{1377B7FF-9024-EE45-8EA2-E4370E391F91}"/>
+              </a:ext>
+            </a:extLst>
+          </p:cNvPr>
+          <p:cNvPicPr>
+            <a:picLocks noChangeAspect="1"/>
+          </p:cNvPicPr>
+          <p:nvPr/>
+        </p:nvPicPr>
+        <p:blipFill>
+          <a:blip r:embed="rId22">
+            <a:extLst>
+              <a:ext uri="{96DAC541-7B7A-43D3-8B79-37D633B846F1}">
+                <asvg:svgBlip xmlns:asvg="http://schemas.microsoft.com/office/drawing/2016/SVG/main" r:embed="rId23"/>
+              </a:ext>
+            </a:extLst>
+          </a:blip>
+          <a:stretch>
+            <a:fillRect/>
+          </a:stretch>
+        </p:blipFill>
+        <p:spPr>
+          <a:xfrm>
+            <a:off x="4681839" y="3005254"/>
+            <a:ext cx="914400" cy="914400"/>
+          </a:xfrm>
+          <a:prstGeom prst="rect">
+            <a:avLst/>
+          </a:prstGeom>
+        </p:spPr>
+      </p:pic>
+      <p:sp>
+        <p:nvSpPr>
+          <p:cNvPr id="70" name="Rounded Rectangle 69">
+            <a:extLst>
+              <a:ext uri="{FF2B5EF4-FFF2-40B4-BE49-F238E27FC236}">
+                <a16:creationId xmlns:a16="http://schemas.microsoft.com/office/drawing/2014/main" id="{A81DBC97-4326-7A42-BAFD-7AA34B39351F}"/>
               </a:ext>
             </a:extLst>
           </p:cNvPr>
@@ -5351,24 +5371,21 @@
         </p:nvSpPr>
         <p:spPr>
           <a:xfrm>
-            <a:off x="7324888" y="2929053"/>
-            <a:ext cx="1271030" cy="397329"/>
-          </a:xfrm>
-          <a:prstGeom prst="curvedUpArrow">
-            <a:avLst>
-              <a:gd name="adj1" fmla="val 13236"/>
-              <a:gd name="adj2" fmla="val 50000"/>
-              <a:gd name="adj3" fmla="val 25000"/>
-            </a:avLst>
+            <a:off x="8263722" y="4147864"/>
+            <a:ext cx="1170215" cy="674914"/>
+          </a:xfrm>
+          <a:prstGeom prst="roundRect">
+            <a:avLst/>
           </a:prstGeom>
           <a:solidFill>
-            <a:schemeClr val="accent1">
-              <a:lumMod val="75000"/>
+            <a:schemeClr val="accent6">
+              <a:lumMod val="60000"/>
+              <a:lumOff val="40000"/>
             </a:schemeClr>
           </a:solidFill>
-          <a:ln>
+          <a:ln w="19050">
             <a:solidFill>
-              <a:schemeClr val="accent1">
+              <a:schemeClr val="accent6">
                 <a:lumMod val="50000"/>
               </a:schemeClr>
             </a:solidFill>
@@ -5395,7 +5412,7 @@
           <a:lstStyle/>
           <a:p>
             <a:pPr algn="ctr"/>
-            <a:endParaRPr lang="en-US">
+            <a:endParaRPr lang="en-US" dirty="0">
               <a:solidFill>
                 <a:schemeClr val="tx1"/>
               </a:solidFill>
@@ -5405,10 +5422,10 @@
       </p:sp>
       <p:sp>
         <p:nvSpPr>
-          <p:cNvPr id="74" name="Curved Up Arrow 73">
-            <a:extLst>
-              <a:ext uri="{FF2B5EF4-FFF2-40B4-BE49-F238E27FC236}">
-                <a16:creationId xmlns:a16="http://schemas.microsoft.com/office/drawing/2014/main" id="{8CA19FD9-0AEB-DB48-BAC6-08DD092434DE}"/>
+          <p:cNvPr id="71" name="Curved Up Arrow 70">
+            <a:extLst>
+              <a:ext uri="{FF2B5EF4-FFF2-40B4-BE49-F238E27FC236}">
+                <a16:creationId xmlns:a16="http://schemas.microsoft.com/office/drawing/2014/main" id="{6A8FC5E4-D3C7-3046-B1AB-FAD880964032}"/>
               </a:ext>
             </a:extLst>
           </p:cNvPr>
@@ -5416,9 +5433,9 @@
           <p:nvPr/>
         </p:nvSpPr>
         <p:spPr>
-          <a:xfrm flipV="1">
-            <a:off x="7383397" y="3426987"/>
-            <a:ext cx="1212521" cy="397329"/>
+          <a:xfrm>
+            <a:off x="7324888" y="2929053"/>
+            <a:ext cx="1271030" cy="397329"/>
           </a:xfrm>
           <a:prstGeom prst="curvedUpArrow">
             <a:avLst>
@@ -5428,13 +5445,13 @@
             </a:avLst>
           </a:prstGeom>
           <a:solidFill>
-            <a:schemeClr val="accent6">
+            <a:schemeClr val="accent1">
               <a:lumMod val="75000"/>
             </a:schemeClr>
           </a:solidFill>
           <a:ln>
             <a:solidFill>
-              <a:schemeClr val="accent6">
+              <a:schemeClr val="accent1">
                 <a:lumMod val="50000"/>
               </a:schemeClr>
             </a:solidFill>
@@ -5471,10 +5488,10 @@
       </p:sp>
       <p:sp>
         <p:nvSpPr>
-          <p:cNvPr id="76" name="Rounded Rectangle 75">
-            <a:extLst>
-              <a:ext uri="{FF2B5EF4-FFF2-40B4-BE49-F238E27FC236}">
-                <a16:creationId xmlns:a16="http://schemas.microsoft.com/office/drawing/2014/main" id="{17597C80-A437-9C40-BC16-CBECB19E11C1}"/>
+          <p:cNvPr id="74" name="Curved Up Arrow 73">
+            <a:extLst>
+              <a:ext uri="{FF2B5EF4-FFF2-40B4-BE49-F238E27FC236}">
+                <a16:creationId xmlns:a16="http://schemas.microsoft.com/office/drawing/2014/main" id="{8CA19FD9-0AEB-DB48-BAC6-08DD092434DE}"/>
               </a:ext>
             </a:extLst>
           </p:cNvPr>
@@ -5482,21 +5499,25 @@
           <p:nvPr/>
         </p:nvSpPr>
         <p:spPr>
-          <a:xfrm>
-            <a:off x="8159292" y="2061399"/>
-            <a:ext cx="1170215" cy="674914"/>
-          </a:xfrm>
-          <a:prstGeom prst="roundRect">
-            <a:avLst/>
+          <a:xfrm flipV="1">
+            <a:off x="7383397" y="3426987"/>
+            <a:ext cx="1212521" cy="397329"/>
+          </a:xfrm>
+          <a:prstGeom prst="curvedUpArrow">
+            <a:avLst>
+              <a:gd name="adj1" fmla="val 13236"/>
+              <a:gd name="adj2" fmla="val 50000"/>
+              <a:gd name="adj3" fmla="val 25000"/>
+            </a:avLst>
           </a:prstGeom>
           <a:solidFill>
-            <a:schemeClr val="accent1">
+            <a:schemeClr val="accent6">
               <a:lumMod val="75000"/>
             </a:schemeClr>
           </a:solidFill>
-          <a:ln w="19050">
+          <a:ln>
             <a:solidFill>
-              <a:schemeClr val="accent1">
+              <a:schemeClr val="accent6">
                 <a:lumMod val="50000"/>
               </a:schemeClr>
             </a:solidFill>
@@ -5523,23 +5544,20 @@
           <a:lstStyle/>
           <a:p>
             <a:pPr algn="ctr"/>
-            <a:r>
-              <a:rPr lang="en-US" dirty="0">
-                <a:solidFill>
-                  <a:schemeClr val="bg1"/>
-                </a:solidFill>
-              </a:rPr>
-              <a:t>v1.0</a:t>
-            </a:r>
-          </a:p>
-        </p:txBody>
-      </p:sp>
-      <p:sp>
-        <p:nvSpPr>
-          <p:cNvPr id="77" name="Rounded Rectangle 76">
-            <a:extLst>
-              <a:ext uri="{FF2B5EF4-FFF2-40B4-BE49-F238E27FC236}">
-                <a16:creationId xmlns:a16="http://schemas.microsoft.com/office/drawing/2014/main" id="{CE070102-5BA5-1B44-9287-39DC0017C162}"/>
+            <a:endParaRPr lang="en-US">
+              <a:solidFill>
+                <a:schemeClr val="tx1"/>
+              </a:solidFill>
+            </a:endParaRPr>
+          </a:p>
+        </p:txBody>
+      </p:sp>
+      <p:sp>
+        <p:nvSpPr>
+          <p:cNvPr id="76" name="Rounded Rectangle 75">
+            <a:extLst>
+              <a:ext uri="{FF2B5EF4-FFF2-40B4-BE49-F238E27FC236}">
+                <a16:creationId xmlns:a16="http://schemas.microsoft.com/office/drawing/2014/main" id="{17597C80-A437-9C40-BC16-CBECB19E11C1}"/>
               </a:ext>
             </a:extLst>
           </p:cNvPr>
@@ -5548,20 +5566,20 @@
         </p:nvSpPr>
         <p:spPr>
           <a:xfrm>
-            <a:off x="8159292" y="4272676"/>
+            <a:off x="8159292" y="2061399"/>
             <a:ext cx="1170215" cy="674914"/>
           </a:xfrm>
           <a:prstGeom prst="roundRect">
             <a:avLst/>
           </a:prstGeom>
           <a:solidFill>
-            <a:schemeClr val="accent6">
+            <a:schemeClr val="accent1">
               <a:lumMod val="75000"/>
             </a:schemeClr>
           </a:solidFill>
           <a:ln w="19050">
             <a:solidFill>
-              <a:schemeClr val="accent6">
+              <a:schemeClr val="accent1">
                 <a:lumMod val="50000"/>
               </a:schemeClr>
             </a:solidFill>
@@ -5594,17 +5612,17 @@
                   <a:schemeClr val="bg1"/>
                 </a:solidFill>
               </a:rPr>
-              <a:t>v2.0</a:t>
-            </a:r>
-          </a:p>
-        </p:txBody>
-      </p:sp>
-      <p:sp>
-        <p:nvSpPr>
-          <p:cNvPr id="83" name="Rounded Rectangle 82">
-            <a:extLst>
-              <a:ext uri="{FF2B5EF4-FFF2-40B4-BE49-F238E27FC236}">
-                <a16:creationId xmlns:a16="http://schemas.microsoft.com/office/drawing/2014/main" id="{6656F4DF-FFBE-EE4C-993B-99617CD58386}"/>
+              <a:t>v1.0</a:t>
+            </a:r>
+          </a:p>
+        </p:txBody>
+      </p:sp>
+      <p:sp>
+        <p:nvSpPr>
+          <p:cNvPr id="77" name="Rounded Rectangle 76">
+            <a:extLst>
+              <a:ext uri="{FF2B5EF4-FFF2-40B4-BE49-F238E27FC236}">
+                <a16:creationId xmlns:a16="http://schemas.microsoft.com/office/drawing/2014/main" id="{CE070102-5BA5-1B44-9287-39DC0017C162}"/>
               </a:ext>
             </a:extLst>
           </p:cNvPr>
@@ -5613,18 +5631,22 @@
         </p:nvSpPr>
         <p:spPr>
           <a:xfrm>
-            <a:off x="7180185" y="2848628"/>
-            <a:ext cx="816445" cy="1041636"/>
+            <a:off x="8159292" y="4272676"/>
+            <a:ext cx="1170215" cy="674914"/>
           </a:xfrm>
           <a:prstGeom prst="roundRect">
             <a:avLst/>
           </a:prstGeom>
           <a:solidFill>
-            <a:schemeClr val="bg1"/>
+            <a:schemeClr val="accent6">
+              <a:lumMod val="75000"/>
+            </a:schemeClr>
           </a:solidFill>
-          <a:ln>
+          <a:ln w="19050">
             <a:solidFill>
-              <a:schemeClr val="bg1"/>
+              <a:schemeClr val="accent6">
+                <a:lumMod val="50000"/>
+              </a:schemeClr>
             </a:solidFill>
           </a:ln>
         </p:spPr>
@@ -5649,52 +5671,23 @@
           <a:lstStyle/>
           <a:p>
             <a:pPr algn="ctr"/>
-            <a:endParaRPr lang="en-US"/>
-          </a:p>
-        </p:txBody>
-      </p:sp>
-      <p:pic>
-        <p:nvPicPr>
-          <p:cNvPr id="84" name="Graphic 83" descr="Server">
-            <a:extLst>
-              <a:ext uri="{FF2B5EF4-FFF2-40B4-BE49-F238E27FC236}">
-                <a16:creationId xmlns:a16="http://schemas.microsoft.com/office/drawing/2014/main" id="{95494DAB-1ECB-1844-857E-C71519E2842C}"/>
-              </a:ext>
-            </a:extLst>
-          </p:cNvPr>
-          <p:cNvPicPr>
-            <a:picLocks noChangeAspect="1"/>
-          </p:cNvPicPr>
-          <p:nvPr/>
-        </p:nvPicPr>
-        <p:blipFill>
-          <a:blip r:embed="rId22">
-            <a:extLst>
-              <a:ext uri="{96DAC541-7B7A-43D3-8B79-37D633B846F1}">
-                <asvg:svgBlip xmlns:asvg="http://schemas.microsoft.com/office/drawing/2016/SVG/main" r:embed="rId23"/>
-              </a:ext>
-            </a:extLst>
-          </a:blip>
-          <a:stretch>
-            <a:fillRect/>
-          </a:stretch>
-        </p:blipFill>
-        <p:spPr>
-          <a:xfrm>
-            <a:off x="7194808" y="2975864"/>
-            <a:ext cx="914400" cy="914400"/>
-          </a:xfrm>
-          <a:prstGeom prst="rect">
-            <a:avLst/>
-          </a:prstGeom>
-        </p:spPr>
-      </p:pic>
-      <p:sp>
-        <p:nvSpPr>
-          <p:cNvPr id="86" name="Rounded Rectangle 85">
-            <a:extLst>
-              <a:ext uri="{FF2B5EF4-FFF2-40B4-BE49-F238E27FC236}">
-                <a16:creationId xmlns:a16="http://schemas.microsoft.com/office/drawing/2014/main" id="{108FF632-71A4-BE48-B037-49620092C270}"/>
+            <a:r>
+              <a:rPr lang="en-US" dirty="0">
+                <a:solidFill>
+                  <a:schemeClr val="bg1"/>
+                </a:solidFill>
+              </a:rPr>
+              <a:t>v2.0</a:t>
+            </a:r>
+          </a:p>
+        </p:txBody>
+      </p:sp>
+      <p:sp>
+        <p:nvSpPr>
+          <p:cNvPr id="83" name="Rounded Rectangle 82">
+            <a:extLst>
+              <a:ext uri="{FF2B5EF4-FFF2-40B4-BE49-F238E27FC236}">
+                <a16:creationId xmlns:a16="http://schemas.microsoft.com/office/drawing/2014/main" id="{6656F4DF-FFBE-EE4C-993B-99617CD58386}"/>
               </a:ext>
             </a:extLst>
           </p:cNvPr>
@@ -5703,23 +5696,18 @@
         </p:nvSpPr>
         <p:spPr>
           <a:xfrm>
-            <a:off x="10738909" y="4026533"/>
-            <a:ext cx="1170215" cy="674914"/>
+            <a:off x="7180185" y="2848628"/>
+            <a:ext cx="816445" cy="1041636"/>
           </a:xfrm>
           <a:prstGeom prst="roundRect">
             <a:avLst/>
           </a:prstGeom>
           <a:solidFill>
-            <a:schemeClr val="accent6">
-              <a:lumMod val="40000"/>
-              <a:lumOff val="60000"/>
-            </a:schemeClr>
+            <a:schemeClr val="bg1"/>
           </a:solidFill>
-          <a:ln w="19050">
+          <a:ln>
             <a:solidFill>
-              <a:schemeClr val="accent6">
-                <a:lumMod val="50000"/>
-              </a:schemeClr>
+              <a:schemeClr val="bg1"/>
             </a:solidFill>
           </a:ln>
         </p:spPr>
@@ -5744,20 +5732,52 @@
           <a:lstStyle/>
           <a:p>
             <a:pPr algn="ctr"/>
-            <a:endParaRPr lang="en-US" dirty="0">
-              <a:solidFill>
-                <a:schemeClr val="tx1"/>
-              </a:solidFill>
-            </a:endParaRPr>
-          </a:p>
-        </p:txBody>
-      </p:sp>
-      <p:sp>
-        <p:nvSpPr>
-          <p:cNvPr id="87" name="Rounded Rectangle 86">
-            <a:extLst>
-              <a:ext uri="{FF2B5EF4-FFF2-40B4-BE49-F238E27FC236}">
-                <a16:creationId xmlns:a16="http://schemas.microsoft.com/office/drawing/2014/main" id="{970EA12E-AC9F-AF41-9168-2444020C900B}"/>
+            <a:endParaRPr lang="en-US"/>
+          </a:p>
+        </p:txBody>
+      </p:sp>
+      <p:pic>
+        <p:nvPicPr>
+          <p:cNvPr id="84" name="Graphic 83" descr="Server">
+            <a:extLst>
+              <a:ext uri="{FF2B5EF4-FFF2-40B4-BE49-F238E27FC236}">
+                <a16:creationId xmlns:a16="http://schemas.microsoft.com/office/drawing/2014/main" id="{95494DAB-1ECB-1844-857E-C71519E2842C}"/>
+              </a:ext>
+            </a:extLst>
+          </p:cNvPr>
+          <p:cNvPicPr>
+            <a:picLocks noChangeAspect="1"/>
+          </p:cNvPicPr>
+          <p:nvPr/>
+        </p:nvPicPr>
+        <p:blipFill>
+          <a:blip r:embed="rId22">
+            <a:extLst>
+              <a:ext uri="{96DAC541-7B7A-43D3-8B79-37D633B846F1}">
+                <asvg:svgBlip xmlns:asvg="http://schemas.microsoft.com/office/drawing/2016/SVG/main" r:embed="rId23"/>
+              </a:ext>
+            </a:extLst>
+          </a:blip>
+          <a:stretch>
+            <a:fillRect/>
+          </a:stretch>
+        </p:blipFill>
+        <p:spPr>
+          <a:xfrm>
+            <a:off x="7194808" y="2975864"/>
+            <a:ext cx="914400" cy="914400"/>
+          </a:xfrm>
+          <a:prstGeom prst="rect">
+            <a:avLst/>
+          </a:prstGeom>
+        </p:spPr>
+      </p:pic>
+      <p:sp>
+        <p:nvSpPr>
+          <p:cNvPr id="86" name="Rounded Rectangle 85">
+            <a:extLst>
+              <a:ext uri="{FF2B5EF4-FFF2-40B4-BE49-F238E27FC236}">
+                <a16:creationId xmlns:a16="http://schemas.microsoft.com/office/drawing/2014/main" id="{108FF632-71A4-BE48-B037-49620092C270}"/>
               </a:ext>
             </a:extLst>
           </p:cNvPr>
@@ -5766,7 +5786,7 @@
         </p:nvSpPr>
         <p:spPr>
           <a:xfrm>
-            <a:off x="10597395" y="4136604"/>
+            <a:off x="10738909" y="4268270"/>
             <a:ext cx="1170215" cy="674914"/>
           </a:xfrm>
           <a:prstGeom prst="roundRect">
@@ -5774,8 +5794,8 @@
           </a:prstGeom>
           <a:solidFill>
             <a:schemeClr val="accent6">
-              <a:lumMod val="60000"/>
-              <a:lumOff val="40000"/>
+              <a:lumMod val="40000"/>
+              <a:lumOff val="60000"/>
             </a:schemeClr>
           </a:solidFill>
           <a:ln w="19050">
@@ -5817,10 +5837,10 @@
       </p:sp>
       <p:sp>
         <p:nvSpPr>
-          <p:cNvPr id="88" name="Rounded Rectangle 87">
-            <a:extLst>
-              <a:ext uri="{FF2B5EF4-FFF2-40B4-BE49-F238E27FC236}">
-                <a16:creationId xmlns:a16="http://schemas.microsoft.com/office/drawing/2014/main" id="{FE39CC48-3E68-FA4A-AA40-B3D6C290C042}"/>
+          <p:cNvPr id="87" name="Rounded Rectangle 86">
+            <a:extLst>
+              <a:ext uri="{FF2B5EF4-FFF2-40B4-BE49-F238E27FC236}">
+                <a16:creationId xmlns:a16="http://schemas.microsoft.com/office/drawing/2014/main" id="{970EA12E-AC9F-AF41-9168-2444020C900B}"/>
               </a:ext>
             </a:extLst>
           </p:cNvPr>
@@ -5829,7 +5849,7 @@
         </p:nvSpPr>
         <p:spPr>
           <a:xfrm>
-            <a:off x="10466766" y="4272676"/>
+            <a:off x="10597395" y="4378341"/>
             <a:ext cx="1170215" cy="674914"/>
           </a:xfrm>
           <a:prstGeom prst="roundRect">
@@ -5837,7 +5857,8 @@
           </a:prstGeom>
           <a:solidFill>
             <a:schemeClr val="accent6">
-              <a:lumMod val="75000"/>
+              <a:lumMod val="60000"/>
+              <a:lumOff val="40000"/>
             </a:schemeClr>
           </a:solidFill>
           <a:ln w="19050">
@@ -5869,23 +5890,20 @@
           <a:lstStyle/>
           <a:p>
             <a:pPr algn="ctr"/>
-            <a:r>
-              <a:rPr lang="en-US" dirty="0">
-                <a:solidFill>
-                  <a:schemeClr val="bg1"/>
-                </a:solidFill>
-              </a:rPr>
-              <a:t>v2.0</a:t>
-            </a:r>
-          </a:p>
-        </p:txBody>
-      </p:sp>
-      <p:sp>
-        <p:nvSpPr>
-          <p:cNvPr id="90" name="Curved Up Arrow 89">
-            <a:extLst>
-              <a:ext uri="{FF2B5EF4-FFF2-40B4-BE49-F238E27FC236}">
-                <a16:creationId xmlns:a16="http://schemas.microsoft.com/office/drawing/2014/main" id="{BC1EF30E-0F6A-5148-A3F7-C3E251FF7F39}"/>
+            <a:endParaRPr lang="en-US" dirty="0">
+              <a:solidFill>
+                <a:schemeClr val="tx1"/>
+              </a:solidFill>
+            </a:endParaRPr>
+          </a:p>
+        </p:txBody>
+      </p:sp>
+      <p:sp>
+        <p:nvSpPr>
+          <p:cNvPr id="88" name="Rounded Rectangle 87">
+            <a:extLst>
+              <a:ext uri="{FF2B5EF4-FFF2-40B4-BE49-F238E27FC236}">
+                <a16:creationId xmlns:a16="http://schemas.microsoft.com/office/drawing/2014/main" id="{FE39CC48-3E68-FA4A-AA40-B3D6C290C042}"/>
               </a:ext>
             </a:extLst>
           </p:cNvPr>
@@ -5893,23 +5911,19 @@
           <p:nvPr/>
         </p:nvSpPr>
         <p:spPr>
-          <a:xfrm flipV="1">
-            <a:off x="9733003" y="3440213"/>
-            <a:ext cx="1212521" cy="397329"/>
-          </a:xfrm>
-          <a:prstGeom prst="curvedUpArrow">
-            <a:avLst>
-              <a:gd name="adj1" fmla="val 13236"/>
-              <a:gd name="adj2" fmla="val 50000"/>
-              <a:gd name="adj3" fmla="val 25000"/>
-            </a:avLst>
+          <a:xfrm>
+            <a:off x="10466766" y="4514413"/>
+            <a:ext cx="1170215" cy="674914"/>
+          </a:xfrm>
+          <a:prstGeom prst="roundRect">
+            <a:avLst/>
           </a:prstGeom>
           <a:solidFill>
             <a:schemeClr val="accent6">
               <a:lumMod val="75000"/>
             </a:schemeClr>
           </a:solidFill>
-          <a:ln>
+          <a:ln w="19050">
             <a:solidFill>
               <a:schemeClr val="accent6">
                 <a:lumMod val="50000"/>
@@ -5938,11 +5952,14 @@
           <a:lstStyle/>
           <a:p>
             <a:pPr algn="ctr"/>
-            <a:endParaRPr lang="en-US">
-              <a:solidFill>
-                <a:schemeClr val="tx1"/>
-              </a:solidFill>
-            </a:endParaRPr>
+            <a:r>
+              <a:rPr lang="en-US" dirty="0">
+                <a:solidFill>
+                  <a:schemeClr val="bg1"/>
+                </a:solidFill>
+              </a:rPr>
+              <a:t>v2.0</a:t>
+            </a:r>
           </a:p>
         </p:txBody>
       </p:sp>
@@ -6000,42 +6017,6 @@
           </a:p>
         </p:txBody>
       </p:sp>
-      <p:pic>
-        <p:nvPicPr>
-          <p:cNvPr id="92" name="Graphic 91" descr="Server">
-            <a:extLst>
-              <a:ext uri="{FF2B5EF4-FFF2-40B4-BE49-F238E27FC236}">
-                <a16:creationId xmlns:a16="http://schemas.microsoft.com/office/drawing/2014/main" id="{E11714EC-118E-8641-B007-EA9048181641}"/>
-              </a:ext>
-            </a:extLst>
-          </p:cNvPr>
-          <p:cNvPicPr>
-            <a:picLocks noChangeAspect="1"/>
-          </p:cNvPicPr>
-          <p:nvPr/>
-        </p:nvPicPr>
-        <p:blipFill>
-          <a:blip r:embed="rId22">
-            <a:extLst>
-              <a:ext uri="{96DAC541-7B7A-43D3-8B79-37D633B846F1}">
-                <asvg:svgBlip xmlns:asvg="http://schemas.microsoft.com/office/drawing/2016/SVG/main" r:embed="rId23"/>
-              </a:ext>
-            </a:extLst>
-          </a:blip>
-          <a:stretch>
-            <a:fillRect/>
-          </a:stretch>
-        </p:blipFill>
-        <p:spPr>
-          <a:xfrm>
-            <a:off x="9586454" y="2989090"/>
-            <a:ext cx="914400" cy="914400"/>
-          </a:xfrm>
-          <a:prstGeom prst="rect">
-            <a:avLst/>
-          </a:prstGeom>
-        </p:spPr>
-      </p:pic>
       <p:sp>
         <p:nvSpPr>
           <p:cNvPr id="2" name="TextBox 1">
@@ -6155,7 +6136,7 @@
         </p:nvSpPr>
         <p:spPr>
           <a:xfrm>
-            <a:off x="10630924" y="4911314"/>
+            <a:off x="10630924" y="5153051"/>
             <a:ext cx="841897" cy="369332"/>
           </a:xfrm>
           <a:prstGeom prst="rect">
@@ -6390,7 +6371,7 @@
         </p:blipFill>
         <p:spPr>
           <a:xfrm>
-            <a:off x="9887531" y="4324650"/>
+            <a:off x="9887531" y="4566387"/>
             <a:ext cx="570967" cy="570967"/>
           </a:xfrm>
           <a:prstGeom prst="rect">
@@ -6520,7 +6501,7 @@
         </p:nvSpPr>
         <p:spPr>
           <a:xfrm>
-            <a:off x="10349907" y="3110109"/>
+            <a:off x="10002425" y="3867955"/>
             <a:ext cx="1692066" cy="338554"/>
           </a:xfrm>
           <a:prstGeom prst="rect">
@@ -6759,6 +6740,345 @@
             <a:r>
               <a:rPr lang="en-US" dirty="0"/>
               <a:t>55%</a:t>
+            </a:r>
+          </a:p>
+        </p:txBody>
+      </p:sp>
+      <p:sp>
+        <p:nvSpPr>
+          <p:cNvPr id="108" name="TextBox 107">
+            <a:extLst>
+              <a:ext uri="{FF2B5EF4-FFF2-40B4-BE49-F238E27FC236}">
+                <a16:creationId xmlns:a16="http://schemas.microsoft.com/office/drawing/2014/main" id="{E1F0B391-8A3F-AA44-ABF4-299E983ECBAB}"/>
+              </a:ext>
+            </a:extLst>
+          </p:cNvPr>
+          <p:cNvSpPr txBox="1"/>
+          <p:nvPr/>
+        </p:nvSpPr>
+        <p:spPr>
+          <a:xfrm>
+            <a:off x="10030680" y="2806903"/>
+            <a:ext cx="1165897" cy="369332"/>
+          </a:xfrm>
+          <a:prstGeom prst="rect">
+            <a:avLst/>
+          </a:prstGeom>
+          <a:noFill/>
+        </p:spPr>
+        <p:txBody>
+          <a:bodyPr wrap="none" rtlCol="0">
+            <a:spAutoFit/>
+          </a:bodyPr>
+          <a:lstStyle/>
+          <a:p>
+            <a:pPr marL="0" marR="0" lvl="0" indent="0" algn="l" defTabSz="914400" rtl="0" eaLnBrk="1" fontAlgn="auto" latinLnBrk="0" hangingPunct="1">
+              <a:lnSpc>
+                <a:spcPct val="100000"/>
+              </a:lnSpc>
+              <a:spcBef>
+                <a:spcPts val="0"/>
+              </a:spcBef>
+              <a:spcAft>
+                <a:spcPts val="0"/>
+              </a:spcAft>
+              <a:buClrTx/>
+              <a:buSzTx/>
+              <a:buFontTx/>
+              <a:buNone/>
+              <a:tabLst/>
+              <a:defRPr/>
+            </a:pPr>
+            <a:r>
+              <a:rPr kumimoji="0" lang="en-US" sz="1800" b="0" i="0" u="none" strike="noStrike" kern="1200" cap="none" spc="0" normalizeH="0" baseline="0" noProof="0" dirty="0">
+                <a:ln>
+                  <a:noFill/>
+                </a:ln>
+                <a:solidFill>
+                  <a:prstClr val="black"/>
+                </a:solidFill>
+                <a:effectLst/>
+                <a:uLnTx/>
+                <a:uFillTx/>
+                <a:latin typeface="Calibri" panose="020F0502020204030204"/>
+                <a:ea typeface="+mn-ea"/>
+                <a:cs typeface="+mn-cs"/>
+              </a:rPr>
+              <a:t>L</a:t>
+            </a:r>
+            <a:r>
+              <a:rPr kumimoji="0" lang="en-US" sz="1800" b="0" i="0" u="none" strike="noStrike" kern="1200" cap="none" spc="0" normalizeH="0" baseline="0" noProof="0" dirty="0" err="1">
+                <a:ln>
+                  <a:noFill/>
+                </a:ln>
+                <a:solidFill>
+                  <a:prstClr val="black"/>
+                </a:solidFill>
+                <a:effectLst/>
+                <a:uLnTx/>
+                <a:uFillTx/>
+                <a:latin typeface="Calibri" panose="020F0502020204030204"/>
+                <a:ea typeface="+mn-ea"/>
+                <a:cs typeface="+mn-cs"/>
+              </a:rPr>
+              <a:t>atency</a:t>
+            </a:r>
+            <a:r>
+              <a:rPr kumimoji="0" lang="en-US" sz="1800" b="0" i="0" u="none" strike="noStrike" kern="1200" cap="none" spc="0" normalizeH="0" baseline="0" noProof="0" dirty="0">
+                <a:ln>
+                  <a:noFill/>
+                </a:ln>
+                <a:solidFill>
+                  <a:prstClr val="black"/>
+                </a:solidFill>
+                <a:effectLst/>
+                <a:uLnTx/>
+                <a:uFillTx/>
+                <a:latin typeface="Calibri" panose="020F0502020204030204"/>
+                <a:ea typeface="+mn-ea"/>
+                <a:cs typeface="+mn-cs"/>
+              </a:rPr>
+              <a:t> </a:t>
+            </a:r>
+            <a:r>
+              <a:rPr kumimoji="0" lang="en-US" sz="1800" b="1" i="0" u="none" strike="noStrike" kern="1200" cap="none" spc="0" normalizeH="0" baseline="0" noProof="0" dirty="0">
+                <a:ln>
+                  <a:noFill/>
+                </a:ln>
+                <a:solidFill>
+                  <a:srgbClr val="70AD47">
+                    <a:lumMod val="50000"/>
+                  </a:srgbClr>
+                </a:solidFill>
+                <a:effectLst/>
+                <a:uLnTx/>
+                <a:uFillTx/>
+                <a:latin typeface="Calibri" panose="020F0502020204030204"/>
+                <a:ea typeface="+mn-ea"/>
+                <a:cs typeface="+mn-cs"/>
+              </a:rPr>
+              <a:t>↓</a:t>
+            </a:r>
+          </a:p>
+        </p:txBody>
+      </p:sp>
+      <p:pic>
+        <p:nvPicPr>
+          <p:cNvPr id="109" name="Graphic 108" descr="Checkbox Checked">
+            <a:extLst>
+              <a:ext uri="{FF2B5EF4-FFF2-40B4-BE49-F238E27FC236}">
+                <a16:creationId xmlns:a16="http://schemas.microsoft.com/office/drawing/2014/main" id="{B68DFA95-B2F9-AD49-A9BE-9B05F7AAFEA4}"/>
+              </a:ext>
+            </a:extLst>
+          </p:cNvPr>
+          <p:cNvPicPr>
+            <a:picLocks noChangeAspect="1"/>
+          </p:cNvPicPr>
+          <p:nvPr/>
+        </p:nvPicPr>
+        <p:blipFill>
+          <a:blip r:embed="rId26">
+            <a:extLst>
+              <a:ext uri="{96DAC541-7B7A-43D3-8B79-37D633B846F1}">
+                <asvg:svgBlip xmlns:asvg="http://schemas.microsoft.com/office/drawing/2016/SVG/main" r:embed="rId27"/>
+              </a:ext>
+            </a:extLst>
+          </a:blip>
+          <a:stretch>
+            <a:fillRect/>
+          </a:stretch>
+        </p:blipFill>
+        <p:spPr>
+          <a:xfrm>
+            <a:off x="9610064" y="2724665"/>
+            <a:ext cx="533808" cy="533808"/>
+          </a:xfrm>
+          <a:prstGeom prst="rect">
+            <a:avLst/>
+          </a:prstGeom>
+        </p:spPr>
+      </p:pic>
+      <p:sp>
+        <p:nvSpPr>
+          <p:cNvPr id="112" name="TextBox 111">
+            <a:extLst>
+              <a:ext uri="{FF2B5EF4-FFF2-40B4-BE49-F238E27FC236}">
+                <a16:creationId xmlns:a16="http://schemas.microsoft.com/office/drawing/2014/main" id="{CB02B70A-DD15-F842-BD7F-6155F64538B2}"/>
+              </a:ext>
+            </a:extLst>
+          </p:cNvPr>
+          <p:cNvSpPr txBox="1"/>
+          <p:nvPr/>
+        </p:nvSpPr>
+        <p:spPr>
+          <a:xfrm>
+            <a:off x="10031143" y="3269243"/>
+            <a:ext cx="1343381" cy="369332"/>
+          </a:xfrm>
+          <a:prstGeom prst="rect">
+            <a:avLst/>
+          </a:prstGeom>
+          <a:noFill/>
+        </p:spPr>
+        <p:txBody>
+          <a:bodyPr wrap="none" rtlCol="0">
+            <a:spAutoFit/>
+          </a:bodyPr>
+          <a:lstStyle/>
+          <a:p>
+            <a:pPr marL="0" marR="0" lvl="0" indent="0" algn="l" defTabSz="914400" rtl="0" eaLnBrk="1" fontAlgn="auto" latinLnBrk="0" hangingPunct="1">
+              <a:lnSpc>
+                <a:spcPct val="100000"/>
+              </a:lnSpc>
+              <a:spcBef>
+                <a:spcPts val="0"/>
+              </a:spcBef>
+              <a:spcAft>
+                <a:spcPts val="0"/>
+              </a:spcAft>
+              <a:buClrTx/>
+              <a:buSzTx/>
+              <a:buFontTx/>
+              <a:buNone/>
+              <a:tabLst/>
+              <a:defRPr/>
+            </a:pPr>
+            <a:r>
+              <a:rPr kumimoji="0" lang="en-US" sz="1800" b="0" i="0" u="none" strike="noStrike" kern="1200" cap="none" spc="0" normalizeH="0" baseline="0" noProof="0" dirty="0">
+                <a:ln>
+                  <a:noFill/>
+                </a:ln>
+                <a:solidFill>
+                  <a:prstClr val="black"/>
+                </a:solidFill>
+                <a:effectLst/>
+                <a:uLnTx/>
+                <a:uFillTx/>
+                <a:latin typeface="Calibri" panose="020F0502020204030204"/>
+                <a:ea typeface="+mn-ea"/>
+                <a:cs typeface="+mn-cs"/>
+              </a:rPr>
+              <a:t>Error rate </a:t>
+            </a:r>
+            <a:r>
+              <a:rPr kumimoji="0" lang="en-US" sz="1800" b="1" i="0" u="none" strike="noStrike" kern="1200" cap="none" spc="0" normalizeH="0" baseline="0" noProof="0" dirty="0">
+                <a:ln>
+                  <a:noFill/>
+                </a:ln>
+                <a:solidFill>
+                  <a:srgbClr val="70AD47">
+                    <a:lumMod val="50000"/>
+                  </a:srgbClr>
+                </a:solidFill>
+                <a:effectLst/>
+                <a:uLnTx/>
+                <a:uFillTx/>
+                <a:latin typeface="Calibri" panose="020F0502020204030204"/>
+                <a:ea typeface="+mn-ea"/>
+                <a:cs typeface="+mn-cs"/>
+              </a:rPr>
+              <a:t>↓</a:t>
+            </a:r>
+          </a:p>
+        </p:txBody>
+      </p:sp>
+      <p:pic>
+        <p:nvPicPr>
+          <p:cNvPr id="113" name="Graphic 112" descr="Checkbox Checked">
+            <a:extLst>
+              <a:ext uri="{FF2B5EF4-FFF2-40B4-BE49-F238E27FC236}">
+                <a16:creationId xmlns:a16="http://schemas.microsoft.com/office/drawing/2014/main" id="{8DA408A8-2E57-8B42-9CBC-3DDF016F280F}"/>
+              </a:ext>
+            </a:extLst>
+          </p:cNvPr>
+          <p:cNvPicPr>
+            <a:picLocks noChangeAspect="1"/>
+          </p:cNvPicPr>
+          <p:nvPr/>
+        </p:nvPicPr>
+        <p:blipFill>
+          <a:blip r:embed="rId26">
+            <a:extLst>
+              <a:ext uri="{96DAC541-7B7A-43D3-8B79-37D633B846F1}">
+                <asvg:svgBlip xmlns:asvg="http://schemas.microsoft.com/office/drawing/2016/SVG/main" r:embed="rId27"/>
+              </a:ext>
+            </a:extLst>
+          </a:blip>
+          <a:stretch>
+            <a:fillRect/>
+          </a:stretch>
+        </p:blipFill>
+        <p:spPr>
+          <a:xfrm>
+            <a:off x="9610527" y="3187005"/>
+            <a:ext cx="533808" cy="533808"/>
+          </a:xfrm>
+          <a:prstGeom prst="rect">
+            <a:avLst/>
+          </a:prstGeom>
+        </p:spPr>
+      </p:pic>
+      <p:sp>
+        <p:nvSpPr>
+          <p:cNvPr id="115" name="TextBox 114">
+            <a:extLst>
+              <a:ext uri="{FF2B5EF4-FFF2-40B4-BE49-F238E27FC236}">
+                <a16:creationId xmlns:a16="http://schemas.microsoft.com/office/drawing/2014/main" id="{228AEE4F-D001-464B-B346-974D23B36B48}"/>
+              </a:ext>
+            </a:extLst>
+          </p:cNvPr>
+          <p:cNvSpPr txBox="1"/>
+          <p:nvPr/>
+        </p:nvSpPr>
+        <p:spPr>
+          <a:xfrm>
+            <a:off x="9649898" y="2448611"/>
+            <a:ext cx="1184427" cy="369332"/>
+          </a:xfrm>
+          <a:prstGeom prst="rect">
+            <a:avLst/>
+          </a:prstGeom>
+          <a:noFill/>
+        </p:spPr>
+        <p:txBody>
+          <a:bodyPr wrap="none" rtlCol="0">
+            <a:spAutoFit/>
+          </a:bodyPr>
+          <a:lstStyle/>
+          <a:p>
+            <a:pPr marL="0" marR="0" lvl="0" indent="0" algn="l" defTabSz="914400" rtl="0" eaLnBrk="1" fontAlgn="auto" latinLnBrk="0" hangingPunct="1">
+              <a:lnSpc>
+                <a:spcPct val="100000"/>
+              </a:lnSpc>
+              <a:spcBef>
+                <a:spcPts val="0"/>
+              </a:spcBef>
+              <a:spcAft>
+                <a:spcPts val="0"/>
+              </a:spcAft>
+              <a:buClrTx/>
+              <a:buSzTx/>
+              <a:buFontTx/>
+              <a:buNone/>
+              <a:tabLst/>
+              <a:defRPr/>
+            </a:pPr>
+            <a:r>
+              <a:rPr kumimoji="0" lang="en-US" sz="1800" b="1" i="0" u="none" strike="noStrike" kern="1200" cap="none" spc="0" normalizeH="0" baseline="0" noProof="0" dirty="0">
+                <a:ln>
+                  <a:noFill/>
+                </a:ln>
+                <a:solidFill>
+                  <a:srgbClr val="C00000"/>
+                </a:solidFill>
+                <a:effectLst/>
+                <a:uLnTx/>
+                <a:uFillTx/>
+                <a:latin typeface="Calibri" panose="020F0502020204030204"/>
+                <a:ea typeface="+mn-ea"/>
+                <a:cs typeface="+mn-cs"/>
+              </a:rPr>
+              <a:t>Objectives</a:t>
             </a:r>
           </a:p>
         </p:txBody>

</xml_diff>

<commit_message>
Changes to canary tutorial (#664)
* Changes to canary tutorial

* Updated mkdocs

* image link

* conformance testing is yet to come
</commit_message>
<xml_diff>
--- a/mkdocs/docs/images/src/canary-progressive-kubectl.pptx
+++ b/mkdocs/docs/images/src/canary-progressive-kubectl.pptx
@@ -197,7 +197,7 @@
           <a:p>
             <a:fld id="{38B78CBE-37FA-D241-BB4C-CAC5D3B25F49}" type="datetimeFigureOut">
               <a:rPr lang="en-US" smtClean="0"/>
-              <a:t>4/28/21</a:t>
+              <a:t>5/5/21</a:t>
             </a:fld>
             <a:endParaRPr lang="en-US"/>
           </a:p>
@@ -611,7 +611,7 @@
           <a:p>
             <a:fld id="{708812C5-0212-FD42-A0D4-E2E8FF4E3AF5}" type="datetime1">
               <a:rPr lang="en-US" smtClean="0"/>
-              <a:t>4/28/21</a:t>
+              <a:t>5/5/21</a:t>
             </a:fld>
             <a:endParaRPr lang="en-US"/>
           </a:p>
@@ -812,7 +812,7 @@
           <a:p>
             <a:fld id="{D232AC6F-41C3-B34B-9BAA-03ED2F3BC0F6}" type="datetime1">
               <a:rPr lang="en-US" smtClean="0"/>
-              <a:t>4/28/21</a:t>
+              <a:t>5/5/21</a:t>
             </a:fld>
             <a:endParaRPr lang="en-US"/>
           </a:p>
@@ -1023,7 +1023,7 @@
           <a:p>
             <a:fld id="{BEE140C2-F440-9D49-95CB-5965D64CC4A2}" type="datetime1">
               <a:rPr lang="en-US" smtClean="0"/>
-              <a:t>4/28/21</a:t>
+              <a:t>5/5/21</a:t>
             </a:fld>
             <a:endParaRPr lang="en-US"/>
           </a:p>
@@ -1224,7 +1224,7 @@
           <a:p>
             <a:fld id="{CC99F980-FB29-FD47-8508-150F73F1E8B0}" type="datetime1">
               <a:rPr lang="en-US" smtClean="0"/>
-              <a:t>4/28/21</a:t>
+              <a:t>5/5/21</a:t>
             </a:fld>
             <a:endParaRPr lang="en-US"/>
           </a:p>
@@ -1502,7 +1502,7 @@
           <a:p>
             <a:fld id="{D4510983-EA22-9643-8AC0-B3C6499B643B}" type="datetime1">
               <a:rPr lang="en-US" smtClean="0"/>
-              <a:t>4/28/21</a:t>
+              <a:t>5/5/21</a:t>
             </a:fld>
             <a:endParaRPr lang="en-US"/>
           </a:p>
@@ -1770,7 +1770,7 @@
           <a:p>
             <a:fld id="{D5A39195-967D-5D4E-8C6A-C99866996458}" type="datetime1">
               <a:rPr lang="en-US" smtClean="0"/>
-              <a:t>4/28/21</a:t>
+              <a:t>5/5/21</a:t>
             </a:fld>
             <a:endParaRPr lang="en-US"/>
           </a:p>
@@ -2185,7 +2185,7 @@
           <a:p>
             <a:fld id="{5AD771E9-C79D-684D-A158-5EB6E92DE947}" type="datetime1">
               <a:rPr lang="en-US" smtClean="0"/>
-              <a:t>4/28/21</a:t>
+              <a:t>5/5/21</a:t>
             </a:fld>
             <a:endParaRPr lang="en-US"/>
           </a:p>
@@ -2329,7 +2329,7 @@
           <a:p>
             <a:fld id="{693CA161-7E4C-5C4B-B799-DB602A0B9806}" type="datetime1">
               <a:rPr lang="en-US" smtClean="0"/>
-              <a:t>4/28/21</a:t>
+              <a:t>5/5/21</a:t>
             </a:fld>
             <a:endParaRPr lang="en-US"/>
           </a:p>
@@ -2445,7 +2445,7 @@
           <a:p>
             <a:fld id="{6D55FDF3-8BB2-6349-A5FA-057F3D78953D}" type="datetime1">
               <a:rPr lang="en-US" smtClean="0"/>
-              <a:t>4/28/21</a:t>
+              <a:t>5/5/21</a:t>
             </a:fld>
             <a:endParaRPr lang="en-US"/>
           </a:p>
@@ -2759,7 +2759,7 @@
           <a:p>
             <a:fld id="{EEDFACC0-3228-BA4B-942E-CEF38B0101FD}" type="datetime1">
               <a:rPr lang="en-US" smtClean="0"/>
-              <a:t>4/28/21</a:t>
+              <a:t>5/5/21</a:t>
             </a:fld>
             <a:endParaRPr lang="en-US"/>
           </a:p>
@@ -3050,7 +3050,7 @@
           <a:p>
             <a:fld id="{07EEEDBE-E24C-D140-B419-6D8D592D0F1C}" type="datetime1">
               <a:rPr lang="en-US" smtClean="0"/>
-              <a:t>4/28/21</a:t>
+              <a:t>5/5/21</a:t>
             </a:fld>
             <a:endParaRPr lang="en-US"/>
           </a:p>
@@ -3294,7 +3294,7 @@
           <a:p>
             <a:fld id="{E05781A2-A5EF-C54C-A3EF-F62483D37EDC}" type="datetime1">
               <a:rPr lang="en-US" smtClean="0"/>
-              <a:t>4/28/21</a:t>
+              <a:t>5/5/21</a:t>
             </a:fld>
             <a:endParaRPr lang="en-US"/>
           </a:p>
@@ -3717,10 +3717,10 @@
       </p:grpSpPr>
       <p:sp>
         <p:nvSpPr>
-          <p:cNvPr id="11" name="Rectangle 10">
-            <a:extLst>
-              <a:ext uri="{FF2B5EF4-FFF2-40B4-BE49-F238E27FC236}">
-                <a16:creationId xmlns:a16="http://schemas.microsoft.com/office/drawing/2014/main" id="{65137B27-89CA-7447-8A02-1607A375D4DA}"/>
+          <p:cNvPr id="107" name="Rounded Rectangle 106">
+            <a:extLst>
+              <a:ext uri="{FF2B5EF4-FFF2-40B4-BE49-F238E27FC236}">
+                <a16:creationId xmlns:a16="http://schemas.microsoft.com/office/drawing/2014/main" id="{03C45863-0316-414B-96FB-107D9CA13B88}"/>
               </a:ext>
             </a:extLst>
           </p:cNvPr>
@@ -3729,10 +3729,10 @@
         </p:nvSpPr>
         <p:spPr>
           <a:xfrm>
-            <a:off x="149603" y="1466858"/>
-            <a:ext cx="11879708" cy="4441415"/>
-          </a:xfrm>
-          <a:prstGeom prst="rect">
+            <a:off x="9659296" y="3208270"/>
+            <a:ext cx="816445" cy="1041636"/>
+          </a:xfrm>
+          <a:prstGeom prst="roundRect">
             <a:avLst/>
           </a:prstGeom>
           <a:solidFill>
@@ -3764,17 +3764,46 @@
           <a:bodyPr rtlCol="0" anchor="ctr"/>
           <a:lstStyle/>
           <a:p>
-            <a:pPr algn="ctr"/>
-            <a:endParaRPr lang="en-US"/>
-          </a:p>
-        </p:txBody>
-      </p:sp>
-      <p:sp>
-        <p:nvSpPr>
-          <p:cNvPr id="100" name="Rounded Rectangle 99">
-            <a:extLst>
-              <a:ext uri="{FF2B5EF4-FFF2-40B4-BE49-F238E27FC236}">
-                <a16:creationId xmlns:a16="http://schemas.microsoft.com/office/drawing/2014/main" id="{B819D5F6-78E5-9845-9F41-90858B3A04DA}"/>
+            <a:pPr marL="0" marR="0" lvl="0" indent="0" algn="ctr" defTabSz="914400" rtl="0" eaLnBrk="1" fontAlgn="auto" latinLnBrk="0" hangingPunct="1">
+              <a:lnSpc>
+                <a:spcPct val="100000"/>
+              </a:lnSpc>
+              <a:spcBef>
+                <a:spcPts val="0"/>
+              </a:spcBef>
+              <a:spcAft>
+                <a:spcPts val="0"/>
+              </a:spcAft>
+              <a:buClrTx/>
+              <a:buSzTx/>
+              <a:buFontTx/>
+              <a:buNone/>
+              <a:tabLst/>
+              <a:defRPr/>
+            </a:pPr>
+            <a:endParaRPr kumimoji="0" lang="en-US" sz="1800" b="0" i="0" u="none" strike="noStrike" kern="1200" cap="none" spc="0" normalizeH="0" baseline="0" noProof="0">
+              <a:ln>
+                <a:noFill/>
+              </a:ln>
+              <a:solidFill>
+                <a:prstClr val="white"/>
+              </a:solidFill>
+              <a:effectLst/>
+              <a:uLnTx/>
+              <a:uFillTx/>
+              <a:latin typeface="Calibri" panose="020F0502020204030204"/>
+              <a:ea typeface="+mn-ea"/>
+              <a:cs typeface="+mn-cs"/>
+            </a:endParaRPr>
+          </a:p>
+        </p:txBody>
+      </p:sp>
+      <p:sp>
+        <p:nvSpPr>
+          <p:cNvPr id="11" name="Rectangle 10">
+            <a:extLst>
+              <a:ext uri="{FF2B5EF4-FFF2-40B4-BE49-F238E27FC236}">
+                <a16:creationId xmlns:a16="http://schemas.microsoft.com/office/drawing/2014/main" id="{65137B27-89CA-7447-8A02-1607A375D4DA}"/>
               </a:ext>
             </a:extLst>
           </p:cNvPr>
@@ -3783,23 +3812,18 @@
         </p:nvSpPr>
         <p:spPr>
           <a:xfrm>
-            <a:off x="8384562" y="4026533"/>
-            <a:ext cx="1170215" cy="674914"/>
-          </a:xfrm>
-          <a:prstGeom prst="roundRect">
+            <a:off x="118072" y="1466858"/>
+            <a:ext cx="11984217" cy="4441415"/>
+          </a:xfrm>
+          <a:prstGeom prst="rect">
             <a:avLst/>
           </a:prstGeom>
           <a:solidFill>
-            <a:schemeClr val="accent6">
-              <a:lumMod val="40000"/>
-              <a:lumOff val="60000"/>
-            </a:schemeClr>
+            <a:schemeClr val="bg1"/>
           </a:solidFill>
-          <a:ln w="19050">
+          <a:ln>
             <a:solidFill>
-              <a:schemeClr val="accent6">
-                <a:lumMod val="50000"/>
-              </a:schemeClr>
+              <a:schemeClr val="bg1"/>
             </a:solidFill>
           </a:ln>
         </p:spPr>
@@ -3824,20 +3848,16 @@
           <a:lstStyle/>
           <a:p>
             <a:pPr algn="ctr"/>
-            <a:endParaRPr lang="en-US" dirty="0">
-              <a:solidFill>
-                <a:schemeClr val="tx1"/>
-              </a:solidFill>
-            </a:endParaRPr>
-          </a:p>
-        </p:txBody>
-      </p:sp>
-      <p:sp>
-        <p:nvSpPr>
-          <p:cNvPr id="44" name="Rounded Rectangle 43">
-            <a:extLst>
-              <a:ext uri="{FF2B5EF4-FFF2-40B4-BE49-F238E27FC236}">
-                <a16:creationId xmlns:a16="http://schemas.microsoft.com/office/drawing/2014/main" id="{39941F14-A3FD-964D-BC7E-C6F3E4437826}"/>
+            <a:endParaRPr lang="en-US"/>
+          </a:p>
+        </p:txBody>
+      </p:sp>
+      <p:sp>
+        <p:nvSpPr>
+          <p:cNvPr id="100" name="Rounded Rectangle 99">
+            <a:extLst>
+              <a:ext uri="{FF2B5EF4-FFF2-40B4-BE49-F238E27FC236}">
+                <a16:creationId xmlns:a16="http://schemas.microsoft.com/office/drawing/2014/main" id="{B819D5F6-78E5-9845-9F41-90858B3A04DA}"/>
               </a:ext>
             </a:extLst>
           </p:cNvPr>
@@ -3846,7 +3866,7 @@
         </p:nvSpPr>
         <p:spPr>
           <a:xfrm>
-            <a:off x="5879085" y="4147864"/>
+            <a:off x="8384562" y="4026533"/>
             <a:ext cx="1170215" cy="674914"/>
           </a:xfrm>
           <a:prstGeom prst="roundRect">
@@ -3854,8 +3874,8 @@
           </a:prstGeom>
           <a:solidFill>
             <a:schemeClr val="accent6">
-              <a:lumMod val="60000"/>
-              <a:lumOff val="40000"/>
+              <a:lumMod val="40000"/>
+              <a:lumOff val="60000"/>
             </a:schemeClr>
           </a:solidFill>
           <a:ln w="19050">
@@ -3897,10 +3917,10 @@
       </p:sp>
       <p:sp>
         <p:nvSpPr>
-          <p:cNvPr id="49" name="Curved Up Arrow 48">
-            <a:extLst>
-              <a:ext uri="{FF2B5EF4-FFF2-40B4-BE49-F238E27FC236}">
-                <a16:creationId xmlns:a16="http://schemas.microsoft.com/office/drawing/2014/main" id="{9032B92A-EEF1-494C-8F0A-2105CC0E5CD2}"/>
+          <p:cNvPr id="44" name="Rounded Rectangle 43">
+            <a:extLst>
+              <a:ext uri="{FF2B5EF4-FFF2-40B4-BE49-F238E27FC236}">
+                <a16:creationId xmlns:a16="http://schemas.microsoft.com/office/drawing/2014/main" id="{39941F14-A3FD-964D-BC7E-C6F3E4437826}"/>
               </a:ext>
             </a:extLst>
           </p:cNvPr>
@@ -3909,24 +3929,21 @@
         </p:nvSpPr>
         <p:spPr>
           <a:xfrm>
-            <a:off x="4940251" y="2929053"/>
-            <a:ext cx="1271030" cy="397329"/>
-          </a:xfrm>
-          <a:prstGeom prst="curvedUpArrow">
-            <a:avLst>
-              <a:gd name="adj1" fmla="val 13236"/>
-              <a:gd name="adj2" fmla="val 50000"/>
-              <a:gd name="adj3" fmla="val 25000"/>
-            </a:avLst>
+            <a:off x="5879085" y="4147864"/>
+            <a:ext cx="1170215" cy="674914"/>
+          </a:xfrm>
+          <a:prstGeom prst="roundRect">
+            <a:avLst/>
           </a:prstGeom>
           <a:solidFill>
-            <a:schemeClr val="accent1">
-              <a:lumMod val="75000"/>
+            <a:schemeClr val="accent6">
+              <a:lumMod val="60000"/>
+              <a:lumOff val="40000"/>
             </a:schemeClr>
           </a:solidFill>
-          <a:ln>
+          <a:ln w="19050">
             <a:solidFill>
-              <a:schemeClr val="accent1">
+              <a:schemeClr val="accent6">
                 <a:lumMod val="50000"/>
               </a:schemeClr>
             </a:solidFill>
@@ -3953,7 +3970,7 @@
           <a:lstStyle/>
           <a:p>
             <a:pPr algn="ctr"/>
-            <a:endParaRPr lang="en-US">
+            <a:endParaRPr lang="en-US" dirty="0">
               <a:solidFill>
                 <a:schemeClr val="tx1"/>
               </a:solidFill>
@@ -3963,10 +3980,10 @@
       </p:sp>
       <p:sp>
         <p:nvSpPr>
-          <p:cNvPr id="55" name="Curved Up Arrow 54">
-            <a:extLst>
-              <a:ext uri="{FF2B5EF4-FFF2-40B4-BE49-F238E27FC236}">
-                <a16:creationId xmlns:a16="http://schemas.microsoft.com/office/drawing/2014/main" id="{3C8F811C-1964-7345-9519-4A6D3BF0486E}"/>
+          <p:cNvPr id="49" name="Curved Up Arrow 48">
+            <a:extLst>
+              <a:ext uri="{FF2B5EF4-FFF2-40B4-BE49-F238E27FC236}">
+                <a16:creationId xmlns:a16="http://schemas.microsoft.com/office/drawing/2014/main" id="{9032B92A-EEF1-494C-8F0A-2105CC0E5CD2}"/>
               </a:ext>
             </a:extLst>
           </p:cNvPr>
@@ -3974,9 +3991,9 @@
           <p:nvPr/>
         </p:nvSpPr>
         <p:spPr>
-          <a:xfrm flipV="1">
-            <a:off x="4998760" y="3426987"/>
-            <a:ext cx="1212521" cy="397329"/>
+          <a:xfrm>
+            <a:off x="4940251" y="2929053"/>
+            <a:ext cx="1271030" cy="397329"/>
           </a:xfrm>
           <a:prstGeom prst="curvedUpArrow">
             <a:avLst>
@@ -3986,13 +4003,13 @@
             </a:avLst>
           </a:prstGeom>
           <a:solidFill>
-            <a:schemeClr val="accent6">
+            <a:schemeClr val="accent1">
               <a:lumMod val="75000"/>
             </a:schemeClr>
           </a:solidFill>
           <a:ln>
             <a:solidFill>
-              <a:schemeClr val="accent6">
+              <a:schemeClr val="accent1">
                 <a:lumMod val="50000"/>
               </a:schemeClr>
             </a:solidFill>
@@ -4029,10 +4046,10 @@
       </p:sp>
       <p:sp>
         <p:nvSpPr>
-          <p:cNvPr id="25" name="Curved Up Arrow 24">
-            <a:extLst>
-              <a:ext uri="{FF2B5EF4-FFF2-40B4-BE49-F238E27FC236}">
-                <a16:creationId xmlns:a16="http://schemas.microsoft.com/office/drawing/2014/main" id="{1FF45074-0E5F-054D-85A5-7401CA561CAD}"/>
+          <p:cNvPr id="55" name="Curved Up Arrow 54">
+            <a:extLst>
+              <a:ext uri="{FF2B5EF4-FFF2-40B4-BE49-F238E27FC236}">
+                <a16:creationId xmlns:a16="http://schemas.microsoft.com/office/drawing/2014/main" id="{3C8F811C-1964-7345-9519-4A6D3BF0486E}"/>
               </a:ext>
             </a:extLst>
           </p:cNvPr>
@@ -4040,9 +4057,9 @@
           <p:nvPr/>
         </p:nvSpPr>
         <p:spPr>
-          <a:xfrm>
-            <a:off x="1553269" y="2929053"/>
-            <a:ext cx="2144485" cy="397329"/>
+          <a:xfrm flipV="1">
+            <a:off x="4998760" y="3426987"/>
+            <a:ext cx="1212521" cy="397329"/>
           </a:xfrm>
           <a:prstGeom prst="curvedUpArrow">
             <a:avLst>
@@ -4052,13 +4069,13 @@
             </a:avLst>
           </a:prstGeom>
           <a:solidFill>
-            <a:schemeClr val="accent1">
+            <a:schemeClr val="accent6">
               <a:lumMod val="75000"/>
             </a:schemeClr>
           </a:solidFill>
           <a:ln>
             <a:solidFill>
-              <a:schemeClr val="accent1">
+              <a:schemeClr val="accent6">
                 <a:lumMod val="50000"/>
               </a:schemeClr>
             </a:solidFill>
@@ -4095,10 +4112,10 @@
       </p:sp>
       <p:sp>
         <p:nvSpPr>
-          <p:cNvPr id="6" name="Rounded Rectangle 5">
-            <a:extLst>
-              <a:ext uri="{FF2B5EF4-FFF2-40B4-BE49-F238E27FC236}">
-                <a16:creationId xmlns:a16="http://schemas.microsoft.com/office/drawing/2014/main" id="{A6531ED6-9FBB-9A47-9045-884CC2A5A852}"/>
+          <p:cNvPr id="25" name="Curved Up Arrow 24">
+            <a:extLst>
+              <a:ext uri="{FF2B5EF4-FFF2-40B4-BE49-F238E27FC236}">
+                <a16:creationId xmlns:a16="http://schemas.microsoft.com/office/drawing/2014/main" id="{1FF45074-0E5F-054D-85A5-7401CA561CAD}"/>
               </a:ext>
             </a:extLst>
           </p:cNvPr>
@@ -4107,19 +4124,22 @@
         </p:nvSpPr>
         <p:spPr>
           <a:xfrm>
-            <a:off x="3533272" y="1811027"/>
-            <a:ext cx="1170215" cy="674914"/>
-          </a:xfrm>
-          <a:prstGeom prst="roundRect">
-            <a:avLst/>
+            <a:off x="1553269" y="2929053"/>
+            <a:ext cx="2144485" cy="397329"/>
+          </a:xfrm>
+          <a:prstGeom prst="curvedUpArrow">
+            <a:avLst>
+              <a:gd name="adj1" fmla="val 13236"/>
+              <a:gd name="adj2" fmla="val 50000"/>
+              <a:gd name="adj3" fmla="val 25000"/>
+            </a:avLst>
           </a:prstGeom>
           <a:solidFill>
             <a:schemeClr val="accent1">
-              <a:lumMod val="40000"/>
-              <a:lumOff val="60000"/>
+              <a:lumMod val="75000"/>
             </a:schemeClr>
           </a:solidFill>
-          <a:ln w="19050">
+          <a:ln>
             <a:solidFill>
               <a:schemeClr val="accent1">
                 <a:lumMod val="50000"/>
@@ -4148,7 +4168,7 @@
           <a:lstStyle/>
           <a:p>
             <a:pPr algn="ctr"/>
-            <a:endParaRPr lang="en-US" dirty="0">
+            <a:endParaRPr lang="en-US">
               <a:solidFill>
                 <a:schemeClr val="tx1"/>
               </a:solidFill>
@@ -4158,10 +4178,10 @@
       </p:sp>
       <p:sp>
         <p:nvSpPr>
-          <p:cNvPr id="7" name="Rounded Rectangle 6">
-            <a:extLst>
-              <a:ext uri="{FF2B5EF4-FFF2-40B4-BE49-F238E27FC236}">
-                <a16:creationId xmlns:a16="http://schemas.microsoft.com/office/drawing/2014/main" id="{E3B559FF-1D1E-EC49-B212-E5F962D13F43}"/>
+          <p:cNvPr id="6" name="Rounded Rectangle 5">
+            <a:extLst>
+              <a:ext uri="{FF2B5EF4-FFF2-40B4-BE49-F238E27FC236}">
+                <a16:creationId xmlns:a16="http://schemas.microsoft.com/office/drawing/2014/main" id="{A6531ED6-9FBB-9A47-9045-884CC2A5A852}"/>
               </a:ext>
             </a:extLst>
           </p:cNvPr>
@@ -4170,7 +4190,7 @@
         </p:nvSpPr>
         <p:spPr>
           <a:xfrm>
-            <a:off x="3391758" y="1925327"/>
+            <a:off x="3533272" y="1811027"/>
             <a:ext cx="1170215" cy="674914"/>
           </a:xfrm>
           <a:prstGeom prst="roundRect">
@@ -4178,8 +4198,8 @@
           </a:prstGeom>
           <a:solidFill>
             <a:schemeClr val="accent1">
-              <a:lumMod val="60000"/>
-              <a:lumOff val="40000"/>
+              <a:lumMod val="40000"/>
+              <a:lumOff val="60000"/>
             </a:schemeClr>
           </a:solidFill>
           <a:ln w="19050">
@@ -4221,10 +4241,10 @@
       </p:sp>
       <p:sp>
         <p:nvSpPr>
-          <p:cNvPr id="8" name="Rounded Rectangle 7">
-            <a:extLst>
-              <a:ext uri="{FF2B5EF4-FFF2-40B4-BE49-F238E27FC236}">
-                <a16:creationId xmlns:a16="http://schemas.microsoft.com/office/drawing/2014/main" id="{369AC178-BF9D-4745-90F0-6149144DD9BF}"/>
+          <p:cNvPr id="7" name="Rounded Rectangle 6">
+            <a:extLst>
+              <a:ext uri="{FF2B5EF4-FFF2-40B4-BE49-F238E27FC236}">
+                <a16:creationId xmlns:a16="http://schemas.microsoft.com/office/drawing/2014/main" id="{E3B559FF-1D1E-EC49-B212-E5F962D13F43}"/>
               </a:ext>
             </a:extLst>
           </p:cNvPr>
@@ -4233,7 +4253,7 @@
         </p:nvSpPr>
         <p:spPr>
           <a:xfrm>
-            <a:off x="3255737" y="2061399"/>
+            <a:off x="3391758" y="1925327"/>
             <a:ext cx="1170215" cy="674914"/>
           </a:xfrm>
           <a:prstGeom prst="roundRect">
@@ -4241,7 +4261,8 @@
           </a:prstGeom>
           <a:solidFill>
             <a:schemeClr val="accent1">
-              <a:lumMod val="75000"/>
+              <a:lumMod val="60000"/>
+              <a:lumOff val="40000"/>
             </a:schemeClr>
           </a:solidFill>
           <a:ln w="19050">
@@ -4273,23 +4294,20 @@
           <a:lstStyle/>
           <a:p>
             <a:pPr algn="ctr"/>
-            <a:r>
-              <a:rPr lang="en-US" dirty="0">
-                <a:solidFill>
-                  <a:schemeClr val="bg1"/>
-                </a:solidFill>
-              </a:rPr>
-              <a:t>v1.0</a:t>
-            </a:r>
-          </a:p>
-        </p:txBody>
-      </p:sp>
-      <p:sp>
-        <p:nvSpPr>
-          <p:cNvPr id="18" name="Rounded Rectangle 17">
-            <a:extLst>
-              <a:ext uri="{FF2B5EF4-FFF2-40B4-BE49-F238E27FC236}">
-                <a16:creationId xmlns:a16="http://schemas.microsoft.com/office/drawing/2014/main" id="{44650791-EEEC-2549-BC4D-1C04E4010439}"/>
+            <a:endParaRPr lang="en-US" dirty="0">
+              <a:solidFill>
+                <a:schemeClr val="tx1"/>
+              </a:solidFill>
+            </a:endParaRPr>
+          </a:p>
+        </p:txBody>
+      </p:sp>
+      <p:sp>
+        <p:nvSpPr>
+          <p:cNvPr id="8" name="Rounded Rectangle 7">
+            <a:extLst>
+              <a:ext uri="{FF2B5EF4-FFF2-40B4-BE49-F238E27FC236}">
+                <a16:creationId xmlns:a16="http://schemas.microsoft.com/office/drawing/2014/main" id="{369AC178-BF9D-4745-90F0-6149144DD9BF}"/>
               </a:ext>
             </a:extLst>
           </p:cNvPr>
@@ -4298,20 +4316,20 @@
         </p:nvSpPr>
         <p:spPr>
           <a:xfrm>
-            <a:off x="3255737" y="4272676"/>
+            <a:off x="3255737" y="2061399"/>
             <a:ext cx="1170215" cy="674914"/>
           </a:xfrm>
           <a:prstGeom prst="roundRect">
             <a:avLst/>
           </a:prstGeom>
           <a:solidFill>
-            <a:schemeClr val="accent6">
+            <a:schemeClr val="accent1">
               <a:lumMod val="75000"/>
             </a:schemeClr>
           </a:solidFill>
           <a:ln w="19050">
             <a:solidFill>
-              <a:schemeClr val="accent6">
+              <a:schemeClr val="accent1">
                 <a:lumMod val="50000"/>
               </a:schemeClr>
             </a:solidFill>
@@ -4344,17 +4362,17 @@
                   <a:schemeClr val="bg1"/>
                 </a:solidFill>
               </a:rPr>
-              <a:t>v2.0</a:t>
-            </a:r>
-          </a:p>
-        </p:txBody>
-      </p:sp>
-      <p:sp>
-        <p:nvSpPr>
-          <p:cNvPr id="28" name="Curved Up Arrow 27">
-            <a:extLst>
-              <a:ext uri="{FF2B5EF4-FFF2-40B4-BE49-F238E27FC236}">
-                <a16:creationId xmlns:a16="http://schemas.microsoft.com/office/drawing/2014/main" id="{04AB6087-18E6-F547-AF2D-FEDBFF2E48AB}"/>
+              <a:t>v1.0</a:t>
+            </a:r>
+          </a:p>
+        </p:txBody>
+      </p:sp>
+      <p:sp>
+        <p:nvSpPr>
+          <p:cNvPr id="18" name="Rounded Rectangle 17">
+            <a:extLst>
+              <a:ext uri="{FF2B5EF4-FFF2-40B4-BE49-F238E27FC236}">
+                <a16:creationId xmlns:a16="http://schemas.microsoft.com/office/drawing/2014/main" id="{44650791-EEEC-2549-BC4D-1C04E4010439}"/>
               </a:ext>
             </a:extLst>
           </p:cNvPr>
@@ -4362,23 +4380,19 @@
           <p:nvPr/>
         </p:nvSpPr>
         <p:spPr>
-          <a:xfrm flipV="1">
-            <a:off x="1553269" y="3426988"/>
-            <a:ext cx="2144485" cy="397329"/>
-          </a:xfrm>
-          <a:prstGeom prst="curvedUpArrow">
-            <a:avLst>
-              <a:gd name="adj1" fmla="val 13236"/>
-              <a:gd name="adj2" fmla="val 50000"/>
-              <a:gd name="adj3" fmla="val 25000"/>
-            </a:avLst>
+          <a:xfrm>
+            <a:off x="3255737" y="4272676"/>
+            <a:ext cx="1170215" cy="674914"/>
+          </a:xfrm>
+          <a:prstGeom prst="roundRect">
+            <a:avLst/>
           </a:prstGeom>
           <a:solidFill>
             <a:schemeClr val="accent6">
               <a:lumMod val="75000"/>
             </a:schemeClr>
           </a:solidFill>
-          <a:ln>
+          <a:ln w="19050">
             <a:solidFill>
               <a:schemeClr val="accent6">
                 <a:lumMod val="50000"/>
@@ -4407,20 +4421,23 @@
           <a:lstStyle/>
           <a:p>
             <a:pPr algn="ctr"/>
-            <a:endParaRPr lang="en-US">
-              <a:solidFill>
-                <a:schemeClr val="tx1"/>
-              </a:solidFill>
-            </a:endParaRPr>
-          </a:p>
-        </p:txBody>
-      </p:sp>
-      <p:sp>
-        <p:nvSpPr>
-          <p:cNvPr id="29" name="Rounded Rectangle 28">
-            <a:extLst>
-              <a:ext uri="{FF2B5EF4-FFF2-40B4-BE49-F238E27FC236}">
-                <a16:creationId xmlns:a16="http://schemas.microsoft.com/office/drawing/2014/main" id="{268C8C7B-9178-D948-AD10-9E84F02C0139}"/>
+            <a:r>
+              <a:rPr lang="en-US" dirty="0">
+                <a:solidFill>
+                  <a:schemeClr val="bg1"/>
+                </a:solidFill>
+              </a:rPr>
+              <a:t>v2.0</a:t>
+            </a:r>
+          </a:p>
+        </p:txBody>
+      </p:sp>
+      <p:sp>
+        <p:nvSpPr>
+          <p:cNvPr id="28" name="Curved Up Arrow 27">
+            <a:extLst>
+              <a:ext uri="{FF2B5EF4-FFF2-40B4-BE49-F238E27FC236}">
+                <a16:creationId xmlns:a16="http://schemas.microsoft.com/office/drawing/2014/main" id="{04AB6087-18E6-F547-AF2D-FEDBFF2E48AB}"/>
               </a:ext>
             </a:extLst>
           </p:cNvPr>
@@ -4428,19 +4445,27 @@
           <p:nvPr/>
         </p:nvSpPr>
         <p:spPr>
-          <a:xfrm>
-            <a:off x="2272511" y="3091099"/>
-            <a:ext cx="689886" cy="618939"/>
-          </a:xfrm>
-          <a:prstGeom prst="roundRect">
-            <a:avLst/>
+          <a:xfrm flipV="1">
+            <a:off x="1553269" y="3426988"/>
+            <a:ext cx="2144485" cy="397329"/>
+          </a:xfrm>
+          <a:prstGeom prst="curvedUpArrow">
+            <a:avLst>
+              <a:gd name="adj1" fmla="val 13236"/>
+              <a:gd name="adj2" fmla="val 50000"/>
+              <a:gd name="adj3" fmla="val 25000"/>
+            </a:avLst>
           </a:prstGeom>
           <a:solidFill>
-            <a:schemeClr val="bg1"/>
+            <a:schemeClr val="accent6">
+              <a:lumMod val="75000"/>
+            </a:schemeClr>
           </a:solidFill>
           <a:ln>
             <a:solidFill>
-              <a:schemeClr val="bg1"/>
+              <a:schemeClr val="accent6">
+                <a:lumMod val="50000"/>
+              </a:schemeClr>
             </a:solidFill>
           </a:ln>
         </p:spPr>
@@ -4465,448 +4490,20 @@
           <a:lstStyle/>
           <a:p>
             <a:pPr algn="ctr"/>
-            <a:endParaRPr lang="en-US"/>
-          </a:p>
-        </p:txBody>
-      </p:sp>
-      <p:pic>
-        <p:nvPicPr>
-          <p:cNvPr id="31" name="Graphic 30" descr="School boy">
-            <a:extLst>
-              <a:ext uri="{FF2B5EF4-FFF2-40B4-BE49-F238E27FC236}">
-                <a16:creationId xmlns:a16="http://schemas.microsoft.com/office/drawing/2014/main" id="{23C14CCA-0229-0945-AD1D-3EA26AB7C249}"/>
-              </a:ext>
-            </a:extLst>
-          </p:cNvPr>
-          <p:cNvPicPr>
-            <a:picLocks noChangeAspect="1"/>
-          </p:cNvPicPr>
-          <p:nvPr/>
-        </p:nvPicPr>
-        <p:blipFill>
-          <a:blip r:embed="rId2">
-            <a:extLst>
-              <a:ext uri="{96DAC541-7B7A-43D3-8B79-37D633B846F1}">
-                <asvg:svgBlip xmlns:asvg="http://schemas.microsoft.com/office/drawing/2016/SVG/main" r:embed="rId3"/>
-              </a:ext>
-            </a:extLst>
-          </a:blip>
-          <a:stretch>
-            <a:fillRect/>
-          </a:stretch>
-        </p:blipFill>
-        <p:spPr>
-          <a:xfrm>
-            <a:off x="686244" y="1968817"/>
-            <a:ext cx="548640" cy="548640"/>
-          </a:xfrm>
-          <a:prstGeom prst="rect">
-            <a:avLst/>
-          </a:prstGeom>
-        </p:spPr>
-      </p:pic>
-      <p:pic>
-        <p:nvPicPr>
-          <p:cNvPr id="32" name="Graphic 31" descr="Female Profile">
-            <a:extLst>
-              <a:ext uri="{FF2B5EF4-FFF2-40B4-BE49-F238E27FC236}">
-                <a16:creationId xmlns:a16="http://schemas.microsoft.com/office/drawing/2014/main" id="{FB0AD0DD-5F7D-7542-96A5-78D8D8B5C0C9}"/>
-              </a:ext>
-            </a:extLst>
-          </p:cNvPr>
-          <p:cNvPicPr>
-            <a:picLocks noChangeAspect="1"/>
-          </p:cNvPicPr>
-          <p:nvPr/>
-        </p:nvPicPr>
-        <p:blipFill>
-          <a:blip r:embed="rId4">
-            <a:extLst>
-              <a:ext uri="{96DAC541-7B7A-43D3-8B79-37D633B846F1}">
-                <asvg:svgBlip xmlns:asvg="http://schemas.microsoft.com/office/drawing/2016/SVG/main" r:embed="rId5"/>
-              </a:ext>
-            </a:extLst>
-          </a:blip>
-          <a:stretch>
-            <a:fillRect/>
-          </a:stretch>
-        </p:blipFill>
-        <p:spPr>
-          <a:xfrm>
-            <a:off x="162689" y="2795857"/>
-            <a:ext cx="548640" cy="548640"/>
-          </a:xfrm>
-          <a:prstGeom prst="rect">
-            <a:avLst/>
-          </a:prstGeom>
-        </p:spPr>
-      </p:pic>
-      <p:pic>
-        <p:nvPicPr>
-          <p:cNvPr id="33" name="Graphic 32" descr="School boy">
-            <a:extLst>
-              <a:ext uri="{FF2B5EF4-FFF2-40B4-BE49-F238E27FC236}">
-                <a16:creationId xmlns:a16="http://schemas.microsoft.com/office/drawing/2014/main" id="{DB43DC05-529E-D441-A524-D0B30D5D4E06}"/>
-              </a:ext>
-            </a:extLst>
-          </p:cNvPr>
-          <p:cNvPicPr>
-            <a:picLocks noChangeAspect="1"/>
-          </p:cNvPicPr>
-          <p:nvPr/>
-        </p:nvPicPr>
-        <p:blipFill>
-          <a:blip r:embed="rId6">
-            <a:extLst>
-              <a:ext uri="{96DAC541-7B7A-43D3-8B79-37D633B846F1}">
-                <asvg:svgBlip xmlns:asvg="http://schemas.microsoft.com/office/drawing/2016/SVG/main" r:embed="rId7"/>
-              </a:ext>
-            </a:extLst>
-          </a:blip>
-          <a:stretch>
-            <a:fillRect/>
-          </a:stretch>
-        </p:blipFill>
-        <p:spPr>
-          <a:xfrm>
-            <a:off x="625309" y="2453742"/>
-            <a:ext cx="548640" cy="548640"/>
-          </a:xfrm>
-          <a:prstGeom prst="rect">
-            <a:avLst/>
-          </a:prstGeom>
-        </p:spPr>
-      </p:pic>
-      <p:pic>
-        <p:nvPicPr>
-          <p:cNvPr id="34" name="Graphic 33" descr="Female Profile">
-            <a:extLst>
-              <a:ext uri="{FF2B5EF4-FFF2-40B4-BE49-F238E27FC236}">
-                <a16:creationId xmlns:a16="http://schemas.microsoft.com/office/drawing/2014/main" id="{44118B0F-5F5C-104D-89F1-FF4F0677B581}"/>
-              </a:ext>
-            </a:extLst>
-          </p:cNvPr>
-          <p:cNvPicPr>
-            <a:picLocks noChangeAspect="1"/>
-          </p:cNvPicPr>
-          <p:nvPr/>
-        </p:nvPicPr>
-        <p:blipFill>
-          <a:blip r:embed="rId8">
-            <a:extLst>
-              <a:ext uri="{96DAC541-7B7A-43D3-8B79-37D633B846F1}">
-                <asvg:svgBlip xmlns:asvg="http://schemas.microsoft.com/office/drawing/2016/SVG/main" r:embed="rId9"/>
-              </a:ext>
-            </a:extLst>
-          </a:blip>
-          <a:stretch>
-            <a:fillRect/>
-          </a:stretch>
-        </p:blipFill>
-        <p:spPr>
-          <a:xfrm>
-            <a:off x="149603" y="3428773"/>
-            <a:ext cx="548640" cy="548640"/>
-          </a:xfrm>
-          <a:prstGeom prst="rect">
-            <a:avLst/>
-          </a:prstGeom>
-        </p:spPr>
-      </p:pic>
-      <p:pic>
-        <p:nvPicPr>
-          <p:cNvPr id="35" name="Graphic 34" descr="School girl">
-            <a:extLst>
-              <a:ext uri="{FF2B5EF4-FFF2-40B4-BE49-F238E27FC236}">
-                <a16:creationId xmlns:a16="http://schemas.microsoft.com/office/drawing/2014/main" id="{38748C23-E12A-E34D-8964-5C6C40FF9564}"/>
-              </a:ext>
-            </a:extLst>
-          </p:cNvPr>
-          <p:cNvPicPr>
-            <a:picLocks noChangeAspect="1"/>
-          </p:cNvPicPr>
-          <p:nvPr/>
-        </p:nvPicPr>
-        <p:blipFill>
-          <a:blip r:embed="rId10">
-            <a:extLst>
-              <a:ext uri="{96DAC541-7B7A-43D3-8B79-37D633B846F1}">
-                <asvg:svgBlip xmlns:asvg="http://schemas.microsoft.com/office/drawing/2016/SVG/main" r:embed="rId11"/>
-              </a:ext>
-            </a:extLst>
-          </a:blip>
-          <a:stretch>
-            <a:fillRect/>
-          </a:stretch>
-        </p:blipFill>
-        <p:spPr>
-          <a:xfrm>
-            <a:off x="284313" y="2282941"/>
-            <a:ext cx="548640" cy="548640"/>
-          </a:xfrm>
-          <a:prstGeom prst="rect">
-            <a:avLst/>
-          </a:prstGeom>
-        </p:spPr>
-      </p:pic>
-      <p:pic>
-        <p:nvPicPr>
-          <p:cNvPr id="36" name="Graphic 35" descr="School girl">
-            <a:extLst>
-              <a:ext uri="{FF2B5EF4-FFF2-40B4-BE49-F238E27FC236}">
-                <a16:creationId xmlns:a16="http://schemas.microsoft.com/office/drawing/2014/main" id="{C2C55299-2E10-C44A-BC63-4DFDA1A799E2}"/>
-              </a:ext>
-            </a:extLst>
-          </p:cNvPr>
-          <p:cNvPicPr>
-            <a:picLocks noChangeAspect="1"/>
-          </p:cNvPicPr>
-          <p:nvPr/>
-        </p:nvPicPr>
-        <p:blipFill>
-          <a:blip r:embed="rId12">
-            <a:extLst>
-              <a:ext uri="{96DAC541-7B7A-43D3-8B79-37D633B846F1}">
-                <asvg:svgBlip xmlns:asvg="http://schemas.microsoft.com/office/drawing/2016/SVG/main" r:embed="rId13"/>
-              </a:ext>
-            </a:extLst>
-          </a:blip>
-          <a:stretch>
-            <a:fillRect/>
-          </a:stretch>
-        </p:blipFill>
-        <p:spPr>
-          <a:xfrm>
-            <a:off x="625309" y="3026741"/>
-            <a:ext cx="548640" cy="548640"/>
-          </a:xfrm>
-          <a:prstGeom prst="rect">
-            <a:avLst/>
-          </a:prstGeom>
-        </p:spPr>
-      </p:pic>
-      <p:pic>
-        <p:nvPicPr>
-          <p:cNvPr id="37" name="Graphic 36" descr="User">
-            <a:extLst>
-              <a:ext uri="{FF2B5EF4-FFF2-40B4-BE49-F238E27FC236}">
-                <a16:creationId xmlns:a16="http://schemas.microsoft.com/office/drawing/2014/main" id="{6FA18981-96F5-2C4E-9FD2-0E3D37F43798}"/>
-              </a:ext>
-            </a:extLst>
-          </p:cNvPr>
-          <p:cNvPicPr>
-            <a:picLocks noChangeAspect="1"/>
-          </p:cNvPicPr>
-          <p:nvPr/>
-        </p:nvPicPr>
-        <p:blipFill>
-          <a:blip r:embed="rId14">
-            <a:extLst>
-              <a:ext uri="{96DAC541-7B7A-43D3-8B79-37D633B846F1}">
-                <asvg:svgBlip xmlns:asvg="http://schemas.microsoft.com/office/drawing/2016/SVG/main" r:embed="rId15"/>
-              </a:ext>
-            </a:extLst>
-          </a:blip>
-          <a:stretch>
-            <a:fillRect/>
-          </a:stretch>
-        </p:blipFill>
-        <p:spPr>
-          <a:xfrm>
-            <a:off x="997771" y="3852601"/>
-            <a:ext cx="548640" cy="548640"/>
-          </a:xfrm>
-          <a:prstGeom prst="rect">
-            <a:avLst/>
-          </a:prstGeom>
-        </p:spPr>
-      </p:pic>
-      <p:pic>
-        <p:nvPicPr>
-          <p:cNvPr id="39" name="Graphic 38" descr="Male profile">
-            <a:extLst>
-              <a:ext uri="{FF2B5EF4-FFF2-40B4-BE49-F238E27FC236}">
-                <a16:creationId xmlns:a16="http://schemas.microsoft.com/office/drawing/2014/main" id="{C31BA2FA-0346-AF4E-9947-474BCEEA1E1A}"/>
-              </a:ext>
-            </a:extLst>
-          </p:cNvPr>
-          <p:cNvPicPr>
-            <a:picLocks noChangeAspect="1"/>
-          </p:cNvPicPr>
-          <p:nvPr/>
-        </p:nvPicPr>
-        <p:blipFill>
-          <a:blip r:embed="rId16">
-            <a:extLst>
-              <a:ext uri="{96DAC541-7B7A-43D3-8B79-37D633B846F1}">
-                <asvg:svgBlip xmlns:asvg="http://schemas.microsoft.com/office/drawing/2016/SVG/main" r:embed="rId17"/>
-              </a:ext>
-            </a:extLst>
-          </a:blip>
-          <a:stretch>
-            <a:fillRect/>
-          </a:stretch>
-        </p:blipFill>
-        <p:spPr>
-          <a:xfrm>
-            <a:off x="260342" y="3984682"/>
-            <a:ext cx="548640" cy="548640"/>
-          </a:xfrm>
-          <a:prstGeom prst="rect">
-            <a:avLst/>
-          </a:prstGeom>
-        </p:spPr>
-      </p:pic>
-      <p:pic>
-        <p:nvPicPr>
-          <p:cNvPr id="40" name="Graphic 39" descr="Male profile">
-            <a:extLst>
-              <a:ext uri="{FF2B5EF4-FFF2-40B4-BE49-F238E27FC236}">
-                <a16:creationId xmlns:a16="http://schemas.microsoft.com/office/drawing/2014/main" id="{31F7B851-1FE9-0041-8F10-EFAE91321223}"/>
-              </a:ext>
-            </a:extLst>
-          </p:cNvPr>
-          <p:cNvPicPr>
-            <a:picLocks noChangeAspect="1"/>
-          </p:cNvPicPr>
-          <p:nvPr/>
-        </p:nvPicPr>
-        <p:blipFill>
-          <a:blip r:embed="rId18">
-            <a:extLst>
-              <a:ext uri="{96DAC541-7B7A-43D3-8B79-37D633B846F1}">
-                <asvg:svgBlip xmlns:asvg="http://schemas.microsoft.com/office/drawing/2016/SVG/main" r:embed="rId19"/>
-              </a:ext>
-            </a:extLst>
-          </a:blip>
-          <a:stretch>
-            <a:fillRect/>
-          </a:stretch>
-        </p:blipFill>
-        <p:spPr>
-          <a:xfrm>
-            <a:off x="1105342" y="2310241"/>
-            <a:ext cx="548640" cy="548640"/>
-          </a:xfrm>
-          <a:prstGeom prst="rect">
-            <a:avLst/>
-          </a:prstGeom>
-        </p:spPr>
-      </p:pic>
-      <p:pic>
-        <p:nvPicPr>
-          <p:cNvPr id="41" name="Graphic 40" descr="User">
-            <a:extLst>
-              <a:ext uri="{FF2B5EF4-FFF2-40B4-BE49-F238E27FC236}">
-                <a16:creationId xmlns:a16="http://schemas.microsoft.com/office/drawing/2014/main" id="{E040F2A3-AFAF-D148-A107-32FE22473B6E}"/>
-              </a:ext>
-            </a:extLst>
-          </p:cNvPr>
-          <p:cNvPicPr>
-            <a:picLocks noChangeAspect="1"/>
-          </p:cNvPicPr>
-          <p:nvPr/>
-        </p:nvPicPr>
-        <p:blipFill>
-          <a:blip r:embed="rId20">
-            <a:extLst>
-              <a:ext uri="{96DAC541-7B7A-43D3-8B79-37D633B846F1}">
-                <asvg:svgBlip xmlns:asvg="http://schemas.microsoft.com/office/drawing/2016/SVG/main" r:embed="rId21"/>
-              </a:ext>
-            </a:extLst>
-          </a:blip>
-          <a:stretch>
-            <a:fillRect/>
-          </a:stretch>
-        </p:blipFill>
-        <p:spPr>
-          <a:xfrm>
-            <a:off x="1096337" y="2834032"/>
-            <a:ext cx="548640" cy="548640"/>
-          </a:xfrm>
-          <a:prstGeom prst="rect">
-            <a:avLst/>
-          </a:prstGeom>
-        </p:spPr>
-      </p:pic>
-      <p:pic>
-        <p:nvPicPr>
-          <p:cNvPr id="42" name="Graphic 41" descr="School girl">
-            <a:extLst>
-              <a:ext uri="{FF2B5EF4-FFF2-40B4-BE49-F238E27FC236}">
-                <a16:creationId xmlns:a16="http://schemas.microsoft.com/office/drawing/2014/main" id="{3F63AF07-EE5F-CF47-A082-F91C131F360C}"/>
-              </a:ext>
-            </a:extLst>
-          </p:cNvPr>
-          <p:cNvPicPr>
-            <a:picLocks noChangeAspect="1"/>
-          </p:cNvPicPr>
-          <p:nvPr/>
-        </p:nvPicPr>
-        <p:blipFill>
-          <a:blip r:embed="rId10">
-            <a:extLst>
-              <a:ext uri="{96DAC541-7B7A-43D3-8B79-37D633B846F1}">
-                <asvg:svgBlip xmlns:asvg="http://schemas.microsoft.com/office/drawing/2016/SVG/main" r:embed="rId11"/>
-              </a:ext>
-            </a:extLst>
-          </a:blip>
-          <a:stretch>
-            <a:fillRect/>
-          </a:stretch>
-        </p:blipFill>
-        <p:spPr>
-          <a:xfrm>
-            <a:off x="1096337" y="3310225"/>
-            <a:ext cx="548640" cy="548640"/>
-          </a:xfrm>
-          <a:prstGeom prst="rect">
-            <a:avLst/>
-          </a:prstGeom>
-        </p:spPr>
-      </p:pic>
-      <p:pic>
-        <p:nvPicPr>
-          <p:cNvPr id="43" name="Graphic 42" descr="Female Profile">
-            <a:extLst>
-              <a:ext uri="{FF2B5EF4-FFF2-40B4-BE49-F238E27FC236}">
-                <a16:creationId xmlns:a16="http://schemas.microsoft.com/office/drawing/2014/main" id="{2627CD7E-A53B-F24A-B1B8-3F6E79640393}"/>
-              </a:ext>
-            </a:extLst>
-          </p:cNvPr>
-          <p:cNvPicPr>
-            <a:picLocks noChangeAspect="1"/>
-          </p:cNvPicPr>
-          <p:nvPr/>
-        </p:nvPicPr>
-        <p:blipFill>
-          <a:blip r:embed="rId4">
-            <a:extLst>
-              <a:ext uri="{96DAC541-7B7A-43D3-8B79-37D633B846F1}">
-                <asvg:svgBlip xmlns:asvg="http://schemas.microsoft.com/office/drawing/2016/SVG/main" r:embed="rId5"/>
-              </a:ext>
-            </a:extLst>
-          </a:blip>
-          <a:stretch>
-            <a:fillRect/>
-          </a:stretch>
-        </p:blipFill>
-        <p:spPr>
-          <a:xfrm>
-            <a:off x="573002" y="3569117"/>
-            <a:ext cx="548640" cy="548640"/>
-          </a:xfrm>
-          <a:prstGeom prst="rect">
-            <a:avLst/>
-          </a:prstGeom>
-        </p:spPr>
-      </p:pic>
-      <p:sp>
-        <p:nvSpPr>
-          <p:cNvPr id="52" name="Rounded Rectangle 51">
-            <a:extLst>
-              <a:ext uri="{FF2B5EF4-FFF2-40B4-BE49-F238E27FC236}">
-                <a16:creationId xmlns:a16="http://schemas.microsoft.com/office/drawing/2014/main" id="{679284B6-69AC-1545-BE16-018888117D47}"/>
+            <a:endParaRPr lang="en-US">
+              <a:solidFill>
+                <a:schemeClr val="tx1"/>
+              </a:solidFill>
+            </a:endParaRPr>
+          </a:p>
+        </p:txBody>
+      </p:sp>
+      <p:sp>
+        <p:nvSpPr>
+          <p:cNvPr id="29" name="Rounded Rectangle 28">
+            <a:extLst>
+              <a:ext uri="{FF2B5EF4-FFF2-40B4-BE49-F238E27FC236}">
+                <a16:creationId xmlns:a16="http://schemas.microsoft.com/office/drawing/2014/main" id="{268C8C7B-9178-D948-AD10-9E84F02C0139}"/>
               </a:ext>
             </a:extLst>
           </p:cNvPr>
@@ -4915,23 +4512,18 @@
         </p:nvSpPr>
         <p:spPr>
           <a:xfrm>
-            <a:off x="5905285" y="1925327"/>
-            <a:ext cx="1170215" cy="674914"/>
+            <a:off x="2272511" y="3091099"/>
+            <a:ext cx="689886" cy="618939"/>
           </a:xfrm>
           <a:prstGeom prst="roundRect">
             <a:avLst/>
           </a:prstGeom>
           <a:solidFill>
-            <a:schemeClr val="accent1">
-              <a:lumMod val="60000"/>
-              <a:lumOff val="40000"/>
-            </a:schemeClr>
+            <a:schemeClr val="bg1"/>
           </a:solidFill>
-          <a:ln w="19050">
+          <a:ln>
             <a:solidFill>
-              <a:schemeClr val="accent1">
-                <a:lumMod val="50000"/>
-              </a:schemeClr>
+              <a:schemeClr val="bg1"/>
             </a:solidFill>
           </a:ln>
         </p:spPr>
@@ -4956,20 +4548,448 @@
           <a:lstStyle/>
           <a:p>
             <a:pPr algn="ctr"/>
-            <a:endParaRPr lang="en-US" dirty="0">
-              <a:solidFill>
-                <a:schemeClr val="tx1"/>
-              </a:solidFill>
-            </a:endParaRPr>
-          </a:p>
-        </p:txBody>
-      </p:sp>
-      <p:sp>
-        <p:nvSpPr>
-          <p:cNvPr id="53" name="Rounded Rectangle 52">
-            <a:extLst>
-              <a:ext uri="{FF2B5EF4-FFF2-40B4-BE49-F238E27FC236}">
-                <a16:creationId xmlns:a16="http://schemas.microsoft.com/office/drawing/2014/main" id="{7BD1F8B5-1F8A-D543-8BDC-C30167A00E6A}"/>
+            <a:endParaRPr lang="en-US"/>
+          </a:p>
+        </p:txBody>
+      </p:sp>
+      <p:pic>
+        <p:nvPicPr>
+          <p:cNvPr id="31" name="Graphic 30" descr="School boy">
+            <a:extLst>
+              <a:ext uri="{FF2B5EF4-FFF2-40B4-BE49-F238E27FC236}">
+                <a16:creationId xmlns:a16="http://schemas.microsoft.com/office/drawing/2014/main" id="{23C14CCA-0229-0945-AD1D-3EA26AB7C249}"/>
+              </a:ext>
+            </a:extLst>
+          </p:cNvPr>
+          <p:cNvPicPr>
+            <a:picLocks noChangeAspect="1"/>
+          </p:cNvPicPr>
+          <p:nvPr/>
+        </p:nvPicPr>
+        <p:blipFill>
+          <a:blip r:embed="rId2">
+            <a:extLst>
+              <a:ext uri="{96DAC541-7B7A-43D3-8B79-37D633B846F1}">
+                <asvg:svgBlip xmlns:asvg="http://schemas.microsoft.com/office/drawing/2016/SVG/main" r:embed="rId3"/>
+              </a:ext>
+            </a:extLst>
+          </a:blip>
+          <a:stretch>
+            <a:fillRect/>
+          </a:stretch>
+        </p:blipFill>
+        <p:spPr>
+          <a:xfrm>
+            <a:off x="686244" y="1968817"/>
+            <a:ext cx="548640" cy="548640"/>
+          </a:xfrm>
+          <a:prstGeom prst="rect">
+            <a:avLst/>
+          </a:prstGeom>
+        </p:spPr>
+      </p:pic>
+      <p:pic>
+        <p:nvPicPr>
+          <p:cNvPr id="32" name="Graphic 31" descr="Female Profile">
+            <a:extLst>
+              <a:ext uri="{FF2B5EF4-FFF2-40B4-BE49-F238E27FC236}">
+                <a16:creationId xmlns:a16="http://schemas.microsoft.com/office/drawing/2014/main" id="{FB0AD0DD-5F7D-7542-96A5-78D8D8B5C0C9}"/>
+              </a:ext>
+            </a:extLst>
+          </p:cNvPr>
+          <p:cNvPicPr>
+            <a:picLocks noChangeAspect="1"/>
+          </p:cNvPicPr>
+          <p:nvPr/>
+        </p:nvPicPr>
+        <p:blipFill>
+          <a:blip r:embed="rId4">
+            <a:extLst>
+              <a:ext uri="{96DAC541-7B7A-43D3-8B79-37D633B846F1}">
+                <asvg:svgBlip xmlns:asvg="http://schemas.microsoft.com/office/drawing/2016/SVG/main" r:embed="rId5"/>
+              </a:ext>
+            </a:extLst>
+          </a:blip>
+          <a:stretch>
+            <a:fillRect/>
+          </a:stretch>
+        </p:blipFill>
+        <p:spPr>
+          <a:xfrm>
+            <a:off x="162689" y="2795857"/>
+            <a:ext cx="548640" cy="548640"/>
+          </a:xfrm>
+          <a:prstGeom prst="rect">
+            <a:avLst/>
+          </a:prstGeom>
+        </p:spPr>
+      </p:pic>
+      <p:pic>
+        <p:nvPicPr>
+          <p:cNvPr id="33" name="Graphic 32" descr="School boy">
+            <a:extLst>
+              <a:ext uri="{FF2B5EF4-FFF2-40B4-BE49-F238E27FC236}">
+                <a16:creationId xmlns:a16="http://schemas.microsoft.com/office/drawing/2014/main" id="{DB43DC05-529E-D441-A524-D0B30D5D4E06}"/>
+              </a:ext>
+            </a:extLst>
+          </p:cNvPr>
+          <p:cNvPicPr>
+            <a:picLocks noChangeAspect="1"/>
+          </p:cNvPicPr>
+          <p:nvPr/>
+        </p:nvPicPr>
+        <p:blipFill>
+          <a:blip r:embed="rId6">
+            <a:extLst>
+              <a:ext uri="{96DAC541-7B7A-43D3-8B79-37D633B846F1}">
+                <asvg:svgBlip xmlns:asvg="http://schemas.microsoft.com/office/drawing/2016/SVG/main" r:embed="rId7"/>
+              </a:ext>
+            </a:extLst>
+          </a:blip>
+          <a:stretch>
+            <a:fillRect/>
+          </a:stretch>
+        </p:blipFill>
+        <p:spPr>
+          <a:xfrm>
+            <a:off x="625309" y="2453742"/>
+            <a:ext cx="548640" cy="548640"/>
+          </a:xfrm>
+          <a:prstGeom prst="rect">
+            <a:avLst/>
+          </a:prstGeom>
+        </p:spPr>
+      </p:pic>
+      <p:pic>
+        <p:nvPicPr>
+          <p:cNvPr id="34" name="Graphic 33" descr="Female Profile">
+            <a:extLst>
+              <a:ext uri="{FF2B5EF4-FFF2-40B4-BE49-F238E27FC236}">
+                <a16:creationId xmlns:a16="http://schemas.microsoft.com/office/drawing/2014/main" id="{44118B0F-5F5C-104D-89F1-FF4F0677B581}"/>
+              </a:ext>
+            </a:extLst>
+          </p:cNvPr>
+          <p:cNvPicPr>
+            <a:picLocks noChangeAspect="1"/>
+          </p:cNvPicPr>
+          <p:nvPr/>
+        </p:nvPicPr>
+        <p:blipFill>
+          <a:blip r:embed="rId8">
+            <a:extLst>
+              <a:ext uri="{96DAC541-7B7A-43D3-8B79-37D633B846F1}">
+                <asvg:svgBlip xmlns:asvg="http://schemas.microsoft.com/office/drawing/2016/SVG/main" r:embed="rId9"/>
+              </a:ext>
+            </a:extLst>
+          </a:blip>
+          <a:stretch>
+            <a:fillRect/>
+          </a:stretch>
+        </p:blipFill>
+        <p:spPr>
+          <a:xfrm>
+            <a:off x="149603" y="3428773"/>
+            <a:ext cx="548640" cy="548640"/>
+          </a:xfrm>
+          <a:prstGeom prst="rect">
+            <a:avLst/>
+          </a:prstGeom>
+        </p:spPr>
+      </p:pic>
+      <p:pic>
+        <p:nvPicPr>
+          <p:cNvPr id="35" name="Graphic 34" descr="School girl">
+            <a:extLst>
+              <a:ext uri="{FF2B5EF4-FFF2-40B4-BE49-F238E27FC236}">
+                <a16:creationId xmlns:a16="http://schemas.microsoft.com/office/drawing/2014/main" id="{38748C23-E12A-E34D-8964-5C6C40FF9564}"/>
+              </a:ext>
+            </a:extLst>
+          </p:cNvPr>
+          <p:cNvPicPr>
+            <a:picLocks noChangeAspect="1"/>
+          </p:cNvPicPr>
+          <p:nvPr/>
+        </p:nvPicPr>
+        <p:blipFill>
+          <a:blip r:embed="rId10">
+            <a:extLst>
+              <a:ext uri="{96DAC541-7B7A-43D3-8B79-37D633B846F1}">
+                <asvg:svgBlip xmlns:asvg="http://schemas.microsoft.com/office/drawing/2016/SVG/main" r:embed="rId11"/>
+              </a:ext>
+            </a:extLst>
+          </a:blip>
+          <a:stretch>
+            <a:fillRect/>
+          </a:stretch>
+        </p:blipFill>
+        <p:spPr>
+          <a:xfrm>
+            <a:off x="284313" y="2282941"/>
+            <a:ext cx="548640" cy="548640"/>
+          </a:xfrm>
+          <a:prstGeom prst="rect">
+            <a:avLst/>
+          </a:prstGeom>
+        </p:spPr>
+      </p:pic>
+      <p:pic>
+        <p:nvPicPr>
+          <p:cNvPr id="36" name="Graphic 35" descr="School girl">
+            <a:extLst>
+              <a:ext uri="{FF2B5EF4-FFF2-40B4-BE49-F238E27FC236}">
+                <a16:creationId xmlns:a16="http://schemas.microsoft.com/office/drawing/2014/main" id="{C2C55299-2E10-C44A-BC63-4DFDA1A799E2}"/>
+              </a:ext>
+            </a:extLst>
+          </p:cNvPr>
+          <p:cNvPicPr>
+            <a:picLocks noChangeAspect="1"/>
+          </p:cNvPicPr>
+          <p:nvPr/>
+        </p:nvPicPr>
+        <p:blipFill>
+          <a:blip r:embed="rId12">
+            <a:extLst>
+              <a:ext uri="{96DAC541-7B7A-43D3-8B79-37D633B846F1}">
+                <asvg:svgBlip xmlns:asvg="http://schemas.microsoft.com/office/drawing/2016/SVG/main" r:embed="rId13"/>
+              </a:ext>
+            </a:extLst>
+          </a:blip>
+          <a:stretch>
+            <a:fillRect/>
+          </a:stretch>
+        </p:blipFill>
+        <p:spPr>
+          <a:xfrm>
+            <a:off x="625309" y="3026741"/>
+            <a:ext cx="548640" cy="548640"/>
+          </a:xfrm>
+          <a:prstGeom prst="rect">
+            <a:avLst/>
+          </a:prstGeom>
+        </p:spPr>
+      </p:pic>
+      <p:pic>
+        <p:nvPicPr>
+          <p:cNvPr id="37" name="Graphic 36" descr="User">
+            <a:extLst>
+              <a:ext uri="{FF2B5EF4-FFF2-40B4-BE49-F238E27FC236}">
+                <a16:creationId xmlns:a16="http://schemas.microsoft.com/office/drawing/2014/main" id="{6FA18981-96F5-2C4E-9FD2-0E3D37F43798}"/>
+              </a:ext>
+            </a:extLst>
+          </p:cNvPr>
+          <p:cNvPicPr>
+            <a:picLocks noChangeAspect="1"/>
+          </p:cNvPicPr>
+          <p:nvPr/>
+        </p:nvPicPr>
+        <p:blipFill>
+          <a:blip r:embed="rId14">
+            <a:extLst>
+              <a:ext uri="{96DAC541-7B7A-43D3-8B79-37D633B846F1}">
+                <asvg:svgBlip xmlns:asvg="http://schemas.microsoft.com/office/drawing/2016/SVG/main" r:embed="rId15"/>
+              </a:ext>
+            </a:extLst>
+          </a:blip>
+          <a:stretch>
+            <a:fillRect/>
+          </a:stretch>
+        </p:blipFill>
+        <p:spPr>
+          <a:xfrm>
+            <a:off x="997771" y="3852601"/>
+            <a:ext cx="548640" cy="548640"/>
+          </a:xfrm>
+          <a:prstGeom prst="rect">
+            <a:avLst/>
+          </a:prstGeom>
+        </p:spPr>
+      </p:pic>
+      <p:pic>
+        <p:nvPicPr>
+          <p:cNvPr id="39" name="Graphic 38" descr="Male profile">
+            <a:extLst>
+              <a:ext uri="{FF2B5EF4-FFF2-40B4-BE49-F238E27FC236}">
+                <a16:creationId xmlns:a16="http://schemas.microsoft.com/office/drawing/2014/main" id="{C31BA2FA-0346-AF4E-9947-474BCEEA1E1A}"/>
+              </a:ext>
+            </a:extLst>
+          </p:cNvPr>
+          <p:cNvPicPr>
+            <a:picLocks noChangeAspect="1"/>
+          </p:cNvPicPr>
+          <p:nvPr/>
+        </p:nvPicPr>
+        <p:blipFill>
+          <a:blip r:embed="rId16">
+            <a:extLst>
+              <a:ext uri="{96DAC541-7B7A-43D3-8B79-37D633B846F1}">
+                <asvg:svgBlip xmlns:asvg="http://schemas.microsoft.com/office/drawing/2016/SVG/main" r:embed="rId17"/>
+              </a:ext>
+            </a:extLst>
+          </a:blip>
+          <a:stretch>
+            <a:fillRect/>
+          </a:stretch>
+        </p:blipFill>
+        <p:spPr>
+          <a:xfrm>
+            <a:off x="260342" y="3984682"/>
+            <a:ext cx="548640" cy="548640"/>
+          </a:xfrm>
+          <a:prstGeom prst="rect">
+            <a:avLst/>
+          </a:prstGeom>
+        </p:spPr>
+      </p:pic>
+      <p:pic>
+        <p:nvPicPr>
+          <p:cNvPr id="40" name="Graphic 39" descr="Male profile">
+            <a:extLst>
+              <a:ext uri="{FF2B5EF4-FFF2-40B4-BE49-F238E27FC236}">
+                <a16:creationId xmlns:a16="http://schemas.microsoft.com/office/drawing/2014/main" id="{31F7B851-1FE9-0041-8F10-EFAE91321223}"/>
+              </a:ext>
+            </a:extLst>
+          </p:cNvPr>
+          <p:cNvPicPr>
+            <a:picLocks noChangeAspect="1"/>
+          </p:cNvPicPr>
+          <p:nvPr/>
+        </p:nvPicPr>
+        <p:blipFill>
+          <a:blip r:embed="rId18">
+            <a:extLst>
+              <a:ext uri="{96DAC541-7B7A-43D3-8B79-37D633B846F1}">
+                <asvg:svgBlip xmlns:asvg="http://schemas.microsoft.com/office/drawing/2016/SVG/main" r:embed="rId19"/>
+              </a:ext>
+            </a:extLst>
+          </a:blip>
+          <a:stretch>
+            <a:fillRect/>
+          </a:stretch>
+        </p:blipFill>
+        <p:spPr>
+          <a:xfrm>
+            <a:off x="1105342" y="2310241"/>
+            <a:ext cx="548640" cy="548640"/>
+          </a:xfrm>
+          <a:prstGeom prst="rect">
+            <a:avLst/>
+          </a:prstGeom>
+        </p:spPr>
+      </p:pic>
+      <p:pic>
+        <p:nvPicPr>
+          <p:cNvPr id="41" name="Graphic 40" descr="User">
+            <a:extLst>
+              <a:ext uri="{FF2B5EF4-FFF2-40B4-BE49-F238E27FC236}">
+                <a16:creationId xmlns:a16="http://schemas.microsoft.com/office/drawing/2014/main" id="{E040F2A3-AFAF-D148-A107-32FE22473B6E}"/>
+              </a:ext>
+            </a:extLst>
+          </p:cNvPr>
+          <p:cNvPicPr>
+            <a:picLocks noChangeAspect="1"/>
+          </p:cNvPicPr>
+          <p:nvPr/>
+        </p:nvPicPr>
+        <p:blipFill>
+          <a:blip r:embed="rId20">
+            <a:extLst>
+              <a:ext uri="{96DAC541-7B7A-43D3-8B79-37D633B846F1}">
+                <asvg:svgBlip xmlns:asvg="http://schemas.microsoft.com/office/drawing/2016/SVG/main" r:embed="rId21"/>
+              </a:ext>
+            </a:extLst>
+          </a:blip>
+          <a:stretch>
+            <a:fillRect/>
+          </a:stretch>
+        </p:blipFill>
+        <p:spPr>
+          <a:xfrm>
+            <a:off x="1096337" y="2834032"/>
+            <a:ext cx="548640" cy="548640"/>
+          </a:xfrm>
+          <a:prstGeom prst="rect">
+            <a:avLst/>
+          </a:prstGeom>
+        </p:spPr>
+      </p:pic>
+      <p:pic>
+        <p:nvPicPr>
+          <p:cNvPr id="42" name="Graphic 41" descr="School girl">
+            <a:extLst>
+              <a:ext uri="{FF2B5EF4-FFF2-40B4-BE49-F238E27FC236}">
+                <a16:creationId xmlns:a16="http://schemas.microsoft.com/office/drawing/2014/main" id="{3F63AF07-EE5F-CF47-A082-F91C131F360C}"/>
+              </a:ext>
+            </a:extLst>
+          </p:cNvPr>
+          <p:cNvPicPr>
+            <a:picLocks noChangeAspect="1"/>
+          </p:cNvPicPr>
+          <p:nvPr/>
+        </p:nvPicPr>
+        <p:blipFill>
+          <a:blip r:embed="rId10">
+            <a:extLst>
+              <a:ext uri="{96DAC541-7B7A-43D3-8B79-37D633B846F1}">
+                <asvg:svgBlip xmlns:asvg="http://schemas.microsoft.com/office/drawing/2016/SVG/main" r:embed="rId11"/>
+              </a:ext>
+            </a:extLst>
+          </a:blip>
+          <a:stretch>
+            <a:fillRect/>
+          </a:stretch>
+        </p:blipFill>
+        <p:spPr>
+          <a:xfrm>
+            <a:off x="1096337" y="3310225"/>
+            <a:ext cx="548640" cy="548640"/>
+          </a:xfrm>
+          <a:prstGeom prst="rect">
+            <a:avLst/>
+          </a:prstGeom>
+        </p:spPr>
+      </p:pic>
+      <p:pic>
+        <p:nvPicPr>
+          <p:cNvPr id="43" name="Graphic 42" descr="Female Profile">
+            <a:extLst>
+              <a:ext uri="{FF2B5EF4-FFF2-40B4-BE49-F238E27FC236}">
+                <a16:creationId xmlns:a16="http://schemas.microsoft.com/office/drawing/2014/main" id="{2627CD7E-A53B-F24A-B1B8-3F6E79640393}"/>
+              </a:ext>
+            </a:extLst>
+          </p:cNvPr>
+          <p:cNvPicPr>
+            <a:picLocks noChangeAspect="1"/>
+          </p:cNvPicPr>
+          <p:nvPr/>
+        </p:nvPicPr>
+        <p:blipFill>
+          <a:blip r:embed="rId4">
+            <a:extLst>
+              <a:ext uri="{96DAC541-7B7A-43D3-8B79-37D633B846F1}">
+                <asvg:svgBlip xmlns:asvg="http://schemas.microsoft.com/office/drawing/2016/SVG/main" r:embed="rId5"/>
+              </a:ext>
+            </a:extLst>
+          </a:blip>
+          <a:stretch>
+            <a:fillRect/>
+          </a:stretch>
+        </p:blipFill>
+        <p:spPr>
+          <a:xfrm>
+            <a:off x="573002" y="3569117"/>
+            <a:ext cx="548640" cy="548640"/>
+          </a:xfrm>
+          <a:prstGeom prst="rect">
+            <a:avLst/>
+          </a:prstGeom>
+        </p:spPr>
+      </p:pic>
+      <p:sp>
+        <p:nvSpPr>
+          <p:cNvPr id="52" name="Rounded Rectangle 51">
+            <a:extLst>
+              <a:ext uri="{FF2B5EF4-FFF2-40B4-BE49-F238E27FC236}">
+                <a16:creationId xmlns:a16="http://schemas.microsoft.com/office/drawing/2014/main" id="{679284B6-69AC-1545-BE16-018888117D47}"/>
               </a:ext>
             </a:extLst>
           </p:cNvPr>
@@ -4978,7 +4998,7 @@
         </p:nvSpPr>
         <p:spPr>
           <a:xfrm>
-            <a:off x="5774655" y="2061399"/>
+            <a:off x="5905285" y="1925327"/>
             <a:ext cx="1170215" cy="674914"/>
           </a:xfrm>
           <a:prstGeom prst="roundRect">
@@ -4986,7 +5006,8 @@
           </a:prstGeom>
           <a:solidFill>
             <a:schemeClr val="accent1">
-              <a:lumMod val="75000"/>
+              <a:lumMod val="60000"/>
+              <a:lumOff val="40000"/>
             </a:schemeClr>
           </a:solidFill>
           <a:ln w="19050">
@@ -5018,23 +5039,20 @@
           <a:lstStyle/>
           <a:p>
             <a:pPr algn="ctr"/>
-            <a:r>
-              <a:rPr lang="en-US" dirty="0">
-                <a:solidFill>
-                  <a:schemeClr val="bg1"/>
-                </a:solidFill>
-              </a:rPr>
-              <a:t>v1.0</a:t>
-            </a:r>
-          </a:p>
-        </p:txBody>
-      </p:sp>
-      <p:sp>
-        <p:nvSpPr>
-          <p:cNvPr id="54" name="Rounded Rectangle 53">
-            <a:extLst>
-              <a:ext uri="{FF2B5EF4-FFF2-40B4-BE49-F238E27FC236}">
-                <a16:creationId xmlns:a16="http://schemas.microsoft.com/office/drawing/2014/main" id="{C6EFCFA5-008A-E54A-9504-84FEF0E7F2F0}"/>
+            <a:endParaRPr lang="en-US" dirty="0">
+              <a:solidFill>
+                <a:schemeClr val="tx1"/>
+              </a:solidFill>
+            </a:endParaRPr>
+          </a:p>
+        </p:txBody>
+      </p:sp>
+      <p:sp>
+        <p:nvSpPr>
+          <p:cNvPr id="53" name="Rounded Rectangle 52">
+            <a:extLst>
+              <a:ext uri="{FF2B5EF4-FFF2-40B4-BE49-F238E27FC236}">
+                <a16:creationId xmlns:a16="http://schemas.microsoft.com/office/drawing/2014/main" id="{7BD1F8B5-1F8A-D543-8BDC-C30167A00E6A}"/>
               </a:ext>
             </a:extLst>
           </p:cNvPr>
@@ -5043,20 +5061,20 @@
         </p:nvSpPr>
         <p:spPr>
           <a:xfrm>
-            <a:off x="5774655" y="4272676"/>
+            <a:off x="5774655" y="2061399"/>
             <a:ext cx="1170215" cy="674914"/>
           </a:xfrm>
           <a:prstGeom prst="roundRect">
             <a:avLst/>
           </a:prstGeom>
           <a:solidFill>
-            <a:schemeClr val="accent6">
+            <a:schemeClr val="accent1">
               <a:lumMod val="75000"/>
             </a:schemeClr>
           </a:solidFill>
           <a:ln w="19050">
             <a:solidFill>
-              <a:schemeClr val="accent6">
+              <a:schemeClr val="accent1">
                 <a:lumMod val="50000"/>
               </a:schemeClr>
             </a:solidFill>
@@ -5089,17 +5107,17 @@
                   <a:schemeClr val="bg1"/>
                 </a:solidFill>
               </a:rPr>
-              <a:t>v2.0</a:t>
-            </a:r>
-          </a:p>
-        </p:txBody>
-      </p:sp>
-      <p:sp>
-        <p:nvSpPr>
-          <p:cNvPr id="56" name="Rounded Rectangle 55">
-            <a:extLst>
-              <a:ext uri="{FF2B5EF4-FFF2-40B4-BE49-F238E27FC236}">
-                <a16:creationId xmlns:a16="http://schemas.microsoft.com/office/drawing/2014/main" id="{055D8326-B9BB-8D40-AB91-9DBD2DB840A9}"/>
+              <a:t>v1.0</a:t>
+            </a:r>
+          </a:p>
+        </p:txBody>
+      </p:sp>
+      <p:sp>
+        <p:nvSpPr>
+          <p:cNvPr id="54" name="Rounded Rectangle 53">
+            <a:extLst>
+              <a:ext uri="{FF2B5EF4-FFF2-40B4-BE49-F238E27FC236}">
+                <a16:creationId xmlns:a16="http://schemas.microsoft.com/office/drawing/2014/main" id="{C6EFCFA5-008A-E54A-9504-84FEF0E7F2F0}"/>
               </a:ext>
             </a:extLst>
           </p:cNvPr>
@@ -5108,18 +5126,22 @@
         </p:nvSpPr>
         <p:spPr>
           <a:xfrm>
-            <a:off x="4781170" y="3116049"/>
-            <a:ext cx="689886" cy="618939"/>
+            <a:off x="5774655" y="4272676"/>
+            <a:ext cx="1170215" cy="674914"/>
           </a:xfrm>
           <a:prstGeom prst="roundRect">
             <a:avLst/>
           </a:prstGeom>
           <a:solidFill>
-            <a:schemeClr val="bg1"/>
+            <a:schemeClr val="accent6">
+              <a:lumMod val="75000"/>
+            </a:schemeClr>
           </a:solidFill>
-          <a:ln>
+          <a:ln w="19050">
             <a:solidFill>
-              <a:schemeClr val="bg1"/>
+              <a:schemeClr val="accent6">
+                <a:lumMod val="50000"/>
+              </a:schemeClr>
             </a:solidFill>
           </a:ln>
         </p:spPr>
@@ -5144,16 +5166,23 @@
           <a:lstStyle/>
           <a:p>
             <a:pPr algn="ctr"/>
-            <a:endParaRPr lang="en-US"/>
-          </a:p>
-        </p:txBody>
-      </p:sp>
-      <p:sp>
-        <p:nvSpPr>
-          <p:cNvPr id="73" name="Rounded Rectangle 72">
-            <a:extLst>
-              <a:ext uri="{FF2B5EF4-FFF2-40B4-BE49-F238E27FC236}">
-                <a16:creationId xmlns:a16="http://schemas.microsoft.com/office/drawing/2014/main" id="{E71FD733-5596-9147-92A5-95EF2ED71511}"/>
+            <a:r>
+              <a:rPr lang="en-US" dirty="0">
+                <a:solidFill>
+                  <a:schemeClr val="bg1"/>
+                </a:solidFill>
+              </a:rPr>
+              <a:t>v2.0</a:t>
+            </a:r>
+          </a:p>
+        </p:txBody>
+      </p:sp>
+      <p:sp>
+        <p:nvSpPr>
+          <p:cNvPr id="56" name="Rounded Rectangle 55">
+            <a:extLst>
+              <a:ext uri="{FF2B5EF4-FFF2-40B4-BE49-F238E27FC236}">
+                <a16:creationId xmlns:a16="http://schemas.microsoft.com/office/drawing/2014/main" id="{055D8326-B9BB-8D40-AB91-9DBD2DB840A9}"/>
               </a:ext>
             </a:extLst>
           </p:cNvPr>
@@ -5162,8 +5191,8 @@
         </p:nvSpPr>
         <p:spPr>
           <a:xfrm>
-            <a:off x="4676841" y="2858881"/>
-            <a:ext cx="816445" cy="1041636"/>
+            <a:off x="4781170" y="3116049"/>
+            <a:ext cx="689886" cy="618939"/>
           </a:xfrm>
           <a:prstGeom prst="roundRect">
             <a:avLst/>
@@ -5202,84 +5231,12 @@
           </a:p>
         </p:txBody>
       </p:sp>
-      <p:pic>
-        <p:nvPicPr>
-          <p:cNvPr id="72" name="Graphic 71" descr="Server">
-            <a:extLst>
-              <a:ext uri="{FF2B5EF4-FFF2-40B4-BE49-F238E27FC236}">
-                <a16:creationId xmlns:a16="http://schemas.microsoft.com/office/drawing/2014/main" id="{55EEA0B0-993C-C64E-9A52-07B2BC96EB02}"/>
-              </a:ext>
-            </a:extLst>
-          </p:cNvPr>
-          <p:cNvPicPr>
-            <a:picLocks noChangeAspect="1"/>
-          </p:cNvPicPr>
-          <p:nvPr/>
-        </p:nvPicPr>
-        <p:blipFill>
-          <a:blip r:embed="rId22">
-            <a:extLst>
-              <a:ext uri="{96DAC541-7B7A-43D3-8B79-37D633B846F1}">
-                <asvg:svgBlip xmlns:asvg="http://schemas.microsoft.com/office/drawing/2016/SVG/main" r:embed="rId23"/>
-              </a:ext>
-            </a:extLst>
-          </a:blip>
-          <a:stretch>
-            <a:fillRect/>
-          </a:stretch>
-        </p:blipFill>
-        <p:spPr>
-          <a:xfrm>
-            <a:off x="2168312" y="3005254"/>
-            <a:ext cx="914400" cy="914400"/>
-          </a:xfrm>
-          <a:prstGeom prst="rect">
-            <a:avLst/>
-          </a:prstGeom>
-        </p:spPr>
-      </p:pic>
-      <p:pic>
-        <p:nvPicPr>
-          <p:cNvPr id="57" name="Graphic 56" descr="Server">
-            <a:extLst>
-              <a:ext uri="{FF2B5EF4-FFF2-40B4-BE49-F238E27FC236}">
-                <a16:creationId xmlns:a16="http://schemas.microsoft.com/office/drawing/2014/main" id="{1377B7FF-9024-EE45-8EA2-E4370E391F91}"/>
-              </a:ext>
-            </a:extLst>
-          </p:cNvPr>
-          <p:cNvPicPr>
-            <a:picLocks noChangeAspect="1"/>
-          </p:cNvPicPr>
-          <p:nvPr/>
-        </p:nvPicPr>
-        <p:blipFill>
-          <a:blip r:embed="rId22">
-            <a:extLst>
-              <a:ext uri="{96DAC541-7B7A-43D3-8B79-37D633B846F1}">
-                <asvg:svgBlip xmlns:asvg="http://schemas.microsoft.com/office/drawing/2016/SVG/main" r:embed="rId23"/>
-              </a:ext>
-            </a:extLst>
-          </a:blip>
-          <a:stretch>
-            <a:fillRect/>
-          </a:stretch>
-        </p:blipFill>
-        <p:spPr>
-          <a:xfrm>
-            <a:off x="4681839" y="3005254"/>
-            <a:ext cx="914400" cy="914400"/>
-          </a:xfrm>
-          <a:prstGeom prst="rect">
-            <a:avLst/>
-          </a:prstGeom>
-        </p:spPr>
-      </p:pic>
-      <p:sp>
-        <p:nvSpPr>
-          <p:cNvPr id="70" name="Rounded Rectangle 69">
-            <a:extLst>
-              <a:ext uri="{FF2B5EF4-FFF2-40B4-BE49-F238E27FC236}">
-                <a16:creationId xmlns:a16="http://schemas.microsoft.com/office/drawing/2014/main" id="{A81DBC97-4326-7A42-BAFD-7AA34B39351F}"/>
+      <p:sp>
+        <p:nvSpPr>
+          <p:cNvPr id="73" name="Rounded Rectangle 72">
+            <a:extLst>
+              <a:ext uri="{FF2B5EF4-FFF2-40B4-BE49-F238E27FC236}">
+                <a16:creationId xmlns:a16="http://schemas.microsoft.com/office/drawing/2014/main" id="{E71FD733-5596-9147-92A5-95EF2ED71511}"/>
               </a:ext>
             </a:extLst>
           </p:cNvPr>
@@ -5288,23 +5245,18 @@
         </p:nvSpPr>
         <p:spPr>
           <a:xfrm>
-            <a:off x="8263722" y="4147864"/>
-            <a:ext cx="1170215" cy="674914"/>
+            <a:off x="4676841" y="2858881"/>
+            <a:ext cx="816445" cy="1041636"/>
           </a:xfrm>
           <a:prstGeom prst="roundRect">
             <a:avLst/>
           </a:prstGeom>
           <a:solidFill>
-            <a:schemeClr val="accent6">
-              <a:lumMod val="60000"/>
-              <a:lumOff val="40000"/>
-            </a:schemeClr>
+            <a:schemeClr val="bg1"/>
           </a:solidFill>
-          <a:ln w="19050">
+          <a:ln>
             <a:solidFill>
-              <a:schemeClr val="accent6">
-                <a:lumMod val="50000"/>
-              </a:schemeClr>
+              <a:schemeClr val="bg1"/>
             </a:solidFill>
           </a:ln>
         </p:spPr>
@@ -5329,20 +5281,88 @@
           <a:lstStyle/>
           <a:p>
             <a:pPr algn="ctr"/>
-            <a:endParaRPr lang="en-US" dirty="0">
-              <a:solidFill>
-                <a:schemeClr val="tx1"/>
-              </a:solidFill>
-            </a:endParaRPr>
-          </a:p>
-        </p:txBody>
-      </p:sp>
-      <p:sp>
-        <p:nvSpPr>
-          <p:cNvPr id="71" name="Curved Up Arrow 70">
-            <a:extLst>
-              <a:ext uri="{FF2B5EF4-FFF2-40B4-BE49-F238E27FC236}">
-                <a16:creationId xmlns:a16="http://schemas.microsoft.com/office/drawing/2014/main" id="{6A8FC5E4-D3C7-3046-B1AB-FAD880964032}"/>
+            <a:endParaRPr lang="en-US"/>
+          </a:p>
+        </p:txBody>
+      </p:sp>
+      <p:pic>
+        <p:nvPicPr>
+          <p:cNvPr id="72" name="Graphic 71" descr="Server">
+            <a:extLst>
+              <a:ext uri="{FF2B5EF4-FFF2-40B4-BE49-F238E27FC236}">
+                <a16:creationId xmlns:a16="http://schemas.microsoft.com/office/drawing/2014/main" id="{55EEA0B0-993C-C64E-9A52-07B2BC96EB02}"/>
+              </a:ext>
+            </a:extLst>
+          </p:cNvPr>
+          <p:cNvPicPr>
+            <a:picLocks noChangeAspect="1"/>
+          </p:cNvPicPr>
+          <p:nvPr/>
+        </p:nvPicPr>
+        <p:blipFill>
+          <a:blip r:embed="rId22">
+            <a:extLst>
+              <a:ext uri="{96DAC541-7B7A-43D3-8B79-37D633B846F1}">
+                <asvg:svgBlip xmlns:asvg="http://schemas.microsoft.com/office/drawing/2016/SVG/main" r:embed="rId23"/>
+              </a:ext>
+            </a:extLst>
+          </a:blip>
+          <a:stretch>
+            <a:fillRect/>
+          </a:stretch>
+        </p:blipFill>
+        <p:spPr>
+          <a:xfrm>
+            <a:off x="2168312" y="3005254"/>
+            <a:ext cx="914400" cy="914400"/>
+          </a:xfrm>
+          <a:prstGeom prst="rect">
+            <a:avLst/>
+          </a:prstGeom>
+        </p:spPr>
+      </p:pic>
+      <p:pic>
+        <p:nvPicPr>
+          <p:cNvPr id="57" name="Graphic 56" descr="Server">
+            <a:extLst>
+              <a:ext uri="{FF2B5EF4-FFF2-40B4-BE49-F238E27FC236}">
+                <a16:creationId xmlns:a16="http://schemas.microsoft.com/office/drawing/2014/main" id="{1377B7FF-9024-EE45-8EA2-E4370E391F91}"/>
+              </a:ext>
+            </a:extLst>
+          </p:cNvPr>
+          <p:cNvPicPr>
+            <a:picLocks noChangeAspect="1"/>
+          </p:cNvPicPr>
+          <p:nvPr/>
+        </p:nvPicPr>
+        <p:blipFill>
+          <a:blip r:embed="rId22">
+            <a:extLst>
+              <a:ext uri="{96DAC541-7B7A-43D3-8B79-37D633B846F1}">
+                <asvg:svgBlip xmlns:asvg="http://schemas.microsoft.com/office/drawing/2016/SVG/main" r:embed="rId23"/>
+              </a:ext>
+            </a:extLst>
+          </a:blip>
+          <a:stretch>
+            <a:fillRect/>
+          </a:stretch>
+        </p:blipFill>
+        <p:spPr>
+          <a:xfrm>
+            <a:off x="4681839" y="3005254"/>
+            <a:ext cx="914400" cy="914400"/>
+          </a:xfrm>
+          <a:prstGeom prst="rect">
+            <a:avLst/>
+          </a:prstGeom>
+        </p:spPr>
+      </p:pic>
+      <p:sp>
+        <p:nvSpPr>
+          <p:cNvPr id="70" name="Rounded Rectangle 69">
+            <a:extLst>
+              <a:ext uri="{FF2B5EF4-FFF2-40B4-BE49-F238E27FC236}">
+                <a16:creationId xmlns:a16="http://schemas.microsoft.com/office/drawing/2014/main" id="{A81DBC97-4326-7A42-BAFD-7AA34B39351F}"/>
               </a:ext>
             </a:extLst>
           </p:cNvPr>
@@ -5351,24 +5371,21 @@
         </p:nvSpPr>
         <p:spPr>
           <a:xfrm>
-            <a:off x="7324888" y="2929053"/>
-            <a:ext cx="1271030" cy="397329"/>
-          </a:xfrm>
-          <a:prstGeom prst="curvedUpArrow">
-            <a:avLst>
-              <a:gd name="adj1" fmla="val 13236"/>
-              <a:gd name="adj2" fmla="val 50000"/>
-              <a:gd name="adj3" fmla="val 25000"/>
-            </a:avLst>
+            <a:off x="8263722" y="4147864"/>
+            <a:ext cx="1170215" cy="674914"/>
+          </a:xfrm>
+          <a:prstGeom prst="roundRect">
+            <a:avLst/>
           </a:prstGeom>
           <a:solidFill>
-            <a:schemeClr val="accent1">
-              <a:lumMod val="75000"/>
+            <a:schemeClr val="accent6">
+              <a:lumMod val="60000"/>
+              <a:lumOff val="40000"/>
             </a:schemeClr>
           </a:solidFill>
-          <a:ln>
+          <a:ln w="19050">
             <a:solidFill>
-              <a:schemeClr val="accent1">
+              <a:schemeClr val="accent6">
                 <a:lumMod val="50000"/>
               </a:schemeClr>
             </a:solidFill>
@@ -5395,7 +5412,7 @@
           <a:lstStyle/>
           <a:p>
             <a:pPr algn="ctr"/>
-            <a:endParaRPr lang="en-US">
+            <a:endParaRPr lang="en-US" dirty="0">
               <a:solidFill>
                 <a:schemeClr val="tx1"/>
               </a:solidFill>
@@ -5405,10 +5422,10 @@
       </p:sp>
       <p:sp>
         <p:nvSpPr>
-          <p:cNvPr id="74" name="Curved Up Arrow 73">
-            <a:extLst>
-              <a:ext uri="{FF2B5EF4-FFF2-40B4-BE49-F238E27FC236}">
-                <a16:creationId xmlns:a16="http://schemas.microsoft.com/office/drawing/2014/main" id="{8CA19FD9-0AEB-DB48-BAC6-08DD092434DE}"/>
+          <p:cNvPr id="71" name="Curved Up Arrow 70">
+            <a:extLst>
+              <a:ext uri="{FF2B5EF4-FFF2-40B4-BE49-F238E27FC236}">
+                <a16:creationId xmlns:a16="http://schemas.microsoft.com/office/drawing/2014/main" id="{6A8FC5E4-D3C7-3046-B1AB-FAD880964032}"/>
               </a:ext>
             </a:extLst>
           </p:cNvPr>
@@ -5416,9 +5433,9 @@
           <p:nvPr/>
         </p:nvSpPr>
         <p:spPr>
-          <a:xfrm flipV="1">
-            <a:off x="7383397" y="3426987"/>
-            <a:ext cx="1212521" cy="397329"/>
+          <a:xfrm>
+            <a:off x="7324888" y="2929053"/>
+            <a:ext cx="1271030" cy="397329"/>
           </a:xfrm>
           <a:prstGeom prst="curvedUpArrow">
             <a:avLst>
@@ -5428,13 +5445,13 @@
             </a:avLst>
           </a:prstGeom>
           <a:solidFill>
-            <a:schemeClr val="accent6">
+            <a:schemeClr val="accent1">
               <a:lumMod val="75000"/>
             </a:schemeClr>
           </a:solidFill>
           <a:ln>
             <a:solidFill>
-              <a:schemeClr val="accent6">
+              <a:schemeClr val="accent1">
                 <a:lumMod val="50000"/>
               </a:schemeClr>
             </a:solidFill>
@@ -5471,10 +5488,10 @@
       </p:sp>
       <p:sp>
         <p:nvSpPr>
-          <p:cNvPr id="76" name="Rounded Rectangle 75">
-            <a:extLst>
-              <a:ext uri="{FF2B5EF4-FFF2-40B4-BE49-F238E27FC236}">
-                <a16:creationId xmlns:a16="http://schemas.microsoft.com/office/drawing/2014/main" id="{17597C80-A437-9C40-BC16-CBECB19E11C1}"/>
+          <p:cNvPr id="74" name="Curved Up Arrow 73">
+            <a:extLst>
+              <a:ext uri="{FF2B5EF4-FFF2-40B4-BE49-F238E27FC236}">
+                <a16:creationId xmlns:a16="http://schemas.microsoft.com/office/drawing/2014/main" id="{8CA19FD9-0AEB-DB48-BAC6-08DD092434DE}"/>
               </a:ext>
             </a:extLst>
           </p:cNvPr>
@@ -5482,21 +5499,25 @@
           <p:nvPr/>
         </p:nvSpPr>
         <p:spPr>
-          <a:xfrm>
-            <a:off x="8159292" y="2061399"/>
-            <a:ext cx="1170215" cy="674914"/>
-          </a:xfrm>
-          <a:prstGeom prst="roundRect">
-            <a:avLst/>
+          <a:xfrm flipV="1">
+            <a:off x="7383397" y="3426987"/>
+            <a:ext cx="1212521" cy="397329"/>
+          </a:xfrm>
+          <a:prstGeom prst="curvedUpArrow">
+            <a:avLst>
+              <a:gd name="adj1" fmla="val 13236"/>
+              <a:gd name="adj2" fmla="val 50000"/>
+              <a:gd name="adj3" fmla="val 25000"/>
+            </a:avLst>
           </a:prstGeom>
           <a:solidFill>
-            <a:schemeClr val="accent1">
+            <a:schemeClr val="accent6">
               <a:lumMod val="75000"/>
             </a:schemeClr>
           </a:solidFill>
-          <a:ln w="19050">
+          <a:ln>
             <a:solidFill>
-              <a:schemeClr val="accent1">
+              <a:schemeClr val="accent6">
                 <a:lumMod val="50000"/>
               </a:schemeClr>
             </a:solidFill>
@@ -5523,23 +5544,20 @@
           <a:lstStyle/>
           <a:p>
             <a:pPr algn="ctr"/>
-            <a:r>
-              <a:rPr lang="en-US" dirty="0">
-                <a:solidFill>
-                  <a:schemeClr val="bg1"/>
-                </a:solidFill>
-              </a:rPr>
-              <a:t>v1.0</a:t>
-            </a:r>
-          </a:p>
-        </p:txBody>
-      </p:sp>
-      <p:sp>
-        <p:nvSpPr>
-          <p:cNvPr id="77" name="Rounded Rectangle 76">
-            <a:extLst>
-              <a:ext uri="{FF2B5EF4-FFF2-40B4-BE49-F238E27FC236}">
-                <a16:creationId xmlns:a16="http://schemas.microsoft.com/office/drawing/2014/main" id="{CE070102-5BA5-1B44-9287-39DC0017C162}"/>
+            <a:endParaRPr lang="en-US">
+              <a:solidFill>
+                <a:schemeClr val="tx1"/>
+              </a:solidFill>
+            </a:endParaRPr>
+          </a:p>
+        </p:txBody>
+      </p:sp>
+      <p:sp>
+        <p:nvSpPr>
+          <p:cNvPr id="76" name="Rounded Rectangle 75">
+            <a:extLst>
+              <a:ext uri="{FF2B5EF4-FFF2-40B4-BE49-F238E27FC236}">
+                <a16:creationId xmlns:a16="http://schemas.microsoft.com/office/drawing/2014/main" id="{17597C80-A437-9C40-BC16-CBECB19E11C1}"/>
               </a:ext>
             </a:extLst>
           </p:cNvPr>
@@ -5548,20 +5566,20 @@
         </p:nvSpPr>
         <p:spPr>
           <a:xfrm>
-            <a:off x="8159292" y="4272676"/>
+            <a:off x="8159292" y="2061399"/>
             <a:ext cx="1170215" cy="674914"/>
           </a:xfrm>
           <a:prstGeom prst="roundRect">
             <a:avLst/>
           </a:prstGeom>
           <a:solidFill>
-            <a:schemeClr val="accent6">
+            <a:schemeClr val="accent1">
               <a:lumMod val="75000"/>
             </a:schemeClr>
           </a:solidFill>
           <a:ln w="19050">
             <a:solidFill>
-              <a:schemeClr val="accent6">
+              <a:schemeClr val="accent1">
                 <a:lumMod val="50000"/>
               </a:schemeClr>
             </a:solidFill>
@@ -5594,17 +5612,17 @@
                   <a:schemeClr val="bg1"/>
                 </a:solidFill>
               </a:rPr>
-              <a:t>v2.0</a:t>
-            </a:r>
-          </a:p>
-        </p:txBody>
-      </p:sp>
-      <p:sp>
-        <p:nvSpPr>
-          <p:cNvPr id="83" name="Rounded Rectangle 82">
-            <a:extLst>
-              <a:ext uri="{FF2B5EF4-FFF2-40B4-BE49-F238E27FC236}">
-                <a16:creationId xmlns:a16="http://schemas.microsoft.com/office/drawing/2014/main" id="{6656F4DF-FFBE-EE4C-993B-99617CD58386}"/>
+              <a:t>v1.0</a:t>
+            </a:r>
+          </a:p>
+        </p:txBody>
+      </p:sp>
+      <p:sp>
+        <p:nvSpPr>
+          <p:cNvPr id="77" name="Rounded Rectangle 76">
+            <a:extLst>
+              <a:ext uri="{FF2B5EF4-FFF2-40B4-BE49-F238E27FC236}">
+                <a16:creationId xmlns:a16="http://schemas.microsoft.com/office/drawing/2014/main" id="{CE070102-5BA5-1B44-9287-39DC0017C162}"/>
               </a:ext>
             </a:extLst>
           </p:cNvPr>
@@ -5613,18 +5631,22 @@
         </p:nvSpPr>
         <p:spPr>
           <a:xfrm>
-            <a:off x="7180185" y="2848628"/>
-            <a:ext cx="816445" cy="1041636"/>
+            <a:off x="8159292" y="4272676"/>
+            <a:ext cx="1170215" cy="674914"/>
           </a:xfrm>
           <a:prstGeom prst="roundRect">
             <a:avLst/>
           </a:prstGeom>
           <a:solidFill>
-            <a:schemeClr val="bg1"/>
+            <a:schemeClr val="accent6">
+              <a:lumMod val="75000"/>
+            </a:schemeClr>
           </a:solidFill>
-          <a:ln>
+          <a:ln w="19050">
             <a:solidFill>
-              <a:schemeClr val="bg1"/>
+              <a:schemeClr val="accent6">
+                <a:lumMod val="50000"/>
+              </a:schemeClr>
             </a:solidFill>
           </a:ln>
         </p:spPr>
@@ -5649,52 +5671,23 @@
           <a:lstStyle/>
           <a:p>
             <a:pPr algn="ctr"/>
-            <a:endParaRPr lang="en-US"/>
-          </a:p>
-        </p:txBody>
-      </p:sp>
-      <p:pic>
-        <p:nvPicPr>
-          <p:cNvPr id="84" name="Graphic 83" descr="Server">
-            <a:extLst>
-              <a:ext uri="{FF2B5EF4-FFF2-40B4-BE49-F238E27FC236}">
-                <a16:creationId xmlns:a16="http://schemas.microsoft.com/office/drawing/2014/main" id="{95494DAB-1ECB-1844-857E-C71519E2842C}"/>
-              </a:ext>
-            </a:extLst>
-          </p:cNvPr>
-          <p:cNvPicPr>
-            <a:picLocks noChangeAspect="1"/>
-          </p:cNvPicPr>
-          <p:nvPr/>
-        </p:nvPicPr>
-        <p:blipFill>
-          <a:blip r:embed="rId22">
-            <a:extLst>
-              <a:ext uri="{96DAC541-7B7A-43D3-8B79-37D633B846F1}">
-                <asvg:svgBlip xmlns:asvg="http://schemas.microsoft.com/office/drawing/2016/SVG/main" r:embed="rId23"/>
-              </a:ext>
-            </a:extLst>
-          </a:blip>
-          <a:stretch>
-            <a:fillRect/>
-          </a:stretch>
-        </p:blipFill>
-        <p:spPr>
-          <a:xfrm>
-            <a:off x="7194808" y="2975864"/>
-            <a:ext cx="914400" cy="914400"/>
-          </a:xfrm>
-          <a:prstGeom prst="rect">
-            <a:avLst/>
-          </a:prstGeom>
-        </p:spPr>
-      </p:pic>
-      <p:sp>
-        <p:nvSpPr>
-          <p:cNvPr id="86" name="Rounded Rectangle 85">
-            <a:extLst>
-              <a:ext uri="{FF2B5EF4-FFF2-40B4-BE49-F238E27FC236}">
-                <a16:creationId xmlns:a16="http://schemas.microsoft.com/office/drawing/2014/main" id="{108FF632-71A4-BE48-B037-49620092C270}"/>
+            <a:r>
+              <a:rPr lang="en-US" dirty="0">
+                <a:solidFill>
+                  <a:schemeClr val="bg1"/>
+                </a:solidFill>
+              </a:rPr>
+              <a:t>v2.0</a:t>
+            </a:r>
+          </a:p>
+        </p:txBody>
+      </p:sp>
+      <p:sp>
+        <p:nvSpPr>
+          <p:cNvPr id="83" name="Rounded Rectangle 82">
+            <a:extLst>
+              <a:ext uri="{FF2B5EF4-FFF2-40B4-BE49-F238E27FC236}">
+                <a16:creationId xmlns:a16="http://schemas.microsoft.com/office/drawing/2014/main" id="{6656F4DF-FFBE-EE4C-993B-99617CD58386}"/>
               </a:ext>
             </a:extLst>
           </p:cNvPr>
@@ -5703,23 +5696,18 @@
         </p:nvSpPr>
         <p:spPr>
           <a:xfrm>
-            <a:off x="10738909" y="4026533"/>
-            <a:ext cx="1170215" cy="674914"/>
+            <a:off x="7180185" y="2848628"/>
+            <a:ext cx="816445" cy="1041636"/>
           </a:xfrm>
           <a:prstGeom prst="roundRect">
             <a:avLst/>
           </a:prstGeom>
           <a:solidFill>
-            <a:schemeClr val="accent6">
-              <a:lumMod val="40000"/>
-              <a:lumOff val="60000"/>
-            </a:schemeClr>
+            <a:schemeClr val="bg1"/>
           </a:solidFill>
-          <a:ln w="19050">
+          <a:ln>
             <a:solidFill>
-              <a:schemeClr val="accent6">
-                <a:lumMod val="50000"/>
-              </a:schemeClr>
+              <a:schemeClr val="bg1"/>
             </a:solidFill>
           </a:ln>
         </p:spPr>
@@ -5744,20 +5732,52 @@
           <a:lstStyle/>
           <a:p>
             <a:pPr algn="ctr"/>
-            <a:endParaRPr lang="en-US" dirty="0">
-              <a:solidFill>
-                <a:schemeClr val="tx1"/>
-              </a:solidFill>
-            </a:endParaRPr>
-          </a:p>
-        </p:txBody>
-      </p:sp>
-      <p:sp>
-        <p:nvSpPr>
-          <p:cNvPr id="87" name="Rounded Rectangle 86">
-            <a:extLst>
-              <a:ext uri="{FF2B5EF4-FFF2-40B4-BE49-F238E27FC236}">
-                <a16:creationId xmlns:a16="http://schemas.microsoft.com/office/drawing/2014/main" id="{970EA12E-AC9F-AF41-9168-2444020C900B}"/>
+            <a:endParaRPr lang="en-US"/>
+          </a:p>
+        </p:txBody>
+      </p:sp>
+      <p:pic>
+        <p:nvPicPr>
+          <p:cNvPr id="84" name="Graphic 83" descr="Server">
+            <a:extLst>
+              <a:ext uri="{FF2B5EF4-FFF2-40B4-BE49-F238E27FC236}">
+                <a16:creationId xmlns:a16="http://schemas.microsoft.com/office/drawing/2014/main" id="{95494DAB-1ECB-1844-857E-C71519E2842C}"/>
+              </a:ext>
+            </a:extLst>
+          </p:cNvPr>
+          <p:cNvPicPr>
+            <a:picLocks noChangeAspect="1"/>
+          </p:cNvPicPr>
+          <p:nvPr/>
+        </p:nvPicPr>
+        <p:blipFill>
+          <a:blip r:embed="rId22">
+            <a:extLst>
+              <a:ext uri="{96DAC541-7B7A-43D3-8B79-37D633B846F1}">
+                <asvg:svgBlip xmlns:asvg="http://schemas.microsoft.com/office/drawing/2016/SVG/main" r:embed="rId23"/>
+              </a:ext>
+            </a:extLst>
+          </a:blip>
+          <a:stretch>
+            <a:fillRect/>
+          </a:stretch>
+        </p:blipFill>
+        <p:spPr>
+          <a:xfrm>
+            <a:off x="7194808" y="2975864"/>
+            <a:ext cx="914400" cy="914400"/>
+          </a:xfrm>
+          <a:prstGeom prst="rect">
+            <a:avLst/>
+          </a:prstGeom>
+        </p:spPr>
+      </p:pic>
+      <p:sp>
+        <p:nvSpPr>
+          <p:cNvPr id="86" name="Rounded Rectangle 85">
+            <a:extLst>
+              <a:ext uri="{FF2B5EF4-FFF2-40B4-BE49-F238E27FC236}">
+                <a16:creationId xmlns:a16="http://schemas.microsoft.com/office/drawing/2014/main" id="{108FF632-71A4-BE48-B037-49620092C270}"/>
               </a:ext>
             </a:extLst>
           </p:cNvPr>
@@ -5766,7 +5786,7 @@
         </p:nvSpPr>
         <p:spPr>
           <a:xfrm>
-            <a:off x="10597395" y="4136604"/>
+            <a:off x="10738909" y="4268270"/>
             <a:ext cx="1170215" cy="674914"/>
           </a:xfrm>
           <a:prstGeom prst="roundRect">
@@ -5774,8 +5794,8 @@
           </a:prstGeom>
           <a:solidFill>
             <a:schemeClr val="accent6">
-              <a:lumMod val="60000"/>
-              <a:lumOff val="40000"/>
+              <a:lumMod val="40000"/>
+              <a:lumOff val="60000"/>
             </a:schemeClr>
           </a:solidFill>
           <a:ln w="19050">
@@ -5817,10 +5837,10 @@
       </p:sp>
       <p:sp>
         <p:nvSpPr>
-          <p:cNvPr id="88" name="Rounded Rectangle 87">
-            <a:extLst>
-              <a:ext uri="{FF2B5EF4-FFF2-40B4-BE49-F238E27FC236}">
-                <a16:creationId xmlns:a16="http://schemas.microsoft.com/office/drawing/2014/main" id="{FE39CC48-3E68-FA4A-AA40-B3D6C290C042}"/>
+          <p:cNvPr id="87" name="Rounded Rectangle 86">
+            <a:extLst>
+              <a:ext uri="{FF2B5EF4-FFF2-40B4-BE49-F238E27FC236}">
+                <a16:creationId xmlns:a16="http://schemas.microsoft.com/office/drawing/2014/main" id="{970EA12E-AC9F-AF41-9168-2444020C900B}"/>
               </a:ext>
             </a:extLst>
           </p:cNvPr>
@@ -5829,7 +5849,7 @@
         </p:nvSpPr>
         <p:spPr>
           <a:xfrm>
-            <a:off x="10466766" y="4272676"/>
+            <a:off x="10597395" y="4378341"/>
             <a:ext cx="1170215" cy="674914"/>
           </a:xfrm>
           <a:prstGeom prst="roundRect">
@@ -5837,7 +5857,8 @@
           </a:prstGeom>
           <a:solidFill>
             <a:schemeClr val="accent6">
-              <a:lumMod val="75000"/>
+              <a:lumMod val="60000"/>
+              <a:lumOff val="40000"/>
             </a:schemeClr>
           </a:solidFill>
           <a:ln w="19050">
@@ -5869,23 +5890,20 @@
           <a:lstStyle/>
           <a:p>
             <a:pPr algn="ctr"/>
-            <a:r>
-              <a:rPr lang="en-US" dirty="0">
-                <a:solidFill>
-                  <a:schemeClr val="bg1"/>
-                </a:solidFill>
-              </a:rPr>
-              <a:t>v2.0</a:t>
-            </a:r>
-          </a:p>
-        </p:txBody>
-      </p:sp>
-      <p:sp>
-        <p:nvSpPr>
-          <p:cNvPr id="90" name="Curved Up Arrow 89">
-            <a:extLst>
-              <a:ext uri="{FF2B5EF4-FFF2-40B4-BE49-F238E27FC236}">
-                <a16:creationId xmlns:a16="http://schemas.microsoft.com/office/drawing/2014/main" id="{BC1EF30E-0F6A-5148-A3F7-C3E251FF7F39}"/>
+            <a:endParaRPr lang="en-US" dirty="0">
+              <a:solidFill>
+                <a:schemeClr val="tx1"/>
+              </a:solidFill>
+            </a:endParaRPr>
+          </a:p>
+        </p:txBody>
+      </p:sp>
+      <p:sp>
+        <p:nvSpPr>
+          <p:cNvPr id="88" name="Rounded Rectangle 87">
+            <a:extLst>
+              <a:ext uri="{FF2B5EF4-FFF2-40B4-BE49-F238E27FC236}">
+                <a16:creationId xmlns:a16="http://schemas.microsoft.com/office/drawing/2014/main" id="{FE39CC48-3E68-FA4A-AA40-B3D6C290C042}"/>
               </a:ext>
             </a:extLst>
           </p:cNvPr>
@@ -5893,23 +5911,19 @@
           <p:nvPr/>
         </p:nvSpPr>
         <p:spPr>
-          <a:xfrm flipV="1">
-            <a:off x="9733003" y="3440213"/>
-            <a:ext cx="1212521" cy="397329"/>
-          </a:xfrm>
-          <a:prstGeom prst="curvedUpArrow">
-            <a:avLst>
-              <a:gd name="adj1" fmla="val 13236"/>
-              <a:gd name="adj2" fmla="val 50000"/>
-              <a:gd name="adj3" fmla="val 25000"/>
-            </a:avLst>
+          <a:xfrm>
+            <a:off x="10466766" y="4514413"/>
+            <a:ext cx="1170215" cy="674914"/>
+          </a:xfrm>
+          <a:prstGeom prst="roundRect">
+            <a:avLst/>
           </a:prstGeom>
           <a:solidFill>
             <a:schemeClr val="accent6">
               <a:lumMod val="75000"/>
             </a:schemeClr>
           </a:solidFill>
-          <a:ln>
+          <a:ln w="19050">
             <a:solidFill>
               <a:schemeClr val="accent6">
                 <a:lumMod val="50000"/>
@@ -5938,11 +5952,14 @@
           <a:lstStyle/>
           <a:p>
             <a:pPr algn="ctr"/>
-            <a:endParaRPr lang="en-US">
-              <a:solidFill>
-                <a:schemeClr val="tx1"/>
-              </a:solidFill>
-            </a:endParaRPr>
+            <a:r>
+              <a:rPr lang="en-US" dirty="0">
+                <a:solidFill>
+                  <a:schemeClr val="bg1"/>
+                </a:solidFill>
+              </a:rPr>
+              <a:t>v2.0</a:t>
+            </a:r>
           </a:p>
         </p:txBody>
       </p:sp>
@@ -6000,42 +6017,6 @@
           </a:p>
         </p:txBody>
       </p:sp>
-      <p:pic>
-        <p:nvPicPr>
-          <p:cNvPr id="92" name="Graphic 91" descr="Server">
-            <a:extLst>
-              <a:ext uri="{FF2B5EF4-FFF2-40B4-BE49-F238E27FC236}">
-                <a16:creationId xmlns:a16="http://schemas.microsoft.com/office/drawing/2014/main" id="{E11714EC-118E-8641-B007-EA9048181641}"/>
-              </a:ext>
-            </a:extLst>
-          </p:cNvPr>
-          <p:cNvPicPr>
-            <a:picLocks noChangeAspect="1"/>
-          </p:cNvPicPr>
-          <p:nvPr/>
-        </p:nvPicPr>
-        <p:blipFill>
-          <a:blip r:embed="rId22">
-            <a:extLst>
-              <a:ext uri="{96DAC541-7B7A-43D3-8B79-37D633B846F1}">
-                <asvg:svgBlip xmlns:asvg="http://schemas.microsoft.com/office/drawing/2016/SVG/main" r:embed="rId23"/>
-              </a:ext>
-            </a:extLst>
-          </a:blip>
-          <a:stretch>
-            <a:fillRect/>
-          </a:stretch>
-        </p:blipFill>
-        <p:spPr>
-          <a:xfrm>
-            <a:off x="9586454" y="2989090"/>
-            <a:ext cx="914400" cy="914400"/>
-          </a:xfrm>
-          <a:prstGeom prst="rect">
-            <a:avLst/>
-          </a:prstGeom>
-        </p:spPr>
-      </p:pic>
       <p:sp>
         <p:nvSpPr>
           <p:cNvPr id="2" name="TextBox 1">
@@ -6155,7 +6136,7 @@
         </p:nvSpPr>
         <p:spPr>
           <a:xfrm>
-            <a:off x="10630924" y="4911314"/>
+            <a:off x="10630924" y="5153051"/>
             <a:ext cx="841897" cy="369332"/>
           </a:xfrm>
           <a:prstGeom prst="rect">
@@ -6390,7 +6371,7 @@
         </p:blipFill>
         <p:spPr>
           <a:xfrm>
-            <a:off x="9887531" y="4324650"/>
+            <a:off x="9887531" y="4566387"/>
             <a:ext cx="570967" cy="570967"/>
           </a:xfrm>
           <a:prstGeom prst="rect">
@@ -6520,7 +6501,7 @@
         </p:nvSpPr>
         <p:spPr>
           <a:xfrm>
-            <a:off x="10349907" y="3110109"/>
+            <a:off x="10002425" y="3867955"/>
             <a:ext cx="1692066" cy="338554"/>
           </a:xfrm>
           <a:prstGeom prst="rect">
@@ -6759,6 +6740,345 @@
             <a:r>
               <a:rPr lang="en-US" dirty="0"/>
               <a:t>55%</a:t>
+            </a:r>
+          </a:p>
+        </p:txBody>
+      </p:sp>
+      <p:sp>
+        <p:nvSpPr>
+          <p:cNvPr id="108" name="TextBox 107">
+            <a:extLst>
+              <a:ext uri="{FF2B5EF4-FFF2-40B4-BE49-F238E27FC236}">
+                <a16:creationId xmlns:a16="http://schemas.microsoft.com/office/drawing/2014/main" id="{E1F0B391-8A3F-AA44-ABF4-299E983ECBAB}"/>
+              </a:ext>
+            </a:extLst>
+          </p:cNvPr>
+          <p:cNvSpPr txBox="1"/>
+          <p:nvPr/>
+        </p:nvSpPr>
+        <p:spPr>
+          <a:xfrm>
+            <a:off x="10030680" y="2806903"/>
+            <a:ext cx="1165897" cy="369332"/>
+          </a:xfrm>
+          <a:prstGeom prst="rect">
+            <a:avLst/>
+          </a:prstGeom>
+          <a:noFill/>
+        </p:spPr>
+        <p:txBody>
+          <a:bodyPr wrap="none" rtlCol="0">
+            <a:spAutoFit/>
+          </a:bodyPr>
+          <a:lstStyle/>
+          <a:p>
+            <a:pPr marL="0" marR="0" lvl="0" indent="0" algn="l" defTabSz="914400" rtl="0" eaLnBrk="1" fontAlgn="auto" latinLnBrk="0" hangingPunct="1">
+              <a:lnSpc>
+                <a:spcPct val="100000"/>
+              </a:lnSpc>
+              <a:spcBef>
+                <a:spcPts val="0"/>
+              </a:spcBef>
+              <a:spcAft>
+                <a:spcPts val="0"/>
+              </a:spcAft>
+              <a:buClrTx/>
+              <a:buSzTx/>
+              <a:buFontTx/>
+              <a:buNone/>
+              <a:tabLst/>
+              <a:defRPr/>
+            </a:pPr>
+            <a:r>
+              <a:rPr kumimoji="0" lang="en-US" sz="1800" b="0" i="0" u="none" strike="noStrike" kern="1200" cap="none" spc="0" normalizeH="0" baseline="0" noProof="0" dirty="0">
+                <a:ln>
+                  <a:noFill/>
+                </a:ln>
+                <a:solidFill>
+                  <a:prstClr val="black"/>
+                </a:solidFill>
+                <a:effectLst/>
+                <a:uLnTx/>
+                <a:uFillTx/>
+                <a:latin typeface="Calibri" panose="020F0502020204030204"/>
+                <a:ea typeface="+mn-ea"/>
+                <a:cs typeface="+mn-cs"/>
+              </a:rPr>
+              <a:t>L</a:t>
+            </a:r>
+            <a:r>
+              <a:rPr kumimoji="0" lang="en-US" sz="1800" b="0" i="0" u="none" strike="noStrike" kern="1200" cap="none" spc="0" normalizeH="0" baseline="0" noProof="0" dirty="0" err="1">
+                <a:ln>
+                  <a:noFill/>
+                </a:ln>
+                <a:solidFill>
+                  <a:prstClr val="black"/>
+                </a:solidFill>
+                <a:effectLst/>
+                <a:uLnTx/>
+                <a:uFillTx/>
+                <a:latin typeface="Calibri" panose="020F0502020204030204"/>
+                <a:ea typeface="+mn-ea"/>
+                <a:cs typeface="+mn-cs"/>
+              </a:rPr>
+              <a:t>atency</a:t>
+            </a:r>
+            <a:r>
+              <a:rPr kumimoji="0" lang="en-US" sz="1800" b="0" i="0" u="none" strike="noStrike" kern="1200" cap="none" spc="0" normalizeH="0" baseline="0" noProof="0" dirty="0">
+                <a:ln>
+                  <a:noFill/>
+                </a:ln>
+                <a:solidFill>
+                  <a:prstClr val="black"/>
+                </a:solidFill>
+                <a:effectLst/>
+                <a:uLnTx/>
+                <a:uFillTx/>
+                <a:latin typeface="Calibri" panose="020F0502020204030204"/>
+                <a:ea typeface="+mn-ea"/>
+                <a:cs typeface="+mn-cs"/>
+              </a:rPr>
+              <a:t> </a:t>
+            </a:r>
+            <a:r>
+              <a:rPr kumimoji="0" lang="en-US" sz="1800" b="1" i="0" u="none" strike="noStrike" kern="1200" cap="none" spc="0" normalizeH="0" baseline="0" noProof="0" dirty="0">
+                <a:ln>
+                  <a:noFill/>
+                </a:ln>
+                <a:solidFill>
+                  <a:srgbClr val="70AD47">
+                    <a:lumMod val="50000"/>
+                  </a:srgbClr>
+                </a:solidFill>
+                <a:effectLst/>
+                <a:uLnTx/>
+                <a:uFillTx/>
+                <a:latin typeface="Calibri" panose="020F0502020204030204"/>
+                <a:ea typeface="+mn-ea"/>
+                <a:cs typeface="+mn-cs"/>
+              </a:rPr>
+              <a:t>↓</a:t>
+            </a:r>
+          </a:p>
+        </p:txBody>
+      </p:sp>
+      <p:pic>
+        <p:nvPicPr>
+          <p:cNvPr id="109" name="Graphic 108" descr="Checkbox Checked">
+            <a:extLst>
+              <a:ext uri="{FF2B5EF4-FFF2-40B4-BE49-F238E27FC236}">
+                <a16:creationId xmlns:a16="http://schemas.microsoft.com/office/drawing/2014/main" id="{B68DFA95-B2F9-AD49-A9BE-9B05F7AAFEA4}"/>
+              </a:ext>
+            </a:extLst>
+          </p:cNvPr>
+          <p:cNvPicPr>
+            <a:picLocks noChangeAspect="1"/>
+          </p:cNvPicPr>
+          <p:nvPr/>
+        </p:nvPicPr>
+        <p:blipFill>
+          <a:blip r:embed="rId26">
+            <a:extLst>
+              <a:ext uri="{96DAC541-7B7A-43D3-8B79-37D633B846F1}">
+                <asvg:svgBlip xmlns:asvg="http://schemas.microsoft.com/office/drawing/2016/SVG/main" r:embed="rId27"/>
+              </a:ext>
+            </a:extLst>
+          </a:blip>
+          <a:stretch>
+            <a:fillRect/>
+          </a:stretch>
+        </p:blipFill>
+        <p:spPr>
+          <a:xfrm>
+            <a:off x="9610064" y="2724665"/>
+            <a:ext cx="533808" cy="533808"/>
+          </a:xfrm>
+          <a:prstGeom prst="rect">
+            <a:avLst/>
+          </a:prstGeom>
+        </p:spPr>
+      </p:pic>
+      <p:sp>
+        <p:nvSpPr>
+          <p:cNvPr id="112" name="TextBox 111">
+            <a:extLst>
+              <a:ext uri="{FF2B5EF4-FFF2-40B4-BE49-F238E27FC236}">
+                <a16:creationId xmlns:a16="http://schemas.microsoft.com/office/drawing/2014/main" id="{CB02B70A-DD15-F842-BD7F-6155F64538B2}"/>
+              </a:ext>
+            </a:extLst>
+          </p:cNvPr>
+          <p:cNvSpPr txBox="1"/>
+          <p:nvPr/>
+        </p:nvSpPr>
+        <p:spPr>
+          <a:xfrm>
+            <a:off x="10031143" y="3269243"/>
+            <a:ext cx="1343381" cy="369332"/>
+          </a:xfrm>
+          <a:prstGeom prst="rect">
+            <a:avLst/>
+          </a:prstGeom>
+          <a:noFill/>
+        </p:spPr>
+        <p:txBody>
+          <a:bodyPr wrap="none" rtlCol="0">
+            <a:spAutoFit/>
+          </a:bodyPr>
+          <a:lstStyle/>
+          <a:p>
+            <a:pPr marL="0" marR="0" lvl="0" indent="0" algn="l" defTabSz="914400" rtl="0" eaLnBrk="1" fontAlgn="auto" latinLnBrk="0" hangingPunct="1">
+              <a:lnSpc>
+                <a:spcPct val="100000"/>
+              </a:lnSpc>
+              <a:spcBef>
+                <a:spcPts val="0"/>
+              </a:spcBef>
+              <a:spcAft>
+                <a:spcPts val="0"/>
+              </a:spcAft>
+              <a:buClrTx/>
+              <a:buSzTx/>
+              <a:buFontTx/>
+              <a:buNone/>
+              <a:tabLst/>
+              <a:defRPr/>
+            </a:pPr>
+            <a:r>
+              <a:rPr kumimoji="0" lang="en-US" sz="1800" b="0" i="0" u="none" strike="noStrike" kern="1200" cap="none" spc="0" normalizeH="0" baseline="0" noProof="0" dirty="0">
+                <a:ln>
+                  <a:noFill/>
+                </a:ln>
+                <a:solidFill>
+                  <a:prstClr val="black"/>
+                </a:solidFill>
+                <a:effectLst/>
+                <a:uLnTx/>
+                <a:uFillTx/>
+                <a:latin typeface="Calibri" panose="020F0502020204030204"/>
+                <a:ea typeface="+mn-ea"/>
+                <a:cs typeface="+mn-cs"/>
+              </a:rPr>
+              <a:t>Error rate </a:t>
+            </a:r>
+            <a:r>
+              <a:rPr kumimoji="0" lang="en-US" sz="1800" b="1" i="0" u="none" strike="noStrike" kern="1200" cap="none" spc="0" normalizeH="0" baseline="0" noProof="0" dirty="0">
+                <a:ln>
+                  <a:noFill/>
+                </a:ln>
+                <a:solidFill>
+                  <a:srgbClr val="70AD47">
+                    <a:lumMod val="50000"/>
+                  </a:srgbClr>
+                </a:solidFill>
+                <a:effectLst/>
+                <a:uLnTx/>
+                <a:uFillTx/>
+                <a:latin typeface="Calibri" panose="020F0502020204030204"/>
+                <a:ea typeface="+mn-ea"/>
+                <a:cs typeface="+mn-cs"/>
+              </a:rPr>
+              <a:t>↓</a:t>
+            </a:r>
+          </a:p>
+        </p:txBody>
+      </p:sp>
+      <p:pic>
+        <p:nvPicPr>
+          <p:cNvPr id="113" name="Graphic 112" descr="Checkbox Checked">
+            <a:extLst>
+              <a:ext uri="{FF2B5EF4-FFF2-40B4-BE49-F238E27FC236}">
+                <a16:creationId xmlns:a16="http://schemas.microsoft.com/office/drawing/2014/main" id="{8DA408A8-2E57-8B42-9CBC-3DDF016F280F}"/>
+              </a:ext>
+            </a:extLst>
+          </p:cNvPr>
+          <p:cNvPicPr>
+            <a:picLocks noChangeAspect="1"/>
+          </p:cNvPicPr>
+          <p:nvPr/>
+        </p:nvPicPr>
+        <p:blipFill>
+          <a:blip r:embed="rId26">
+            <a:extLst>
+              <a:ext uri="{96DAC541-7B7A-43D3-8B79-37D633B846F1}">
+                <asvg:svgBlip xmlns:asvg="http://schemas.microsoft.com/office/drawing/2016/SVG/main" r:embed="rId27"/>
+              </a:ext>
+            </a:extLst>
+          </a:blip>
+          <a:stretch>
+            <a:fillRect/>
+          </a:stretch>
+        </p:blipFill>
+        <p:spPr>
+          <a:xfrm>
+            <a:off x="9610527" y="3187005"/>
+            <a:ext cx="533808" cy="533808"/>
+          </a:xfrm>
+          <a:prstGeom prst="rect">
+            <a:avLst/>
+          </a:prstGeom>
+        </p:spPr>
+      </p:pic>
+      <p:sp>
+        <p:nvSpPr>
+          <p:cNvPr id="115" name="TextBox 114">
+            <a:extLst>
+              <a:ext uri="{FF2B5EF4-FFF2-40B4-BE49-F238E27FC236}">
+                <a16:creationId xmlns:a16="http://schemas.microsoft.com/office/drawing/2014/main" id="{228AEE4F-D001-464B-B346-974D23B36B48}"/>
+              </a:ext>
+            </a:extLst>
+          </p:cNvPr>
+          <p:cNvSpPr txBox="1"/>
+          <p:nvPr/>
+        </p:nvSpPr>
+        <p:spPr>
+          <a:xfrm>
+            <a:off x="9649898" y="2448611"/>
+            <a:ext cx="1184427" cy="369332"/>
+          </a:xfrm>
+          <a:prstGeom prst="rect">
+            <a:avLst/>
+          </a:prstGeom>
+          <a:noFill/>
+        </p:spPr>
+        <p:txBody>
+          <a:bodyPr wrap="none" rtlCol="0">
+            <a:spAutoFit/>
+          </a:bodyPr>
+          <a:lstStyle/>
+          <a:p>
+            <a:pPr marL="0" marR="0" lvl="0" indent="0" algn="l" defTabSz="914400" rtl="0" eaLnBrk="1" fontAlgn="auto" latinLnBrk="0" hangingPunct="1">
+              <a:lnSpc>
+                <a:spcPct val="100000"/>
+              </a:lnSpc>
+              <a:spcBef>
+                <a:spcPts val="0"/>
+              </a:spcBef>
+              <a:spcAft>
+                <a:spcPts val="0"/>
+              </a:spcAft>
+              <a:buClrTx/>
+              <a:buSzTx/>
+              <a:buFontTx/>
+              <a:buNone/>
+              <a:tabLst/>
+              <a:defRPr/>
+            </a:pPr>
+            <a:r>
+              <a:rPr kumimoji="0" lang="en-US" sz="1800" b="1" i="0" u="none" strike="noStrike" kern="1200" cap="none" spc="0" normalizeH="0" baseline="0" noProof="0" dirty="0">
+                <a:ln>
+                  <a:noFill/>
+                </a:ln>
+                <a:solidFill>
+                  <a:srgbClr val="C00000"/>
+                </a:solidFill>
+                <a:effectLst/>
+                <a:uLnTx/>
+                <a:uFillTx/>
+                <a:latin typeface="Calibri" panose="020F0502020204030204"/>
+                <a:ea typeface="+mn-ea"/>
+                <a:cs typeface="+mn-cs"/>
+              </a:rPr>
+              <a:t>Objectives</a:t>
             </a:r>
           </a:p>
         </p:txBody>

</xml_diff>